<commit_message>
Week 2 lectures updated
</commit_message>
<xml_diff>
--- a/02_01FunctionsCS152.pptx
+++ b/02_01FunctionsCS152.pptx
@@ -6,21 +6,22 @@
     <p:sldMasterId id="2147483686" r:id="rId5"/>
   </p:sldMasterIdLst>
   <p:notesMasterIdLst>
-    <p:notesMasterId r:id="rId18"/>
+    <p:notesMasterId r:id="rId19"/>
   </p:notesMasterIdLst>
   <p:sldIdLst>
     <p:sldId id="256" r:id="rId6"/>
     <p:sldId id="268" r:id="rId7"/>
-    <p:sldId id="286" r:id="rId8"/>
-    <p:sldId id="300" r:id="rId9"/>
-    <p:sldId id="288" r:id="rId10"/>
-    <p:sldId id="260" r:id="rId11"/>
-    <p:sldId id="262" r:id="rId12"/>
-    <p:sldId id="301" r:id="rId13"/>
+    <p:sldId id="300" r:id="rId8"/>
+    <p:sldId id="288" r:id="rId9"/>
+    <p:sldId id="260" r:id="rId10"/>
+    <p:sldId id="262" r:id="rId11"/>
+    <p:sldId id="301" r:id="rId12"/>
+    <p:sldId id="304" r:id="rId13"/>
     <p:sldId id="264" r:id="rId14"/>
-    <p:sldId id="277" r:id="rId15"/>
+    <p:sldId id="305" r:id="rId15"/>
     <p:sldId id="302" r:id="rId16"/>
     <p:sldId id="303" r:id="rId17"/>
+    <p:sldId id="277" r:id="rId18"/>
   </p:sldIdLst>
   <p:sldSz cx="9144000" cy="5143500" type="screen16x9"/>
   <p:notesSz cx="6858000" cy="9144000"/>
@@ -272,272 +273,23 @@
 </p:presentation>
 </file>
 
-<file path=ppt/revisionInfo.xml><?xml version="1.0" encoding="utf-8"?>
-<p1510:revInfo xmlns:a="http://schemas.openxmlformats.org/drawingml/2006/main" xmlns:r="http://schemas.openxmlformats.org/officeDocument/2006/relationships" xmlns:p1510="http://schemas.microsoft.com/office/powerpoint/2015/10/main">
-  <p1510:revLst>
-    <p1510:client id="{E42A6DCA-17DC-465E-AB55-C4A8A822C467}" v="271" dt="2022-08-12T23:00:46.396"/>
-  </p1510:revLst>
-</p1510:revInfo>
-</file>
-
 <file path=ppt/changesInfos/changesInfo1.xml><?xml version="1.0" encoding="utf-8"?>
 <pc:chgInfo xmlns:a="http://schemas.openxmlformats.org/drawingml/2006/main" xmlns:r="http://schemas.openxmlformats.org/officeDocument/2006/relationships" xmlns:ac="http://schemas.microsoft.com/office/drawing/2013/main/command" xmlns:pc="http://schemas.microsoft.com/office/powerpoint/2013/main/command">
   <pc:docChgLst>
-    <pc:chgData name="Moraes,Marcia" userId="c9c67e8a-58e2-4733-9a1c-5d44fec4775b" providerId="ADAL" clId="{E42A6DCA-17DC-465E-AB55-C4A8A822C467}"/>
-    <pc:docChg chg="undo custSel addSld delSld modSld">
-      <pc:chgData name="Moraes,Marcia" userId="c9c67e8a-58e2-4733-9a1c-5d44fec4775b" providerId="ADAL" clId="{E42A6DCA-17DC-465E-AB55-C4A8A822C467}" dt="2022-08-12T23:10:24.381" v="2025" actId="14100"/>
+    <pc:chgData name="Marcia Moraes" userId="c9c67e8a-58e2-4733-9a1c-5d44fec4775b" providerId="ADAL" clId="{7E275E99-0727-4705-8711-08165BC6F33D}"/>
+    <pc:docChg chg="custSel modSld sldOrd">
+      <pc:chgData name="Marcia Moraes" userId="c9c67e8a-58e2-4733-9a1c-5d44fec4775b" providerId="ADAL" clId="{7E275E99-0727-4705-8711-08165BC6F33D}" dt="2024-06-25T22:11:11.528" v="2711" actId="20577"/>
       <pc:docMkLst>
         <pc:docMk/>
       </pc:docMkLst>
-      <pc:sldChg chg="modSp mod">
-        <pc:chgData name="Moraes,Marcia" userId="c9c67e8a-58e2-4733-9a1c-5d44fec4775b" providerId="ADAL" clId="{E42A6DCA-17DC-465E-AB55-C4A8A822C467}" dt="2022-08-12T16:36:33.496" v="8" actId="20577"/>
-        <pc:sldMkLst>
-          <pc:docMk/>
-          <pc:sldMk cId="0" sldId="256"/>
-        </pc:sldMkLst>
-        <pc:spChg chg="mod">
-          <ac:chgData name="Moraes,Marcia" userId="c9c67e8a-58e2-4733-9a1c-5d44fec4775b" providerId="ADAL" clId="{E42A6DCA-17DC-465E-AB55-C4A8A822C467}" dt="2022-08-12T16:36:33.496" v="8" actId="20577"/>
-          <ac:spMkLst>
-            <pc:docMk/>
-            <pc:sldMk cId="0" sldId="256"/>
-            <ac:spMk id="185" creationId="{00000000-0000-0000-0000-000000000000}"/>
-          </ac:spMkLst>
-        </pc:spChg>
-      </pc:sldChg>
-      <pc:sldChg chg="modSp add mod">
-        <pc:chgData name="Moraes,Marcia" userId="c9c67e8a-58e2-4733-9a1c-5d44fec4775b" providerId="ADAL" clId="{E42A6DCA-17DC-465E-AB55-C4A8A822C467}" dt="2022-08-12T18:58:43.798" v="475" actId="1076"/>
-        <pc:sldMkLst>
-          <pc:docMk/>
-          <pc:sldMk cId="0" sldId="260"/>
-        </pc:sldMkLst>
-        <pc:spChg chg="mod">
-          <ac:chgData name="Moraes,Marcia" userId="c9c67e8a-58e2-4733-9a1c-5d44fec4775b" providerId="ADAL" clId="{E42A6DCA-17DC-465E-AB55-C4A8A822C467}" dt="2022-08-12T18:58:43.798" v="475" actId="1076"/>
-          <ac:spMkLst>
-            <pc:docMk/>
-            <pc:sldMk cId="0" sldId="260"/>
-            <ac:spMk id="192" creationId="{00000000-0000-0000-0000-000000000000}"/>
-          </ac:spMkLst>
-        </pc:spChg>
-        <pc:spChg chg="mod">
-          <ac:chgData name="Moraes,Marcia" userId="c9c67e8a-58e2-4733-9a1c-5d44fec4775b" providerId="ADAL" clId="{E42A6DCA-17DC-465E-AB55-C4A8A822C467}" dt="2022-08-12T18:58:42.081" v="474" actId="1076"/>
-          <ac:spMkLst>
-            <pc:docMk/>
-            <pc:sldMk cId="0" sldId="260"/>
-            <ac:spMk id="193" creationId="{00000000-0000-0000-0000-000000000000}"/>
-          </ac:spMkLst>
-        </pc:spChg>
-        <pc:spChg chg="mod">
-          <ac:chgData name="Moraes,Marcia" userId="c9c67e8a-58e2-4733-9a1c-5d44fec4775b" providerId="ADAL" clId="{E42A6DCA-17DC-465E-AB55-C4A8A822C467}" dt="2022-08-12T18:58:26.199" v="469" actId="1076"/>
-          <ac:spMkLst>
-            <pc:docMk/>
-            <pc:sldMk cId="0" sldId="260"/>
-            <ac:spMk id="194" creationId="{00000000-0000-0000-0000-000000000000}"/>
-          </ac:spMkLst>
-        </pc:spChg>
-        <pc:spChg chg="mod">
-          <ac:chgData name="Moraes,Marcia" userId="c9c67e8a-58e2-4733-9a1c-5d44fec4775b" providerId="ADAL" clId="{E42A6DCA-17DC-465E-AB55-C4A8A822C467}" dt="2022-08-12T18:58:26.199" v="469" actId="1076"/>
-          <ac:spMkLst>
-            <pc:docMk/>
-            <pc:sldMk cId="0" sldId="260"/>
-            <ac:spMk id="195" creationId="{00000000-0000-0000-0000-000000000000}"/>
-          </ac:spMkLst>
-        </pc:spChg>
-        <pc:spChg chg="mod">
-          <ac:chgData name="Moraes,Marcia" userId="c9c67e8a-58e2-4733-9a1c-5d44fec4775b" providerId="ADAL" clId="{E42A6DCA-17DC-465E-AB55-C4A8A822C467}" dt="2022-08-12T18:58:26.199" v="469" actId="1076"/>
-          <ac:spMkLst>
-            <pc:docMk/>
-            <pc:sldMk cId="0" sldId="260"/>
-            <ac:spMk id="196" creationId="{00000000-0000-0000-0000-000000000000}"/>
-          </ac:spMkLst>
-        </pc:spChg>
-        <pc:spChg chg="mod">
-          <ac:chgData name="Moraes,Marcia" userId="c9c67e8a-58e2-4733-9a1c-5d44fec4775b" providerId="ADAL" clId="{E42A6DCA-17DC-465E-AB55-C4A8A822C467}" dt="2022-08-12T18:58:26.199" v="469" actId="1076"/>
-          <ac:spMkLst>
-            <pc:docMk/>
-            <pc:sldMk cId="0" sldId="260"/>
-            <ac:spMk id="197" creationId="{00000000-0000-0000-0000-000000000000}"/>
-          </ac:spMkLst>
-        </pc:spChg>
-        <pc:spChg chg="mod">
-          <ac:chgData name="Moraes,Marcia" userId="c9c67e8a-58e2-4733-9a1c-5d44fec4775b" providerId="ADAL" clId="{E42A6DCA-17DC-465E-AB55-C4A8A822C467}" dt="2022-08-12T18:58:26.199" v="469" actId="1076"/>
-          <ac:spMkLst>
-            <pc:docMk/>
-            <pc:sldMk cId="0" sldId="260"/>
-            <ac:spMk id="198" creationId="{00000000-0000-0000-0000-000000000000}"/>
-          </ac:spMkLst>
-        </pc:spChg>
-        <pc:picChg chg="mod">
-          <ac:chgData name="Moraes,Marcia" userId="c9c67e8a-58e2-4733-9a1c-5d44fec4775b" providerId="ADAL" clId="{E42A6DCA-17DC-465E-AB55-C4A8A822C467}" dt="2022-08-12T18:57:25.361" v="458" actId="1076"/>
-          <ac:picMkLst>
-            <pc:docMk/>
-            <pc:sldMk cId="0" sldId="260"/>
-            <ac:picMk id="199" creationId="{00000000-0000-0000-0000-000000000000}"/>
-          </ac:picMkLst>
-        </pc:picChg>
-      </pc:sldChg>
-      <pc:sldChg chg="del">
-        <pc:chgData name="Moraes,Marcia" userId="c9c67e8a-58e2-4733-9a1c-5d44fec4775b" providerId="ADAL" clId="{E42A6DCA-17DC-465E-AB55-C4A8A822C467}" dt="2022-08-12T19:55:17.892" v="898" actId="47"/>
-        <pc:sldMkLst>
-          <pc:docMk/>
-          <pc:sldMk cId="0" sldId="261"/>
-        </pc:sldMkLst>
-      </pc:sldChg>
-      <pc:sldChg chg="addSp delSp modSp add mod modAnim">
-        <pc:chgData name="Moraes,Marcia" userId="c9c67e8a-58e2-4733-9a1c-5d44fec4775b" providerId="ADAL" clId="{E42A6DCA-17DC-465E-AB55-C4A8A822C467}" dt="2022-08-12T23:07:17.603" v="1360" actId="962"/>
-        <pc:sldMkLst>
-          <pc:docMk/>
-          <pc:sldMk cId="4063998483" sldId="262"/>
-        </pc:sldMkLst>
-        <pc:spChg chg="mod">
-          <ac:chgData name="Moraes,Marcia" userId="c9c67e8a-58e2-4733-9a1c-5d44fec4775b" providerId="ADAL" clId="{E42A6DCA-17DC-465E-AB55-C4A8A822C467}" dt="2022-08-12T19:07:47.613" v="484" actId="1076"/>
-          <ac:spMkLst>
-            <pc:docMk/>
-            <pc:sldMk cId="4063998483" sldId="262"/>
-            <ac:spMk id="2" creationId="{CA19BA98-269C-AE43-9819-F21FFB060478}"/>
-          </ac:spMkLst>
-        </pc:spChg>
-        <pc:spChg chg="mod">
-          <ac:chgData name="Moraes,Marcia" userId="c9c67e8a-58e2-4733-9a1c-5d44fec4775b" providerId="ADAL" clId="{E42A6DCA-17DC-465E-AB55-C4A8A822C467}" dt="2022-08-12T19:08:45.959" v="492" actId="1076"/>
-          <ac:spMkLst>
-            <pc:docMk/>
-            <pc:sldMk cId="4063998483" sldId="262"/>
-            <ac:spMk id="3" creationId="{A8AA4F03-0252-5341-8D26-53B7A8D60662}"/>
-          </ac:spMkLst>
-        </pc:spChg>
-        <pc:spChg chg="del">
-          <ac:chgData name="Moraes,Marcia" userId="c9c67e8a-58e2-4733-9a1c-5d44fec4775b" providerId="ADAL" clId="{E42A6DCA-17DC-465E-AB55-C4A8A822C467}" dt="2022-08-12T19:07:58.376" v="486" actId="478"/>
-          <ac:spMkLst>
-            <pc:docMk/>
-            <pc:sldMk cId="4063998483" sldId="262"/>
-            <ac:spMk id="4" creationId="{E844F906-8A4F-4A4D-AC7E-66B8F979D316}"/>
-          </ac:spMkLst>
-        </pc:spChg>
-        <pc:spChg chg="add mod">
-          <ac:chgData name="Moraes,Marcia" userId="c9c67e8a-58e2-4733-9a1c-5d44fec4775b" providerId="ADAL" clId="{E42A6DCA-17DC-465E-AB55-C4A8A822C467}" dt="2022-08-12T19:15:36.790" v="562" actId="20577"/>
-          <ac:spMkLst>
-            <pc:docMk/>
-            <pc:sldMk cId="4063998483" sldId="262"/>
-            <ac:spMk id="6" creationId="{3649DEC4-245B-286F-F778-5C095646229F}"/>
-          </ac:spMkLst>
-        </pc:spChg>
-        <pc:spChg chg="add mod">
-          <ac:chgData name="Moraes,Marcia" userId="c9c67e8a-58e2-4733-9a1c-5d44fec4775b" providerId="ADAL" clId="{E42A6DCA-17DC-465E-AB55-C4A8A822C467}" dt="2022-08-12T19:16:05.982" v="624" actId="20577"/>
-          <ac:spMkLst>
-            <pc:docMk/>
-            <pc:sldMk cId="4063998483" sldId="262"/>
-            <ac:spMk id="7" creationId="{EB83A1F5-3902-701F-1CFB-64105A46280D}"/>
-          </ac:spMkLst>
-        </pc:spChg>
-        <pc:picChg chg="add mod">
-          <ac:chgData name="Moraes,Marcia" userId="c9c67e8a-58e2-4733-9a1c-5d44fec4775b" providerId="ADAL" clId="{E42A6DCA-17DC-465E-AB55-C4A8A822C467}" dt="2022-08-12T23:07:17.603" v="1360" actId="962"/>
-          <ac:picMkLst>
-            <pc:docMk/>
-            <pc:sldMk cId="4063998483" sldId="262"/>
-            <ac:picMk id="5" creationId="{9C65B6E3-787E-024F-D417-6E8F8DF97DF4}"/>
-          </ac:picMkLst>
-        </pc:picChg>
-      </pc:sldChg>
-      <pc:sldChg chg="addSp modSp add mod">
-        <pc:chgData name="Moraes,Marcia" userId="c9c67e8a-58e2-4733-9a1c-5d44fec4775b" providerId="ADAL" clId="{E42A6DCA-17DC-465E-AB55-C4A8A822C467}" dt="2022-08-12T19:52:11.467" v="894" actId="255"/>
-        <pc:sldMkLst>
-          <pc:docMk/>
-          <pc:sldMk cId="783670119" sldId="264"/>
-        </pc:sldMkLst>
-        <pc:spChg chg="mod">
-          <ac:chgData name="Moraes,Marcia" userId="c9c67e8a-58e2-4733-9a1c-5d44fec4775b" providerId="ADAL" clId="{E42A6DCA-17DC-465E-AB55-C4A8A822C467}" dt="2022-08-12T19:50:15.273" v="871" actId="1076"/>
-          <ac:spMkLst>
-            <pc:docMk/>
-            <pc:sldMk cId="783670119" sldId="264"/>
-            <ac:spMk id="2" creationId="{EDFD9FCD-80DE-7643-B6B7-559607D5CD6F}"/>
-          </ac:spMkLst>
-        </pc:spChg>
-        <pc:spChg chg="mod">
-          <ac:chgData name="Moraes,Marcia" userId="c9c67e8a-58e2-4733-9a1c-5d44fec4775b" providerId="ADAL" clId="{E42A6DCA-17DC-465E-AB55-C4A8A822C467}" dt="2022-08-12T19:51:05.003" v="881" actId="14100"/>
-          <ac:spMkLst>
-            <pc:docMk/>
-            <pc:sldMk cId="783670119" sldId="264"/>
-            <ac:spMk id="3" creationId="{70BDAB88-183E-384C-92FE-602F163E4B06}"/>
-          </ac:spMkLst>
-        </pc:spChg>
-        <pc:spChg chg="mod">
-          <ac:chgData name="Moraes,Marcia" userId="c9c67e8a-58e2-4733-9a1c-5d44fec4775b" providerId="ADAL" clId="{E42A6DCA-17DC-465E-AB55-C4A8A822C467}" dt="2022-08-12T19:51:38.580" v="889" actId="1076"/>
-          <ac:spMkLst>
-            <pc:docMk/>
-            <pc:sldMk cId="783670119" sldId="264"/>
-            <ac:spMk id="4" creationId="{785DF65D-37A5-4B40-93B0-4EE33B4018C6}"/>
-          </ac:spMkLst>
-        </pc:spChg>
-        <pc:spChg chg="mod">
-          <ac:chgData name="Moraes,Marcia" userId="c9c67e8a-58e2-4733-9a1c-5d44fec4775b" providerId="ADAL" clId="{E42A6DCA-17DC-465E-AB55-C4A8A822C467}" dt="2022-08-12T19:52:11.467" v="894" actId="255"/>
-          <ac:spMkLst>
-            <pc:docMk/>
-            <pc:sldMk cId="783670119" sldId="264"/>
-            <ac:spMk id="5" creationId="{7159283C-F886-4C4D-8754-7449C47F8DF5}"/>
-          </ac:spMkLst>
-        </pc:spChg>
-        <pc:spChg chg="add mod">
-          <ac:chgData name="Moraes,Marcia" userId="c9c67e8a-58e2-4733-9a1c-5d44fec4775b" providerId="ADAL" clId="{E42A6DCA-17DC-465E-AB55-C4A8A822C467}" dt="2022-08-12T19:51:43.049" v="890" actId="1076"/>
-          <ac:spMkLst>
-            <pc:docMk/>
-            <pc:sldMk cId="783670119" sldId="264"/>
-            <ac:spMk id="6" creationId="{016EDDDC-3EA4-FDF3-3BCA-36EE8C72DD40}"/>
-          </ac:spMkLst>
-        </pc:spChg>
-      </pc:sldChg>
-      <pc:sldChg chg="addSp delSp modSp mod">
-        <pc:chgData name="Moraes,Marcia" userId="c9c67e8a-58e2-4733-9a1c-5d44fec4775b" providerId="ADAL" clId="{E42A6DCA-17DC-465E-AB55-C4A8A822C467}" dt="2022-08-12T16:58:27.755" v="145" actId="1076"/>
-        <pc:sldMkLst>
-          <pc:docMk/>
-          <pc:sldMk cId="2954226462" sldId="268"/>
-        </pc:sldMkLst>
-        <pc:spChg chg="mod">
-          <ac:chgData name="Moraes,Marcia" userId="c9c67e8a-58e2-4733-9a1c-5d44fec4775b" providerId="ADAL" clId="{E42A6DCA-17DC-465E-AB55-C4A8A822C467}" dt="2022-08-12T16:56:41.829" v="141" actId="20577"/>
-          <ac:spMkLst>
-            <pc:docMk/>
-            <pc:sldMk cId="2954226462" sldId="268"/>
-            <ac:spMk id="7" creationId="{F1F79DD2-1F3F-234C-A44A-3A87D436D29A}"/>
-          </ac:spMkLst>
-        </pc:spChg>
-        <pc:picChg chg="add mod">
-          <ac:chgData name="Moraes,Marcia" userId="c9c67e8a-58e2-4733-9a1c-5d44fec4775b" providerId="ADAL" clId="{E42A6DCA-17DC-465E-AB55-C4A8A822C467}" dt="2022-08-12T16:58:27.755" v="145" actId="1076"/>
-          <ac:picMkLst>
-            <pc:docMk/>
-            <pc:sldMk cId="2954226462" sldId="268"/>
-            <ac:picMk id="1026" creationId="{438DB6CA-8E97-871F-192E-2A6E388A4690}"/>
-          </ac:picMkLst>
-        </pc:picChg>
-        <pc:picChg chg="del">
-          <ac:chgData name="Moraes,Marcia" userId="c9c67e8a-58e2-4733-9a1c-5d44fec4775b" providerId="ADAL" clId="{E42A6DCA-17DC-465E-AB55-C4A8A822C467}" dt="2022-08-12T16:58:17.019" v="142" actId="478"/>
-          <ac:picMkLst>
-            <pc:docMk/>
-            <pc:sldMk cId="2954226462" sldId="268"/>
-            <ac:picMk id="1032" creationId="{EB9ACAD2-7C2A-484F-8A5E-BB4F4E99D995}"/>
-          </ac:picMkLst>
-        </pc:picChg>
-      </pc:sldChg>
-      <pc:sldChg chg="del">
-        <pc:chgData name="Moraes,Marcia" userId="c9c67e8a-58e2-4733-9a1c-5d44fec4775b" providerId="ADAL" clId="{E42A6DCA-17DC-465E-AB55-C4A8A822C467}" dt="2022-08-12T19:55:17.892" v="898" actId="47"/>
-        <pc:sldMkLst>
-          <pc:docMk/>
-          <pc:sldMk cId="273496234" sldId="269"/>
-        </pc:sldMkLst>
-      </pc:sldChg>
-      <pc:sldChg chg="modSp add mod">
-        <pc:chgData name="Moraes,Marcia" userId="c9c67e8a-58e2-4733-9a1c-5d44fec4775b" providerId="ADAL" clId="{E42A6DCA-17DC-465E-AB55-C4A8A822C467}" dt="2022-08-12T19:55:50.131" v="905" actId="14100"/>
+      <pc:sldChg chg="modSp">
+        <pc:chgData name="Marcia Moraes" userId="c9c67e8a-58e2-4733-9a1c-5d44fec4775b" providerId="ADAL" clId="{7E275E99-0727-4705-8711-08165BC6F33D}" dt="2024-06-25T22:08:35.587" v="2607" actId="20577"/>
         <pc:sldMkLst>
           <pc:docMk/>
           <pc:sldMk cId="109925682" sldId="277"/>
         </pc:sldMkLst>
         <pc:spChg chg="mod">
-          <ac:chgData name="Moraes,Marcia" userId="c9c67e8a-58e2-4733-9a1c-5d44fec4775b" providerId="ADAL" clId="{E42A6DCA-17DC-465E-AB55-C4A8A822C467}" dt="2022-08-12T19:55:27.117" v="900" actId="1076"/>
-          <ac:spMkLst>
-            <pc:docMk/>
-            <pc:sldMk cId="109925682" sldId="277"/>
-            <ac:spMk id="2" creationId="{950898D6-D36C-544F-AF62-95730C14E0C8}"/>
-          </ac:spMkLst>
-        </pc:spChg>
-        <pc:spChg chg="mod">
-          <ac:chgData name="Moraes,Marcia" userId="c9c67e8a-58e2-4733-9a1c-5d44fec4775b" providerId="ADAL" clId="{E42A6DCA-17DC-465E-AB55-C4A8A822C467}" dt="2022-08-12T19:55:50.131" v="905" actId="14100"/>
+          <ac:chgData name="Marcia Moraes" userId="c9c67e8a-58e2-4733-9a1c-5d44fec4775b" providerId="ADAL" clId="{7E275E99-0727-4705-8711-08165BC6F33D}" dt="2024-06-25T22:08:35.587" v="2607" actId="20577"/>
           <ac:spMkLst>
             <pc:docMk/>
             <pc:sldMk cId="109925682" sldId="277"/>
@@ -545,272 +297,30 @@
           </ac:spMkLst>
         </pc:spChg>
       </pc:sldChg>
-      <pc:sldChg chg="del">
-        <pc:chgData name="Moraes,Marcia" userId="c9c67e8a-58e2-4733-9a1c-5d44fec4775b" providerId="ADAL" clId="{E42A6DCA-17DC-465E-AB55-C4A8A822C467}" dt="2022-08-12T19:55:17.892" v="898" actId="47"/>
-        <pc:sldMkLst>
-          <pc:docMk/>
-          <pc:sldMk cId="2945212090" sldId="287"/>
-        </pc:sldMkLst>
-      </pc:sldChg>
-      <pc:sldChg chg="addSp delSp modSp mod modAnim">
-        <pc:chgData name="Moraes,Marcia" userId="c9c67e8a-58e2-4733-9a1c-5d44fec4775b" providerId="ADAL" clId="{E42A6DCA-17DC-465E-AB55-C4A8A822C467}" dt="2022-08-12T23:06:11.260" v="1232" actId="962"/>
-        <pc:sldMkLst>
-          <pc:docMk/>
-          <pc:sldMk cId="1153038980" sldId="288"/>
-        </pc:sldMkLst>
-        <pc:spChg chg="mod">
-          <ac:chgData name="Moraes,Marcia" userId="c9c67e8a-58e2-4733-9a1c-5d44fec4775b" providerId="ADAL" clId="{E42A6DCA-17DC-465E-AB55-C4A8A822C467}" dt="2022-08-12T18:36:21.107" v="201" actId="20577"/>
-          <ac:spMkLst>
-            <pc:docMk/>
-            <pc:sldMk cId="1153038980" sldId="288"/>
-            <ac:spMk id="2" creationId="{7D3729BF-0D0D-AC4F-9874-B17B55D9775A}"/>
-          </ac:spMkLst>
-        </pc:spChg>
-        <pc:spChg chg="mod">
-          <ac:chgData name="Moraes,Marcia" userId="c9c67e8a-58e2-4733-9a1c-5d44fec4775b" providerId="ADAL" clId="{E42A6DCA-17DC-465E-AB55-C4A8A822C467}" dt="2022-08-12T18:54:52.561" v="448" actId="6549"/>
-          <ac:spMkLst>
-            <pc:docMk/>
-            <pc:sldMk cId="1153038980" sldId="288"/>
-            <ac:spMk id="6" creationId="{EDD94CEF-B264-46C4-892F-0565B001035C}"/>
-          </ac:spMkLst>
-        </pc:spChg>
-        <pc:spChg chg="add mod">
-          <ac:chgData name="Moraes,Marcia" userId="c9c67e8a-58e2-4733-9a1c-5d44fec4775b" providerId="ADAL" clId="{E42A6DCA-17DC-465E-AB55-C4A8A822C467}" dt="2022-08-12T18:52:34.346" v="430" actId="1076"/>
-          <ac:spMkLst>
-            <pc:docMk/>
-            <pc:sldMk cId="1153038980" sldId="288"/>
-            <ac:spMk id="8" creationId="{C8359C30-3330-55BD-E9D9-6FD41DCA4574}"/>
-          </ac:spMkLst>
-        </pc:spChg>
-        <pc:spChg chg="add mod">
-          <ac:chgData name="Moraes,Marcia" userId="c9c67e8a-58e2-4733-9a1c-5d44fec4775b" providerId="ADAL" clId="{E42A6DCA-17DC-465E-AB55-C4A8A822C467}" dt="2022-08-12T18:53:07.377" v="444" actId="255"/>
-          <ac:spMkLst>
-            <pc:docMk/>
-            <pc:sldMk cId="1153038980" sldId="288"/>
-            <ac:spMk id="9" creationId="{BBB3C585-D174-2485-DD32-295C4ED04B42}"/>
-          </ac:spMkLst>
-        </pc:spChg>
-        <pc:picChg chg="del">
-          <ac:chgData name="Moraes,Marcia" userId="c9c67e8a-58e2-4733-9a1c-5d44fec4775b" providerId="ADAL" clId="{E42A6DCA-17DC-465E-AB55-C4A8A822C467}" dt="2022-08-12T18:35:21.653" v="193" actId="478"/>
-          <ac:picMkLst>
-            <pc:docMk/>
-            <pc:sldMk cId="1153038980" sldId="288"/>
-            <ac:picMk id="4" creationId="{CCED1E14-C3F2-449C-97E3-FA15C761422B}"/>
-          </ac:picMkLst>
-        </pc:picChg>
-        <pc:picChg chg="add mod">
-          <ac:chgData name="Moraes,Marcia" userId="c9c67e8a-58e2-4733-9a1c-5d44fec4775b" providerId="ADAL" clId="{E42A6DCA-17DC-465E-AB55-C4A8A822C467}" dt="2022-08-12T23:06:11.260" v="1232" actId="962"/>
-          <ac:picMkLst>
-            <pc:docMk/>
-            <pc:sldMk cId="1153038980" sldId="288"/>
-            <ac:picMk id="5" creationId="{B2B7A81E-EF65-D674-B033-4CA87C852A3B}"/>
-          </ac:picMkLst>
-        </pc:picChg>
-      </pc:sldChg>
-      <pc:sldChg chg="del">
-        <pc:chgData name="Moraes,Marcia" userId="c9c67e8a-58e2-4733-9a1c-5d44fec4775b" providerId="ADAL" clId="{E42A6DCA-17DC-465E-AB55-C4A8A822C467}" dt="2022-08-12T19:55:17.892" v="898" actId="47"/>
-        <pc:sldMkLst>
-          <pc:docMk/>
-          <pc:sldMk cId="2458664928" sldId="289"/>
-        </pc:sldMkLst>
-      </pc:sldChg>
-      <pc:sldChg chg="del">
-        <pc:chgData name="Moraes,Marcia" userId="c9c67e8a-58e2-4733-9a1c-5d44fec4775b" providerId="ADAL" clId="{E42A6DCA-17DC-465E-AB55-C4A8A822C467}" dt="2022-08-12T19:55:17.892" v="898" actId="47"/>
-        <pc:sldMkLst>
-          <pc:docMk/>
-          <pc:sldMk cId="1884779873" sldId="291"/>
-        </pc:sldMkLst>
-      </pc:sldChg>
-      <pc:sldChg chg="del">
-        <pc:chgData name="Moraes,Marcia" userId="c9c67e8a-58e2-4733-9a1c-5d44fec4775b" providerId="ADAL" clId="{E42A6DCA-17DC-465E-AB55-C4A8A822C467}" dt="2022-08-12T19:55:17.892" v="898" actId="47"/>
-        <pc:sldMkLst>
-          <pc:docMk/>
-          <pc:sldMk cId="1549212594" sldId="292"/>
-        </pc:sldMkLst>
-      </pc:sldChg>
-      <pc:sldChg chg="del">
-        <pc:chgData name="Moraes,Marcia" userId="c9c67e8a-58e2-4733-9a1c-5d44fec4775b" providerId="ADAL" clId="{E42A6DCA-17DC-465E-AB55-C4A8A822C467}" dt="2022-08-12T19:55:17.892" v="898" actId="47"/>
-        <pc:sldMkLst>
-          <pc:docMk/>
-          <pc:sldMk cId="850946478" sldId="293"/>
-        </pc:sldMkLst>
-      </pc:sldChg>
-      <pc:sldChg chg="del">
-        <pc:chgData name="Moraes,Marcia" userId="c9c67e8a-58e2-4733-9a1c-5d44fec4775b" providerId="ADAL" clId="{E42A6DCA-17DC-465E-AB55-C4A8A822C467}" dt="2022-08-12T19:55:17.892" v="898" actId="47"/>
-        <pc:sldMkLst>
-          <pc:docMk/>
-          <pc:sldMk cId="4141995405" sldId="294"/>
-        </pc:sldMkLst>
-      </pc:sldChg>
-      <pc:sldChg chg="del">
-        <pc:chgData name="Moraes,Marcia" userId="c9c67e8a-58e2-4733-9a1c-5d44fec4775b" providerId="ADAL" clId="{E42A6DCA-17DC-465E-AB55-C4A8A822C467}" dt="2022-08-12T19:55:17.892" v="898" actId="47"/>
-        <pc:sldMkLst>
-          <pc:docMk/>
-          <pc:sldMk cId="544147356" sldId="295"/>
-        </pc:sldMkLst>
-      </pc:sldChg>
-      <pc:sldChg chg="del">
-        <pc:chgData name="Moraes,Marcia" userId="c9c67e8a-58e2-4733-9a1c-5d44fec4775b" providerId="ADAL" clId="{E42A6DCA-17DC-465E-AB55-C4A8A822C467}" dt="2022-08-12T19:55:17.892" v="898" actId="47"/>
-        <pc:sldMkLst>
-          <pc:docMk/>
-          <pc:sldMk cId="1860969480" sldId="296"/>
-        </pc:sldMkLst>
-      </pc:sldChg>
-      <pc:sldChg chg="del">
-        <pc:chgData name="Moraes,Marcia" userId="c9c67e8a-58e2-4733-9a1c-5d44fec4775b" providerId="ADAL" clId="{E42A6DCA-17DC-465E-AB55-C4A8A822C467}" dt="2022-08-12T19:55:17.892" v="898" actId="47"/>
-        <pc:sldMkLst>
-          <pc:docMk/>
-          <pc:sldMk cId="2196037305" sldId="297"/>
-        </pc:sldMkLst>
-      </pc:sldChg>
-      <pc:sldChg chg="del">
-        <pc:chgData name="Moraes,Marcia" userId="c9c67e8a-58e2-4733-9a1c-5d44fec4775b" providerId="ADAL" clId="{E42A6DCA-17DC-465E-AB55-C4A8A822C467}" dt="2022-08-12T19:55:17.892" v="898" actId="47"/>
-        <pc:sldMkLst>
-          <pc:docMk/>
-          <pc:sldMk cId="1392825432" sldId="298"/>
-        </pc:sldMkLst>
-      </pc:sldChg>
-      <pc:sldChg chg="del">
-        <pc:chgData name="Moraes,Marcia" userId="c9c67e8a-58e2-4733-9a1c-5d44fec4775b" providerId="ADAL" clId="{E42A6DCA-17DC-465E-AB55-C4A8A822C467}" dt="2022-08-12T19:55:17.892" v="898" actId="47"/>
-        <pc:sldMkLst>
-          <pc:docMk/>
-          <pc:sldMk cId="1195316893" sldId="299"/>
-        </pc:sldMkLst>
-      </pc:sldChg>
-      <pc:sldChg chg="modSp add mod">
-        <pc:chgData name="Moraes,Marcia" userId="c9c67e8a-58e2-4733-9a1c-5d44fec4775b" providerId="ADAL" clId="{E42A6DCA-17DC-465E-AB55-C4A8A822C467}" dt="2022-08-12T17:01:08.773" v="175" actId="20577"/>
-        <pc:sldMkLst>
-          <pc:docMk/>
-          <pc:sldMk cId="1516065815" sldId="300"/>
-        </pc:sldMkLst>
-        <pc:spChg chg="mod">
-          <ac:chgData name="Moraes,Marcia" userId="c9c67e8a-58e2-4733-9a1c-5d44fec4775b" providerId="ADAL" clId="{E42A6DCA-17DC-465E-AB55-C4A8A822C467}" dt="2022-08-12T17:01:08.773" v="175" actId="20577"/>
-          <ac:spMkLst>
-            <pc:docMk/>
-            <pc:sldMk cId="1516065815" sldId="300"/>
-            <ac:spMk id="223" creationId="{00000000-0000-0000-0000-000000000000}"/>
-          </ac:spMkLst>
-        </pc:spChg>
-      </pc:sldChg>
-      <pc:sldChg chg="addSp delSp modSp add mod delAnim modAnim">
-        <pc:chgData name="Moraes,Marcia" userId="c9c67e8a-58e2-4733-9a1c-5d44fec4775b" providerId="ADAL" clId="{E42A6DCA-17DC-465E-AB55-C4A8A822C467}" dt="2022-08-12T23:10:24.381" v="2025" actId="14100"/>
-        <pc:sldMkLst>
-          <pc:docMk/>
-          <pc:sldMk cId="248355381" sldId="301"/>
-        </pc:sldMkLst>
-        <pc:spChg chg="mod">
-          <ac:chgData name="Moraes,Marcia" userId="c9c67e8a-58e2-4733-9a1c-5d44fec4775b" providerId="ADAL" clId="{E42A6DCA-17DC-465E-AB55-C4A8A822C467}" dt="2022-08-12T23:10:24.381" v="2025" actId="14100"/>
-          <ac:spMkLst>
-            <pc:docMk/>
-            <pc:sldMk cId="248355381" sldId="301"/>
-            <ac:spMk id="2" creationId="{CA19BA98-269C-AE43-9819-F21FFB060478}"/>
-          </ac:spMkLst>
-        </pc:spChg>
-        <pc:spChg chg="del">
-          <ac:chgData name="Moraes,Marcia" userId="c9c67e8a-58e2-4733-9a1c-5d44fec4775b" providerId="ADAL" clId="{E42A6DCA-17DC-465E-AB55-C4A8A822C467}" dt="2022-08-12T19:16:24.617" v="626" actId="478"/>
-          <ac:spMkLst>
-            <pc:docMk/>
-            <pc:sldMk cId="248355381" sldId="301"/>
-            <ac:spMk id="3" creationId="{A8AA4F03-0252-5341-8D26-53B7A8D60662}"/>
-          </ac:spMkLst>
-        </pc:spChg>
-        <pc:spChg chg="del">
-          <ac:chgData name="Moraes,Marcia" userId="c9c67e8a-58e2-4733-9a1c-5d44fec4775b" providerId="ADAL" clId="{E42A6DCA-17DC-465E-AB55-C4A8A822C467}" dt="2022-08-12T19:16:26.538" v="627" actId="478"/>
-          <ac:spMkLst>
-            <pc:docMk/>
-            <pc:sldMk cId="248355381" sldId="301"/>
-            <ac:spMk id="6" creationId="{3649DEC4-245B-286F-F778-5C095646229F}"/>
-          </ac:spMkLst>
-        </pc:spChg>
-        <pc:spChg chg="del">
-          <ac:chgData name="Moraes,Marcia" userId="c9c67e8a-58e2-4733-9a1c-5d44fec4775b" providerId="ADAL" clId="{E42A6DCA-17DC-465E-AB55-C4A8A822C467}" dt="2022-08-12T19:16:27.574" v="628" actId="478"/>
-          <ac:spMkLst>
-            <pc:docMk/>
-            <pc:sldMk cId="248355381" sldId="301"/>
-            <ac:spMk id="7" creationId="{EB83A1F5-3902-701F-1CFB-64105A46280D}"/>
-          </ac:spMkLst>
-        </pc:spChg>
-        <pc:spChg chg="add del mod">
-          <ac:chgData name="Moraes,Marcia" userId="c9c67e8a-58e2-4733-9a1c-5d44fec4775b" providerId="ADAL" clId="{E42A6DCA-17DC-465E-AB55-C4A8A822C467}" dt="2022-08-12T19:20:29.775" v="629" actId="478"/>
-          <ac:spMkLst>
-            <pc:docMk/>
-            <pc:sldMk cId="248355381" sldId="301"/>
-            <ac:spMk id="8" creationId="{D3B956D0-091D-70F8-82EC-EAF3F67D6AA3}"/>
-          </ac:spMkLst>
-        </pc:spChg>
-        <pc:spChg chg="add mod">
-          <ac:chgData name="Moraes,Marcia" userId="c9c67e8a-58e2-4733-9a1c-5d44fec4775b" providerId="ADAL" clId="{E42A6DCA-17DC-465E-AB55-C4A8A822C467}" dt="2022-08-12T19:23:31.858" v="710" actId="1076"/>
-          <ac:spMkLst>
-            <pc:docMk/>
-            <pc:sldMk cId="248355381" sldId="301"/>
-            <ac:spMk id="11" creationId="{DE32ABC8-29EF-D900-8332-B1F121DB3795}"/>
-          </ac:spMkLst>
-        </pc:spChg>
-        <pc:spChg chg="add mod">
-          <ac:chgData name="Moraes,Marcia" userId="c9c67e8a-58e2-4733-9a1c-5d44fec4775b" providerId="ADAL" clId="{E42A6DCA-17DC-465E-AB55-C4A8A822C467}" dt="2022-08-12T19:34:15.794" v="786" actId="20577"/>
-          <ac:spMkLst>
-            <pc:docMk/>
-            <pc:sldMk cId="248355381" sldId="301"/>
-            <ac:spMk id="14" creationId="{3FBE1A43-290B-5E14-A198-C97DD4962631}"/>
-          </ac:spMkLst>
-        </pc:spChg>
-        <pc:picChg chg="mod">
-          <ac:chgData name="Moraes,Marcia" userId="c9c67e8a-58e2-4733-9a1c-5d44fec4775b" providerId="ADAL" clId="{E42A6DCA-17DC-465E-AB55-C4A8A822C467}" dt="2022-08-12T23:07:50.324" v="1488" actId="962"/>
-          <ac:picMkLst>
-            <pc:docMk/>
-            <pc:sldMk cId="248355381" sldId="301"/>
-            <ac:picMk id="5" creationId="{9C65B6E3-787E-024F-D417-6E8F8DF97DF4}"/>
-          </ac:picMkLst>
-        </pc:picChg>
-        <pc:picChg chg="add mod">
-          <ac:chgData name="Moraes,Marcia" userId="c9c67e8a-58e2-4733-9a1c-5d44fec4775b" providerId="ADAL" clId="{E42A6DCA-17DC-465E-AB55-C4A8A822C467}" dt="2022-08-12T23:08:28.319" v="1552" actId="962"/>
-          <ac:picMkLst>
-            <pc:docMk/>
-            <pc:sldMk cId="248355381" sldId="301"/>
-            <ac:picMk id="10" creationId="{CF33E45D-4392-DB00-3152-9FB9CCA18DD5}"/>
-          </ac:picMkLst>
-        </pc:picChg>
-        <pc:picChg chg="add mod">
-          <ac:chgData name="Moraes,Marcia" userId="c9c67e8a-58e2-4733-9a1c-5d44fec4775b" providerId="ADAL" clId="{E42A6DCA-17DC-465E-AB55-C4A8A822C467}" dt="2022-08-12T23:08:53.969" v="1648" actId="962"/>
-          <ac:picMkLst>
-            <pc:docMk/>
-            <pc:sldMk cId="248355381" sldId="301"/>
-            <ac:picMk id="13" creationId="{F432B77C-8C1B-A3AC-354A-1700609BCD44}"/>
-          </ac:picMkLst>
-        </pc:picChg>
-      </pc:sldChg>
-      <pc:sldChg chg="addSp delSp modSp add mod">
-        <pc:chgData name="Moraes,Marcia" userId="c9c67e8a-58e2-4733-9a1c-5d44fec4775b" providerId="ADAL" clId="{E42A6DCA-17DC-465E-AB55-C4A8A822C467}" dt="2022-08-12T23:09:47.645" v="1916" actId="962"/>
+      <pc:sldChg chg="modSp ord">
+        <pc:chgData name="Marcia Moraes" userId="c9c67e8a-58e2-4733-9a1c-5d44fec4775b" providerId="ADAL" clId="{7E275E99-0727-4705-8711-08165BC6F33D}" dt="2024-06-25T22:10:27.988" v="2672" actId="14100"/>
         <pc:sldMkLst>
           <pc:docMk/>
           <pc:sldMk cId="1374678047" sldId="302"/>
         </pc:sldMkLst>
-        <pc:spChg chg="add mod">
-          <ac:chgData name="Moraes,Marcia" userId="c9c67e8a-58e2-4733-9a1c-5d44fec4775b" providerId="ADAL" clId="{E42A6DCA-17DC-465E-AB55-C4A8A822C467}" dt="2022-08-12T22:57:27.552" v="1097" actId="1076"/>
+        <pc:spChg chg="mod">
+          <ac:chgData name="Marcia Moraes" userId="c9c67e8a-58e2-4733-9a1c-5d44fec4775b" providerId="ADAL" clId="{7E275E99-0727-4705-8711-08165BC6F33D}" dt="2024-06-25T22:10:23.350" v="2670" actId="14100"/>
           <ac:spMkLst>
             <pc:docMk/>
             <pc:sldMk cId="1374678047" sldId="302"/>
             <ac:spMk id="3" creationId="{7C44DA07-9D4C-F347-518D-80DC6702641D}"/>
           </ac:spMkLst>
         </pc:spChg>
-        <pc:spChg chg="del">
-          <ac:chgData name="Moraes,Marcia" userId="c9c67e8a-58e2-4733-9a1c-5d44fec4775b" providerId="ADAL" clId="{E42A6DCA-17DC-465E-AB55-C4A8A822C467}" dt="2022-08-12T20:01:30.044" v="933" actId="478"/>
-          <ac:spMkLst>
-            <pc:docMk/>
-            <pc:sldMk cId="1374678047" sldId="302"/>
-            <ac:spMk id="6" creationId="{BBA84413-A189-4E45-8BC1-0BAF8D04460A}"/>
-          </ac:spMkLst>
-        </pc:spChg>
         <pc:spChg chg="mod">
-          <ac:chgData name="Moraes,Marcia" userId="c9c67e8a-58e2-4733-9a1c-5d44fec4775b" providerId="ADAL" clId="{E42A6DCA-17DC-465E-AB55-C4A8A822C467}" dt="2022-08-12T22:57:22.152" v="1096" actId="1076"/>
+          <ac:chgData name="Marcia Moraes" userId="c9c67e8a-58e2-4733-9a1c-5d44fec4775b" providerId="ADAL" clId="{7E275E99-0727-4705-8711-08165BC6F33D}" dt="2024-06-25T22:10:27.988" v="2672" actId="14100"/>
           <ac:spMkLst>
             <pc:docMk/>
             <pc:sldMk cId="1374678047" sldId="302"/>
             <ac:spMk id="192" creationId="{00000000-0000-0000-0000-000000000000}"/>
           </ac:spMkLst>
         </pc:spChg>
-        <pc:picChg chg="add mod">
-          <ac:chgData name="Moraes,Marcia" userId="c9c67e8a-58e2-4733-9a1c-5d44fec4775b" providerId="ADAL" clId="{E42A6DCA-17DC-465E-AB55-C4A8A822C467}" dt="2022-08-12T23:09:47.645" v="1916" actId="962"/>
+        <pc:picChg chg="mod">
+          <ac:chgData name="Marcia Moraes" userId="c9c67e8a-58e2-4733-9a1c-5d44fec4775b" providerId="ADAL" clId="{7E275E99-0727-4705-8711-08165BC6F33D}" dt="2024-06-25T22:10:24.533" v="2671" actId="1076"/>
           <ac:picMkLst>
             <pc:docMk/>
             <pc:sldMk cId="1374678047" sldId="302"/>
@@ -818,120 +328,65 @@
           </ac:picMkLst>
         </pc:picChg>
       </pc:sldChg>
-      <pc:sldChg chg="addSp delSp modSp add del mod delAnim modAnim">
-        <pc:chgData name="Moraes,Marcia" userId="c9c67e8a-58e2-4733-9a1c-5d44fec4775b" providerId="ADAL" clId="{E42A6DCA-17DC-465E-AB55-C4A8A822C467}" dt="2022-08-12T19:54:26.354" v="895" actId="47"/>
-        <pc:sldMkLst>
-          <pc:docMk/>
-          <pc:sldMk cId="1386455241" sldId="302"/>
-        </pc:sldMkLst>
-        <pc:spChg chg="add mod">
-          <ac:chgData name="Moraes,Marcia" userId="c9c67e8a-58e2-4733-9a1c-5d44fec4775b" providerId="ADAL" clId="{E42A6DCA-17DC-465E-AB55-C4A8A822C467}" dt="2022-08-12T19:41:25.067" v="846" actId="20577"/>
-          <ac:spMkLst>
-            <pc:docMk/>
-            <pc:sldMk cId="1386455241" sldId="302"/>
-            <ac:spMk id="6" creationId="{FDD05A58-AB75-58B8-D689-75A91E6F218C}"/>
-          </ac:spMkLst>
-        </pc:spChg>
-        <pc:spChg chg="del mod">
-          <ac:chgData name="Moraes,Marcia" userId="c9c67e8a-58e2-4733-9a1c-5d44fec4775b" providerId="ADAL" clId="{E42A6DCA-17DC-465E-AB55-C4A8A822C467}" dt="2022-08-12T19:39:56.349" v="791" actId="478"/>
-          <ac:spMkLst>
-            <pc:docMk/>
-            <pc:sldMk cId="1386455241" sldId="302"/>
-            <ac:spMk id="11" creationId="{DE32ABC8-29EF-D900-8332-B1F121DB3795}"/>
-          </ac:spMkLst>
-        </pc:spChg>
-        <pc:spChg chg="del">
-          <ac:chgData name="Moraes,Marcia" userId="c9c67e8a-58e2-4733-9a1c-5d44fec4775b" providerId="ADAL" clId="{E42A6DCA-17DC-465E-AB55-C4A8A822C467}" dt="2022-08-12T19:39:57.672" v="792" actId="478"/>
-          <ac:spMkLst>
-            <pc:docMk/>
-            <pc:sldMk cId="1386455241" sldId="302"/>
-            <ac:spMk id="14" creationId="{3FBE1A43-290B-5E14-A198-C97DD4962631}"/>
-          </ac:spMkLst>
-        </pc:spChg>
-        <pc:picChg chg="add mod">
-          <ac:chgData name="Moraes,Marcia" userId="c9c67e8a-58e2-4733-9a1c-5d44fec4775b" providerId="ADAL" clId="{E42A6DCA-17DC-465E-AB55-C4A8A822C467}" dt="2022-08-12T19:40:59.769" v="798" actId="1076"/>
-          <ac:picMkLst>
-            <pc:docMk/>
-            <pc:sldMk cId="1386455241" sldId="302"/>
-            <ac:picMk id="4" creationId="{9F575081-DA22-5A24-2D08-4641BF12C4AD}"/>
-          </ac:picMkLst>
-        </pc:picChg>
-        <pc:picChg chg="del">
-          <ac:chgData name="Moraes,Marcia" userId="c9c67e8a-58e2-4733-9a1c-5d44fec4775b" providerId="ADAL" clId="{E42A6DCA-17DC-465E-AB55-C4A8A822C467}" dt="2022-08-12T19:39:54.037" v="788" actId="478"/>
-          <ac:picMkLst>
-            <pc:docMk/>
-            <pc:sldMk cId="1386455241" sldId="302"/>
-            <ac:picMk id="10" creationId="{CF33E45D-4392-DB00-3152-9FB9CCA18DD5}"/>
-          </ac:picMkLst>
-        </pc:picChg>
-        <pc:picChg chg="del">
-          <ac:chgData name="Moraes,Marcia" userId="c9c67e8a-58e2-4733-9a1c-5d44fec4775b" providerId="ADAL" clId="{E42A6DCA-17DC-465E-AB55-C4A8A822C467}" dt="2022-08-12T19:39:54.675" v="789" actId="478"/>
-          <ac:picMkLst>
-            <pc:docMk/>
-            <pc:sldMk cId="1386455241" sldId="302"/>
-            <ac:picMk id="13" creationId="{F432B77C-8C1B-A3AC-354A-1700609BCD44}"/>
-          </ac:picMkLst>
-        </pc:picChg>
-      </pc:sldChg>
-      <pc:sldChg chg="addSp delSp modSp add mod">
-        <pc:chgData name="Moraes,Marcia" userId="c9c67e8a-58e2-4733-9a1c-5d44fec4775b" providerId="ADAL" clId="{E42A6DCA-17DC-465E-AB55-C4A8A822C467}" dt="2022-08-12T23:10:13.088" v="2024" actId="962"/>
+      <pc:sldChg chg="modSp ord">
+        <pc:chgData name="Marcia Moraes" userId="c9c67e8a-58e2-4733-9a1c-5d44fec4775b" providerId="ADAL" clId="{7E275E99-0727-4705-8711-08165BC6F33D}" dt="2024-06-25T22:11:11.528" v="2711" actId="20577"/>
         <pc:sldMkLst>
           <pc:docMk/>
           <pc:sldMk cId="2341990793" sldId="303"/>
         </pc:sldMkLst>
         <pc:spChg chg="mod">
-          <ac:chgData name="Moraes,Marcia" userId="c9c67e8a-58e2-4733-9a1c-5d44fec4775b" providerId="ADAL" clId="{E42A6DCA-17DC-465E-AB55-C4A8A822C467}" dt="2022-08-12T23:04:05.762" v="1198" actId="20577"/>
+          <ac:chgData name="Marcia Moraes" userId="c9c67e8a-58e2-4733-9a1c-5d44fec4775b" providerId="ADAL" clId="{7E275E99-0727-4705-8711-08165BC6F33D}" dt="2024-06-25T22:11:11.528" v="2711" actId="20577"/>
           <ac:spMkLst>
             <pc:docMk/>
             <pc:sldMk cId="2341990793" sldId="303"/>
-            <ac:spMk id="3" creationId="{7C44DA07-9D4C-F347-518D-80DC6702641D}"/>
+            <ac:spMk id="192" creationId="{00000000-0000-0000-0000-000000000000}"/>
           </ac:spMkLst>
         </pc:spChg>
-        <pc:picChg chg="add mod">
-          <ac:chgData name="Moraes,Marcia" userId="c9c67e8a-58e2-4733-9a1c-5d44fec4775b" providerId="ADAL" clId="{E42A6DCA-17DC-465E-AB55-C4A8A822C467}" dt="2022-08-12T23:10:13.088" v="2024" actId="962"/>
+      </pc:sldChg>
+      <pc:sldChg chg="addSp delSp modSp modNotesTx">
+        <pc:chgData name="Marcia Moraes" userId="c9c67e8a-58e2-4733-9a1c-5d44fec4775b" providerId="ADAL" clId="{7E275E99-0727-4705-8711-08165BC6F33D}" dt="2024-06-25T22:05:31.483" v="2500" actId="20577"/>
+        <pc:sldMkLst>
+          <pc:docMk/>
+          <pc:sldMk cId="4248284535" sldId="305"/>
+        </pc:sldMkLst>
+        <pc:spChg chg="mod">
+          <ac:chgData name="Marcia Moraes" userId="c9c67e8a-58e2-4733-9a1c-5d44fec4775b" providerId="ADAL" clId="{7E275E99-0727-4705-8711-08165BC6F33D}" dt="2024-06-25T20:08:30.471" v="48" actId="6549"/>
+          <ac:spMkLst>
+            <pc:docMk/>
+            <pc:sldMk cId="4248284535" sldId="305"/>
+            <ac:spMk id="3" creationId="{70BDAB88-183E-384C-92FE-602F163E4B06}"/>
+          </ac:spMkLst>
+        </pc:spChg>
+        <pc:picChg chg="add del mod">
+          <ac:chgData name="Marcia Moraes" userId="c9c67e8a-58e2-4733-9a1c-5d44fec4775b" providerId="ADAL" clId="{7E275E99-0727-4705-8711-08165BC6F33D}" dt="2024-06-25T20:10:28.536" v="52" actId="478"/>
           <ac:picMkLst>
             <pc:docMk/>
-            <pc:sldMk cId="2341990793" sldId="303"/>
-            <ac:picMk id="4" creationId="{919A1807-55BC-2C57-5BEF-24A541558458}"/>
+            <pc:sldMk cId="4248284535" sldId="305"/>
+            <ac:picMk id="4" creationId="{03E3C1DF-16FF-4486-AC7F-A929E51F1A76}"/>
           </ac:picMkLst>
         </pc:picChg>
-        <pc:picChg chg="del">
-          <ac:chgData name="Moraes,Marcia" userId="c9c67e8a-58e2-4733-9a1c-5d44fec4775b" providerId="ADAL" clId="{E42A6DCA-17DC-465E-AB55-C4A8A822C467}" dt="2022-08-12T23:02:55.380" v="1119" actId="478"/>
+        <pc:picChg chg="add del">
+          <ac:chgData name="Marcia Moraes" userId="c9c67e8a-58e2-4733-9a1c-5d44fec4775b" providerId="ADAL" clId="{7E275E99-0727-4705-8711-08165BC6F33D}" dt="2024-06-25T20:10:31.767" v="54" actId="478"/>
           <ac:picMkLst>
             <pc:docMk/>
-            <pc:sldMk cId="2341990793" sldId="303"/>
-            <ac:picMk id="5" creationId="{6C222CAE-E9E6-954D-7203-62B0CD5CF910}"/>
-          </ac:picMkLst>
-        </pc:picChg>
-      </pc:sldChg>
-      <pc:sldChg chg="addSp delSp modSp add del mod delAnim">
-        <pc:chgData name="Moraes,Marcia" userId="c9c67e8a-58e2-4733-9a1c-5d44fec4775b" providerId="ADAL" clId="{E42A6DCA-17DC-465E-AB55-C4A8A822C467}" dt="2022-08-12T19:54:32.560" v="896" actId="47"/>
-        <pc:sldMkLst>
-          <pc:docMk/>
-          <pc:sldMk cId="2763495687" sldId="303"/>
-        </pc:sldMkLst>
-        <pc:spChg chg="del">
-          <ac:chgData name="Moraes,Marcia" userId="c9c67e8a-58e2-4733-9a1c-5d44fec4775b" providerId="ADAL" clId="{E42A6DCA-17DC-465E-AB55-C4A8A822C467}" dt="2022-08-12T19:46:30.198" v="848" actId="478"/>
-          <ac:spMkLst>
-            <pc:docMk/>
-            <pc:sldMk cId="2763495687" sldId="303"/>
-            <ac:spMk id="6" creationId="{FDD05A58-AB75-58B8-D689-75A91E6F218C}"/>
-          </ac:spMkLst>
-        </pc:spChg>
-        <pc:picChg chg="del">
-          <ac:chgData name="Moraes,Marcia" userId="c9c67e8a-58e2-4733-9a1c-5d44fec4775b" providerId="ADAL" clId="{E42A6DCA-17DC-465E-AB55-C4A8A822C467}" dt="2022-08-12T19:46:30.857" v="849" actId="478"/>
-          <ac:picMkLst>
-            <pc:docMk/>
-            <pc:sldMk cId="2763495687" sldId="303"/>
-            <ac:picMk id="4" creationId="{9F575081-DA22-5A24-2D08-4641BF12C4AD}"/>
+            <pc:sldMk cId="4248284535" sldId="305"/>
+            <ac:picMk id="5" creationId="{609EDBC9-E8F7-488E-8A26-1D5DFF352404}"/>
           </ac:picMkLst>
         </pc:picChg>
         <pc:picChg chg="add mod">
-          <ac:chgData name="Moraes,Marcia" userId="c9c67e8a-58e2-4733-9a1c-5d44fec4775b" providerId="ADAL" clId="{E42A6DCA-17DC-465E-AB55-C4A8A822C467}" dt="2022-08-12T19:46:36.812" v="852" actId="1076"/>
+          <ac:chgData name="Marcia Moraes" userId="c9c67e8a-58e2-4733-9a1c-5d44fec4775b" providerId="ADAL" clId="{7E275E99-0727-4705-8711-08165BC6F33D}" dt="2024-06-25T20:12:07.089" v="65" actId="14100"/>
           <ac:picMkLst>
             <pc:docMk/>
-            <pc:sldMk cId="2763495687" sldId="303"/>
-            <ac:picMk id="7" creationId="{FA0541EB-9D0A-49E0-77A6-355C7119E838}"/>
+            <pc:sldMk cId="4248284535" sldId="305"/>
+            <ac:picMk id="6" creationId="{A599CDBC-7A27-4275-8175-D8782301F827}"/>
+          </ac:picMkLst>
+        </pc:picChg>
+        <pc:picChg chg="add mod">
+          <ac:chgData name="Marcia Moraes" userId="c9c67e8a-58e2-4733-9a1c-5d44fec4775b" providerId="ADAL" clId="{7E275E99-0727-4705-8711-08165BC6F33D}" dt="2024-06-25T20:12:03.042" v="64" actId="1076"/>
+          <ac:picMkLst>
+            <pc:docMk/>
+            <pc:sldMk cId="4248284535" sldId="305"/>
+            <ac:picMk id="7" creationId="{5EA1B788-DB3E-4431-990D-6AA0B8D650EB}"/>
           </ac:picMkLst>
         </pc:picChg>
       </pc:sldChg>
@@ -1485,7 +940,7 @@
 </p:notes>
 </file>
 
-<file path=ppt/notesSlides/notesSlide2.xml><?xml version="1.0" encoding="utf-8"?>
+<file path=ppt/notesSlides/notesSlide10.xml><?xml version="1.0" encoding="utf-8"?>
 <p:notes xmlns:a="http://schemas.openxmlformats.org/drawingml/2006/main" xmlns:r="http://schemas.openxmlformats.org/officeDocument/2006/relationships" xmlns:p="http://schemas.openxmlformats.org/presentationml/2006/main" showMasterSp="0" showMasterPhAnim="0">
   <p:cSld>
     <p:spTree>
@@ -1577,11 +1032,118 @@
               </a:spcAft>
               <a:buNone/>
             </a:pPr>
+            <a:r>
+              <a:rPr lang="en-US" b="0" i="0" dirty="0">
+                <a:solidFill>
+                  <a:srgbClr val="37474F"/>
+                </a:solidFill>
+                <a:effectLst/>
+                <a:latin typeface="Roboto" panose="02000000000000000000" pitchFamily="2" charset="0"/>
+              </a:rPr>
+              <a:t>Programs are typically written using </a:t>
+            </a:r>
+            <a:r>
+              <a:rPr lang="en-US" b="1" i="1" u="none" strike="noStrike" dirty="0">
+                <a:solidFill>
+                  <a:srgbClr val="000000"/>
+                </a:solidFill>
+                <a:effectLst/>
+                <a:latin typeface="Roboto" panose="02000000000000000000" pitchFamily="2" charset="0"/>
+              </a:rPr>
+              <a:t>incremental development</a:t>
+            </a:r>
+            <a:r>
+              <a:rPr lang="en-US" b="0" i="0" dirty="0">
+                <a:solidFill>
+                  <a:srgbClr val="37474F"/>
+                </a:solidFill>
+                <a:effectLst/>
+                <a:latin typeface="Roboto" panose="02000000000000000000" pitchFamily="2" charset="0"/>
+              </a:rPr>
+              <a:t>, meaning a small amount of code is written and tested, then a small amount more (an incremental amount) is written and tested, and so on.</a:t>
+            </a:r>
+          </a:p>
+          <a:p>
+            <a:pPr marL="0" lvl="0" indent="0" algn="l" rtl="0">
+              <a:spcBef>
+                <a:spcPts val="0"/>
+              </a:spcBef>
+              <a:spcAft>
+                <a:spcPts val="0"/>
+              </a:spcAft>
+              <a:buNone/>
+            </a:pPr>
+            <a:r>
+              <a:rPr lang="en-US" b="0" i="0" dirty="0">
+                <a:solidFill>
+                  <a:srgbClr val="37474F"/>
+                </a:solidFill>
+                <a:effectLst/>
+                <a:latin typeface="Roboto" panose="02000000000000000000" pitchFamily="2" charset="0"/>
+              </a:rPr>
+              <a:t>To assist with the incremental development process, programmers commonly introduce </a:t>
+            </a:r>
+            <a:r>
+              <a:rPr lang="en-US" b="1" i="1" u="none" strike="noStrike" dirty="0">
+                <a:solidFill>
+                  <a:srgbClr val="000000"/>
+                </a:solidFill>
+                <a:effectLst/>
+                <a:latin typeface="Roboto" panose="02000000000000000000" pitchFamily="2" charset="0"/>
+              </a:rPr>
+              <a:t>function stubs</a:t>
+            </a:r>
+            <a:r>
+              <a:rPr lang="en-US" b="0" i="0" dirty="0">
+                <a:solidFill>
+                  <a:srgbClr val="37474F"/>
+                </a:solidFill>
+                <a:effectLst/>
+                <a:latin typeface="Roboto" panose="02000000000000000000" pitchFamily="2" charset="0"/>
+              </a:rPr>
+              <a:t>, which are function definitions whose statements haven't been written yet.</a:t>
+            </a:r>
+          </a:p>
+          <a:p>
+            <a:pPr marL="0" lvl="0" indent="0" algn="l" rtl="0">
+              <a:spcBef>
+                <a:spcPts val="0"/>
+              </a:spcBef>
+              <a:spcAft>
+                <a:spcPts val="0"/>
+              </a:spcAft>
+              <a:buNone/>
+            </a:pPr>
+            <a:r>
+              <a:rPr lang="en-US" b="1" i="1" u="none" strike="noStrike" dirty="0">
+                <a:solidFill>
+                  <a:srgbClr val="000000"/>
+                </a:solidFill>
+                <a:effectLst/>
+                <a:latin typeface="Roboto" panose="02000000000000000000" pitchFamily="2" charset="0"/>
+              </a:rPr>
+              <a:t>pass</a:t>
+            </a:r>
+            <a:r>
+              <a:rPr lang="en-US" b="0" i="0" dirty="0">
+                <a:solidFill>
+                  <a:srgbClr val="37474F"/>
+                </a:solidFill>
+                <a:effectLst/>
+                <a:latin typeface="Roboto" panose="02000000000000000000" pitchFamily="2" charset="0"/>
+              </a:rPr>
+              <a:t> keyword, which performs no operation except to act as a placeholder for a required statement.</a:t>
+            </a:r>
             <a:endParaRPr dirty="0"/>
           </a:p>
         </p:txBody>
       </p:sp>
     </p:spTree>
+    <p:extLst>
+      <p:ext uri="{BB962C8B-B14F-4D97-AF65-F5344CB8AC3E}">
+        <p14:creationId xmlns:p14="http://schemas.microsoft.com/office/powerpoint/2010/main" val="3052057332"/>
+      </p:ext>
+    </p:extLst>
   </p:cSld>
   <p:clrMapOvr>
     <a:masterClrMapping/>
@@ -1589,7 +1151,227 @@
 </p:notes>
 </file>
 
-<file path=ppt/notesSlides/notesSlide3.xml><?xml version="1.0" encoding="utf-8"?>
+<file path=ppt/notesSlides/notesSlide11.xml><?xml version="1.0" encoding="utf-8"?>
+<p:notes xmlns:a="http://schemas.openxmlformats.org/drawingml/2006/main" xmlns:r="http://schemas.openxmlformats.org/officeDocument/2006/relationships" xmlns:p="http://schemas.openxmlformats.org/presentationml/2006/main" showMasterSp="0" showMasterPhAnim="0">
+  <p:cSld>
+    <p:spTree>
+      <p:nvGrpSpPr>
+        <p:cNvPr id="1" name="Shape 188"/>
+        <p:cNvGrpSpPr/>
+        <p:nvPr/>
+      </p:nvGrpSpPr>
+      <p:grpSpPr>
+        <a:xfrm>
+          <a:off x="0" y="0"/>
+          <a:ext cx="0" cy="0"/>
+          <a:chOff x="0" y="0"/>
+          <a:chExt cx="0" cy="0"/>
+        </a:xfrm>
+      </p:grpSpPr>
+      <p:sp>
+        <p:nvSpPr>
+          <p:cNvPr id="189" name="Google Shape;189;g6dcb7c009e_0_297:notes"/>
+          <p:cNvSpPr>
+            <a:spLocks noGrp="1" noRot="1" noChangeAspect="1"/>
+          </p:cNvSpPr>
+          <p:nvPr>
+            <p:ph type="sldImg" idx="2"/>
+          </p:nvPr>
+        </p:nvSpPr>
+        <p:spPr>
+          <a:xfrm>
+            <a:off x="381000" y="685800"/>
+            <a:ext cx="6096000" cy="3429000"/>
+          </a:xfrm>
+          <a:custGeom>
+            <a:avLst/>
+            <a:gdLst/>
+            <a:ahLst/>
+            <a:cxnLst/>
+            <a:rect l="l" t="t" r="r" b="b"/>
+            <a:pathLst>
+              <a:path w="120000" h="120000" extrusionOk="0">
+                <a:moveTo>
+                  <a:pt x="0" y="0"/>
+                </a:moveTo>
+                <a:lnTo>
+                  <a:pt x="120000" y="0"/>
+                </a:lnTo>
+                <a:lnTo>
+                  <a:pt x="120000" y="120000"/>
+                </a:lnTo>
+                <a:lnTo>
+                  <a:pt x="0" y="120000"/>
+                </a:lnTo>
+                <a:close/>
+              </a:path>
+            </a:pathLst>
+          </a:custGeom>
+        </p:spPr>
+      </p:sp>
+      <p:sp>
+        <p:nvSpPr>
+          <p:cNvPr id="190" name="Google Shape;190;g6dcb7c009e_0_297:notes"/>
+          <p:cNvSpPr txBox="1">
+            <a:spLocks noGrp="1"/>
+          </p:cNvSpPr>
+          <p:nvPr>
+            <p:ph type="body" idx="1"/>
+          </p:nvPr>
+        </p:nvSpPr>
+        <p:spPr>
+          <a:xfrm>
+            <a:off x="685800" y="4343400"/>
+            <a:ext cx="5486400" cy="4114800"/>
+          </a:xfrm>
+          <a:prstGeom prst="rect">
+            <a:avLst/>
+          </a:prstGeom>
+        </p:spPr>
+        <p:txBody>
+          <a:bodyPr spcFirstLastPara="1" wrap="square" lIns="91425" tIns="91425" rIns="91425" bIns="91425" anchor="t" anchorCtr="0">
+            <a:noAutofit/>
+          </a:bodyPr>
+          <a:lstStyle/>
+          <a:p>
+            <a:pPr marL="0" lvl="0" indent="0" algn="l" rtl="0">
+              <a:spcBef>
+                <a:spcPts val="0"/>
+              </a:spcBef>
+              <a:spcAft>
+                <a:spcPts val="0"/>
+              </a:spcAft>
+              <a:buNone/>
+            </a:pPr>
+            <a:r>
+              <a:rPr lang="en-US" b="0" i="0" dirty="0">
+                <a:solidFill>
+                  <a:srgbClr val="37474F"/>
+                </a:solidFill>
+                <a:effectLst/>
+                <a:latin typeface="Roboto" panose="02000000000000000000" pitchFamily="2" charset="0"/>
+              </a:rPr>
+              <a:t>A </a:t>
+            </a:r>
+            <a:r>
+              <a:rPr lang="en-US" b="1" i="1" u="none" strike="noStrike" dirty="0">
+                <a:solidFill>
+                  <a:srgbClr val="000000"/>
+                </a:solidFill>
+                <a:effectLst/>
+                <a:latin typeface="Roboto" panose="02000000000000000000" pitchFamily="2" charset="0"/>
+              </a:rPr>
+              <a:t>docstring</a:t>
+            </a:r>
+            <a:r>
+              <a:rPr lang="en-US" b="0" i="0" dirty="0">
+                <a:solidFill>
+                  <a:srgbClr val="37474F"/>
+                </a:solidFill>
+                <a:effectLst/>
+                <a:latin typeface="Roboto" panose="02000000000000000000" pitchFamily="2" charset="0"/>
+              </a:rPr>
+              <a:t> is a string literal placed in the first line of a function body.</a:t>
+            </a:r>
+          </a:p>
+          <a:p>
+            <a:pPr marL="0" lvl="0" indent="0" algn="l" rtl="0">
+              <a:spcBef>
+                <a:spcPts val="0"/>
+              </a:spcBef>
+              <a:spcAft>
+                <a:spcPts val="0"/>
+              </a:spcAft>
+              <a:buNone/>
+            </a:pPr>
+            <a:r>
+              <a:rPr lang="en-US" b="0" i="0" dirty="0">
+                <a:solidFill>
+                  <a:srgbClr val="37474F"/>
+                </a:solidFill>
+                <a:effectLst/>
+                <a:latin typeface="Roboto" panose="02000000000000000000" pitchFamily="2" charset="0"/>
+              </a:rPr>
+              <a:t>The </a:t>
+            </a:r>
+            <a:r>
+              <a:rPr lang="en-US" b="1" i="1" u="none" strike="noStrike" dirty="0">
+                <a:solidFill>
+                  <a:srgbClr val="000000"/>
+                </a:solidFill>
+                <a:effectLst/>
+                <a:latin typeface="Roboto" panose="02000000000000000000" pitchFamily="2" charset="0"/>
+              </a:rPr>
+              <a:t>help()</a:t>
+            </a:r>
+            <a:r>
+              <a:rPr lang="en-US" b="0" i="0" dirty="0">
+                <a:solidFill>
+                  <a:srgbClr val="37474F"/>
+                </a:solidFill>
+                <a:effectLst/>
+                <a:latin typeface="Roboto" panose="02000000000000000000" pitchFamily="2" charset="0"/>
+              </a:rPr>
+              <a:t> function can aid a programmer by providing them with all the documentation associated with an object. A statement such as </a:t>
+            </a:r>
+            <a:r>
+              <a:rPr lang="en-US" dirty="0"/>
+              <a:t>help(</a:t>
+            </a:r>
+            <a:r>
+              <a:rPr lang="en-US" dirty="0" err="1"/>
+              <a:t>ticket_price</a:t>
+            </a:r>
+            <a:r>
+              <a:rPr lang="en-US" dirty="0"/>
+              <a:t>)</a:t>
+            </a:r>
+            <a:r>
+              <a:rPr lang="en-US" b="0" i="0" dirty="0">
+                <a:solidFill>
+                  <a:srgbClr val="37474F"/>
+                </a:solidFill>
+                <a:effectLst/>
+                <a:latin typeface="Roboto" panose="02000000000000000000" pitchFamily="2" charset="0"/>
+              </a:rPr>
+              <a:t> would print out the docstring for the </a:t>
+            </a:r>
+            <a:r>
+              <a:rPr lang="en-US" dirty="0" err="1"/>
+              <a:t>ticket_price</a:t>
+            </a:r>
+            <a:r>
+              <a:rPr lang="en-US"/>
+              <a:t>()</a:t>
+            </a:r>
+            <a:r>
+              <a:rPr lang="en-US" b="0" i="0">
+                <a:solidFill>
+                  <a:srgbClr val="37474F"/>
+                </a:solidFill>
+                <a:effectLst/>
+                <a:latin typeface="Roboto" panose="02000000000000000000" pitchFamily="2" charset="0"/>
+              </a:rPr>
+              <a:t> function, providing the programmer with information about how to call that function.</a:t>
+            </a:r>
+            <a:endParaRPr dirty="0"/>
+          </a:p>
+        </p:txBody>
+      </p:sp>
+    </p:spTree>
+    <p:extLst>
+      <p:ext uri="{BB962C8B-B14F-4D97-AF65-F5344CB8AC3E}">
+        <p14:creationId xmlns:p14="http://schemas.microsoft.com/office/powerpoint/2010/main" val="2129710428"/>
+      </p:ext>
+    </p:extLst>
+  </p:cSld>
+  <p:clrMapOvr>
+    <a:masterClrMapping/>
+  </p:clrMapOvr>
+</p:notes>
+</file>
+
+<file path=ppt/notesSlides/notesSlide2.xml><?xml version="1.0" encoding="utf-8"?>
 <p:notes xmlns:a="http://schemas.openxmlformats.org/drawingml/2006/main" xmlns:r="http://schemas.openxmlformats.org/officeDocument/2006/relationships" xmlns:p="http://schemas.openxmlformats.org/presentationml/2006/main" showMasterSp="0" showMasterPhAnim="0">
   <p:cSld>
     <p:spTree>
@@ -1681,7 +1463,26 @@
               </a:spcAft>
               <a:buNone/>
             </a:pPr>
-            <a:endParaRPr/>
+            <a:r>
+              <a:rPr lang="en-US" dirty="0"/>
+              <a:t>Last lecture we ended by having you to code the following problem. Dr. Green is looking for a bank that will give the most return on her money over the next 5 years. She has a hundred thousand into a savings account. The standard equation to calculate principal plus interest at the end of a period is as shown in the slide. Where P is the principal amount of money to invest. I is the interest, percentage rate the bank pays to the investor. N is the number of years for which the principal is invested. And M is the compound interval, meaning the number of times per year the interest is calculated and added to the principal.</a:t>
+            </a:r>
+          </a:p>
+          <a:p>
+            <a:pPr marL="0" lvl="0" indent="0" algn="l" rtl="0">
+              <a:spcBef>
+                <a:spcPts val="0"/>
+              </a:spcBef>
+              <a:spcAft>
+                <a:spcPts val="0"/>
+              </a:spcAft>
+              <a:buNone/>
+            </a:pPr>
+            <a:r>
+              <a:rPr lang="en-US" dirty="0"/>
+              <a:t>First let’s think about our input variables, these would be P, I, N and M. Our output variable will be amount and the output variable is calculated by the equation provided. One way to solve this problem is the following: we know the amount of money that Dr. Green has to invest, so we know P. We also know the number of years that she would like to invest her money, that is N. So the first thing we could do into our program is to assign the values to the these variables. After that we need to read the values of the remainder input variables, calculate the output, and print the output.</a:t>
+            </a:r>
+            <a:endParaRPr dirty="0"/>
           </a:p>
         </p:txBody>
       </p:sp>
@@ -1689,6 +1490,113 @@
     <p:extLst>
       <p:ext uri="{BB962C8B-B14F-4D97-AF65-F5344CB8AC3E}">
         <p14:creationId xmlns:p14="http://schemas.microsoft.com/office/powerpoint/2010/main" val="1604733227"/>
+      </p:ext>
+    </p:extLst>
+  </p:cSld>
+  <p:clrMapOvr>
+    <a:masterClrMapping/>
+  </p:clrMapOvr>
+</p:notes>
+</file>
+
+<file path=ppt/notesSlides/notesSlide3.xml><?xml version="1.0" encoding="utf-8"?>
+<p:notes xmlns:a="http://schemas.openxmlformats.org/drawingml/2006/main" xmlns:r="http://schemas.openxmlformats.org/officeDocument/2006/relationships" xmlns:p="http://schemas.openxmlformats.org/presentationml/2006/main">
+  <p:cSld>
+    <p:spTree>
+      <p:nvGrpSpPr>
+        <p:cNvPr id="1" name=""/>
+        <p:cNvGrpSpPr/>
+        <p:nvPr/>
+      </p:nvGrpSpPr>
+      <p:grpSpPr>
+        <a:xfrm>
+          <a:off x="0" y="0"/>
+          <a:ext cx="0" cy="0"/>
+          <a:chOff x="0" y="0"/>
+          <a:chExt cx="0" cy="0"/>
+        </a:xfrm>
+      </p:grpSpPr>
+      <p:sp>
+        <p:nvSpPr>
+          <p:cNvPr id="2" name="Slide Image Placeholder 1"/>
+          <p:cNvSpPr>
+            <a:spLocks noGrp="1" noRot="1" noChangeAspect="1"/>
+          </p:cNvSpPr>
+          <p:nvPr>
+            <p:ph type="sldImg"/>
+          </p:nvPr>
+        </p:nvSpPr>
+        <p:spPr>
+          <a:xfrm>
+            <a:off x="381000" y="685800"/>
+            <a:ext cx="6096000" cy="3429000"/>
+          </a:xfrm>
+        </p:spPr>
+      </p:sp>
+      <p:sp>
+        <p:nvSpPr>
+          <p:cNvPr id="3" name="Notes Placeholder 2"/>
+          <p:cNvSpPr>
+            <a:spLocks noGrp="1"/>
+          </p:cNvSpPr>
+          <p:nvPr>
+            <p:ph type="body" idx="1"/>
+          </p:nvPr>
+        </p:nvSpPr>
+        <p:spPr/>
+        <p:txBody>
+          <a:bodyPr/>
+          <a:lstStyle/>
+          <a:p>
+            <a:r>
+              <a:rPr lang="en-US" dirty="0"/>
+              <a:t>One possible solution for what we just discuss in the previous slide is this one.</a:t>
+            </a:r>
+          </a:p>
+          <a:p>
+            <a:r>
+              <a:rPr lang="en-US" dirty="0"/>
+              <a:t>Our first and second print function have two parameters. The first parameter is the message and we know that because we have a sequence of strings between quotes. The second parameter is telling us that instead of going to the next line after printing the message, the end of the print statement will be a space, meaning that the cursor will stay in the same line as the message we just printed.</a:t>
+            </a:r>
+          </a:p>
+          <a:p>
+            <a:r>
+              <a:rPr lang="en-US" dirty="0"/>
+              <a:t>As we learned from last lecture, the input function reads a string and we need to cast or transform that string to another data type sometimes. That is what we are doing when we read the I and M variables, we are reading the input and transforming it to a float number. We need to do that in order to use these variables in the equation that calculates the amount.</a:t>
+            </a:r>
+          </a:p>
+          <a:p>
+            <a:r>
+              <a:rPr lang="en-US" dirty="0"/>
+              <a:t>After that we are calculating the amount and using the f-print, the first placeholder will print the n value which is a int, that is why we have the d. The second placeholder will print amount value and we are only printing 2 numbers after the decimal point that is what .2f mean.</a:t>
+            </a:r>
+          </a:p>
+          <a:p>
+            <a:r>
+              <a:rPr lang="en-US" dirty="0"/>
+              <a:t>Now that we understand this solution, what do we need to do in order to be able to run this program to calculate the principal and inters for another bank? Or other several banks?</a:t>
+            </a:r>
+          </a:p>
+          <a:p>
+            <a:r>
+              <a:rPr lang="en-US" dirty="0"/>
+              <a:t>We should be able to reuse the code, meaning that we are not copying and pasting the same code several times, our code should be DRY, meaning </a:t>
+            </a:r>
+            <a:r>
+              <a:rPr lang="en-US" dirty="0" err="1"/>
+              <a:t>D’ont</a:t>
+            </a:r>
+            <a:r>
+              <a:rPr lang="en-US" dirty="0"/>
+              <a:t> Repeat Yourself. The way to do that is by building functions.</a:t>
+            </a:r>
+          </a:p>
+        </p:txBody>
+      </p:sp>
+    </p:spTree>
+    <p:extLst>
+      <p:ext uri="{BB962C8B-B14F-4D97-AF65-F5344CB8AC3E}">
+        <p14:creationId xmlns:p14="http://schemas.microsoft.com/office/powerpoint/2010/main" val="55625783"/>
       </p:ext>
     </p:extLst>
   </p:cSld>
@@ -1790,6 +1698,10 @@
               </a:spcAft>
               <a:buNone/>
             </a:pPr>
+            <a:r>
+              <a:rPr lang="en-US" dirty="0"/>
+              <a:t>In order to build a program we need to be able to solve the problem by clarifying the problem and its constraints, break it into smaller parts. Solve each one of these smaller parts and after that make these parts work together. That is what we call divide, conquer and glue concept.</a:t>
+            </a:r>
             <a:endParaRPr dirty="0"/>
           </a:p>
         </p:txBody>
@@ -1803,11 +1715,11 @@
 </file>
 
 <file path=ppt/notesSlides/notesSlide5.xml><?xml version="1.0" encoding="utf-8"?>
-<p:notes xmlns:a="http://schemas.openxmlformats.org/drawingml/2006/main" xmlns:r="http://schemas.openxmlformats.org/officeDocument/2006/relationships" xmlns:p="http://schemas.openxmlformats.org/presentationml/2006/main" showMasterSp="0" showMasterPhAnim="0">
+<p:notes xmlns:a="http://schemas.openxmlformats.org/drawingml/2006/main" xmlns:r="http://schemas.openxmlformats.org/officeDocument/2006/relationships" xmlns:p="http://schemas.openxmlformats.org/presentationml/2006/main">
   <p:cSld>
     <p:spTree>
       <p:nvGrpSpPr>
-        <p:cNvPr id="1" name="Shape 188"/>
+        <p:cNvPr id="1" name=""/>
         <p:cNvGrpSpPr/>
         <p:nvPr/>
       </p:nvGrpSpPr>
@@ -1821,12 +1733,12 @@
       </p:grpSpPr>
       <p:sp>
         <p:nvSpPr>
-          <p:cNvPr id="189" name="Google Shape;189;g6dcb7c009e_0_297:notes"/>
+          <p:cNvPr id="2" name="Slide Image Placeholder 1"/>
           <p:cNvSpPr>
             <a:spLocks noGrp="1" noRot="1" noChangeAspect="1"/>
           </p:cNvSpPr>
           <p:nvPr>
-            <p:ph type="sldImg" idx="2"/>
+            <p:ph type="sldImg"/>
           </p:nvPr>
         </p:nvSpPr>
         <p:spPr>
@@ -1834,74 +1746,64 @@
             <a:off x="381000" y="685800"/>
             <a:ext cx="6096000" cy="3429000"/>
           </a:xfrm>
-          <a:custGeom>
-            <a:avLst/>
-            <a:gdLst/>
-            <a:ahLst/>
-            <a:cxnLst/>
-            <a:rect l="l" t="t" r="r" b="b"/>
-            <a:pathLst>
-              <a:path w="120000" h="120000" extrusionOk="0">
-                <a:moveTo>
-                  <a:pt x="0" y="0"/>
-                </a:moveTo>
-                <a:lnTo>
-                  <a:pt x="120000" y="0"/>
-                </a:lnTo>
-                <a:lnTo>
-                  <a:pt x="120000" y="120000"/>
-                </a:lnTo>
-                <a:lnTo>
-                  <a:pt x="0" y="120000"/>
-                </a:lnTo>
-                <a:close/>
-              </a:path>
-            </a:pathLst>
-          </a:custGeom>
         </p:spPr>
       </p:sp>
       <p:sp>
         <p:nvSpPr>
-          <p:cNvPr id="190" name="Google Shape;190;g6dcb7c009e_0_297:notes"/>
-          <p:cNvSpPr txBox="1">
+          <p:cNvPr id="3" name="Notes Placeholder 2"/>
+          <p:cNvSpPr>
             <a:spLocks noGrp="1"/>
           </p:cNvSpPr>
           <p:nvPr>
             <p:ph type="body" idx="1"/>
           </p:nvPr>
         </p:nvSpPr>
-        <p:spPr>
-          <a:xfrm>
-            <a:off x="685800" y="4343400"/>
-            <a:ext cx="5486400" cy="4114800"/>
-          </a:xfrm>
-          <a:prstGeom prst="rect">
-            <a:avLst/>
-          </a:prstGeom>
-        </p:spPr>
+        <p:spPr/>
         <p:txBody>
-          <a:bodyPr spcFirstLastPara="1" wrap="square" lIns="91425" tIns="91425" rIns="91425" bIns="91425" anchor="t" anchorCtr="0">
-            <a:noAutofit/>
-          </a:bodyPr>
+          <a:bodyPr/>
           <a:lstStyle/>
           <a:p>
-            <a:pPr marL="0" lvl="0" indent="0" algn="l" rtl="0">
-              <a:spcBef>
-                <a:spcPts val="0"/>
-              </a:spcBef>
-              <a:spcAft>
-                <a:spcPts val="0"/>
-              </a:spcAft>
-              <a:buNone/>
-            </a:pPr>
-            <a:endParaRPr dirty="0"/>
+            <a:r>
+              <a:rPr lang="en-US" dirty="0"/>
+              <a:t>To create a function we need to use the def reserved keyword.</a:t>
+            </a:r>
+          </a:p>
+          <a:p>
+            <a:r>
+              <a:rPr lang="en-US" dirty="0"/>
+              <a:t>So we start our function with the def keyword followed by the name of the function, open and close parenthesis and : at the end. We hit enter and we need to ident to tell Python that the code is part of the function. Spacing matters!</a:t>
+            </a:r>
+          </a:p>
+          <a:p>
+            <a:r>
+              <a:rPr lang="en-US" dirty="0"/>
+              <a:t>Between the parenthesis we could have a list of parameters separated by a comma. A parameter is a value that is needed by the function so the function could work properly.</a:t>
+            </a:r>
+          </a:p>
+          <a:p>
+            <a:r>
+              <a:rPr lang="en-US" dirty="0"/>
+              <a:t>We have being using functions already. The print is a function that has parameters. In print(value), the function name is print and it has only one parameter which is value. In our program example, we are using the function print with two parameters, the first parameter is a string and the second parameter is changing the end of the print statement.</a:t>
+            </a:r>
+          </a:p>
+          <a:p>
+            <a:r>
+              <a:rPr lang="en-US" dirty="0"/>
+              <a:t>Lets go back to our example, what should be the parameters for our code? Why?</a:t>
+            </a:r>
+          </a:p>
+          <a:p>
+            <a:r>
+              <a:rPr lang="en-US" dirty="0"/>
+              <a:t>Which commands are part of the function? Why?</a:t>
+            </a:r>
           </a:p>
         </p:txBody>
       </p:sp>
     </p:spTree>
     <p:extLst>
       <p:ext uri="{BB962C8B-B14F-4D97-AF65-F5344CB8AC3E}">
-        <p14:creationId xmlns:p14="http://schemas.microsoft.com/office/powerpoint/2010/main" val="3052057332"/>
+        <p14:creationId xmlns:p14="http://schemas.microsoft.com/office/powerpoint/2010/main" val="1937272986"/>
       </p:ext>
     </p:extLst>
   </p:cSld>
@@ -1912,11 +1814,11 @@
 </file>
 
 <file path=ppt/notesSlides/notesSlide6.xml><?xml version="1.0" encoding="utf-8"?>
-<p:notes xmlns:a="http://schemas.openxmlformats.org/drawingml/2006/main" xmlns:r="http://schemas.openxmlformats.org/officeDocument/2006/relationships" xmlns:p="http://schemas.openxmlformats.org/presentationml/2006/main" showMasterSp="0" showMasterPhAnim="0">
+<p:notes xmlns:a="http://schemas.openxmlformats.org/drawingml/2006/main" xmlns:r="http://schemas.openxmlformats.org/officeDocument/2006/relationships" xmlns:p="http://schemas.openxmlformats.org/presentationml/2006/main">
   <p:cSld>
     <p:spTree>
       <p:nvGrpSpPr>
-        <p:cNvPr id="1" name="Shape 188"/>
+        <p:cNvPr id="1" name=""/>
         <p:cNvGrpSpPr/>
         <p:nvPr/>
       </p:nvGrpSpPr>
@@ -1930,12 +1832,12 @@
       </p:grpSpPr>
       <p:sp>
         <p:nvSpPr>
-          <p:cNvPr id="189" name="Google Shape;189;g6dcb7c009e_0_297:notes"/>
+          <p:cNvPr id="2" name="Slide Image Placeholder 1"/>
           <p:cNvSpPr>
             <a:spLocks noGrp="1" noRot="1" noChangeAspect="1"/>
           </p:cNvSpPr>
           <p:nvPr>
-            <p:ph type="sldImg" idx="2"/>
+            <p:ph type="sldImg"/>
           </p:nvPr>
         </p:nvSpPr>
         <p:spPr>
@@ -1943,74 +1845,467 @@
             <a:off x="381000" y="685800"/>
             <a:ext cx="6096000" cy="3429000"/>
           </a:xfrm>
-          <a:custGeom>
-            <a:avLst/>
-            <a:gdLst/>
-            <a:ahLst/>
-            <a:cxnLst/>
-            <a:rect l="l" t="t" r="r" b="b"/>
-            <a:pathLst>
-              <a:path w="120000" h="120000" extrusionOk="0">
-                <a:moveTo>
-                  <a:pt x="0" y="0"/>
-                </a:moveTo>
-                <a:lnTo>
-                  <a:pt x="120000" y="0"/>
-                </a:lnTo>
-                <a:lnTo>
-                  <a:pt x="120000" y="120000"/>
-                </a:lnTo>
-                <a:lnTo>
-                  <a:pt x="0" y="120000"/>
-                </a:lnTo>
-                <a:close/>
-              </a:path>
-            </a:pathLst>
-          </a:custGeom>
         </p:spPr>
       </p:sp>
       <p:sp>
         <p:nvSpPr>
-          <p:cNvPr id="190" name="Google Shape;190;g6dcb7c009e_0_297:notes"/>
-          <p:cNvSpPr txBox="1">
+          <p:cNvPr id="3" name="Notes Placeholder 2"/>
+          <p:cNvSpPr>
             <a:spLocks noGrp="1"/>
           </p:cNvSpPr>
           <p:nvPr>
             <p:ph type="body" idx="1"/>
           </p:nvPr>
         </p:nvSpPr>
-        <p:spPr>
-          <a:xfrm>
-            <a:off x="685800" y="4343400"/>
-            <a:ext cx="5486400" cy="4114800"/>
-          </a:xfrm>
-          <a:prstGeom prst="rect">
-            <a:avLst/>
-          </a:prstGeom>
-        </p:spPr>
+        <p:spPr/>
         <p:txBody>
-          <a:bodyPr spcFirstLastPara="1" wrap="square" lIns="91425" tIns="91425" rIns="91425" bIns="91425" anchor="t" anchorCtr="0">
-            <a:noAutofit/>
-          </a:bodyPr>
+          <a:bodyPr/>
           <a:lstStyle/>
           <a:p>
-            <a:pPr marL="0" lvl="0" indent="0" algn="l" rtl="0">
-              <a:spcBef>
-                <a:spcPts val="0"/>
-              </a:spcBef>
-              <a:spcAft>
-                <a:spcPts val="0"/>
-              </a:spcAft>
-              <a:buNone/>
-            </a:pPr>
-            <a:endParaRPr dirty="0"/>
+            <a:r>
+              <a:rPr lang="en-US" dirty="0"/>
+              <a:t>One possible solution will consider two parameters for our function, </a:t>
+            </a:r>
+            <a:r>
+              <a:rPr lang="en-US" dirty="0" err="1"/>
+              <a:t>i</a:t>
+            </a:r>
+            <a:r>
+              <a:rPr lang="en-US" dirty="0"/>
+              <a:t> and m. And the function will contain the calculation of the output variable and the print of that variable. As we mentioned before, the code that is part of the function needs to be indented.</a:t>
+            </a:r>
+          </a:p>
+          <a:p>
+            <a:r>
+              <a:rPr lang="en-US" dirty="0"/>
+              <a:t>So we have the function, how are we going to call the function we just created?</a:t>
+            </a:r>
+          </a:p>
+          <a:p>
+            <a:r>
+              <a:rPr lang="en-US" dirty="0"/>
+              <a:t>We call the function by its name and send the necessary parameters, with in our case are two, </a:t>
+            </a:r>
+            <a:r>
+              <a:rPr lang="en-US" dirty="0" err="1"/>
+              <a:t>i</a:t>
+            </a:r>
+            <a:r>
+              <a:rPr lang="en-US" dirty="0"/>
+              <a:t> and m. It is important to notice that this function does not have a return because the amount is being printed inside of the function.</a:t>
+            </a:r>
+          </a:p>
+          <a:p>
+            <a:r>
+              <a:rPr lang="en-US" dirty="0"/>
+              <a:t>Could we improve this function a little bit more? How about p and n variables? Let’s think that we would like the program to work for any kind of principal and number of years.</a:t>
+            </a:r>
           </a:p>
         </p:txBody>
       </p:sp>
     </p:spTree>
     <p:extLst>
       <p:ext uri="{BB962C8B-B14F-4D97-AF65-F5344CB8AC3E}">
-        <p14:creationId xmlns:p14="http://schemas.microsoft.com/office/powerpoint/2010/main" val="2129710428"/>
+        <p14:creationId xmlns:p14="http://schemas.microsoft.com/office/powerpoint/2010/main" val="2823587118"/>
+      </p:ext>
+    </p:extLst>
+  </p:cSld>
+  <p:clrMapOvr>
+    <a:masterClrMapping/>
+  </p:clrMapOvr>
+</p:notes>
+</file>
+
+<file path=ppt/notesSlides/notesSlide7.xml><?xml version="1.0" encoding="utf-8"?>
+<p:notes xmlns:a="http://schemas.openxmlformats.org/drawingml/2006/main" xmlns:r="http://schemas.openxmlformats.org/officeDocument/2006/relationships" xmlns:p="http://schemas.openxmlformats.org/presentationml/2006/main">
+  <p:cSld>
+    <p:spTree>
+      <p:nvGrpSpPr>
+        <p:cNvPr id="1" name=""/>
+        <p:cNvGrpSpPr/>
+        <p:nvPr/>
+      </p:nvGrpSpPr>
+      <p:grpSpPr>
+        <a:xfrm>
+          <a:off x="0" y="0"/>
+          <a:ext cx="0" cy="0"/>
+          <a:chOff x="0" y="0"/>
+          <a:chExt cx="0" cy="0"/>
+        </a:xfrm>
+      </p:grpSpPr>
+      <p:sp>
+        <p:nvSpPr>
+          <p:cNvPr id="2" name="Slide Image Placeholder 1"/>
+          <p:cNvSpPr>
+            <a:spLocks noGrp="1" noRot="1" noChangeAspect="1"/>
+          </p:cNvSpPr>
+          <p:nvPr>
+            <p:ph type="sldImg"/>
+          </p:nvPr>
+        </p:nvSpPr>
+        <p:spPr>
+          <a:xfrm>
+            <a:off x="381000" y="685800"/>
+            <a:ext cx="6096000" cy="3429000"/>
+          </a:xfrm>
+        </p:spPr>
+      </p:sp>
+      <p:sp>
+        <p:nvSpPr>
+          <p:cNvPr id="3" name="Notes Placeholder 2"/>
+          <p:cNvSpPr>
+            <a:spLocks noGrp="1"/>
+          </p:cNvSpPr>
+          <p:nvPr>
+            <p:ph type="body" idx="1"/>
+          </p:nvPr>
+        </p:nvSpPr>
+        <p:spPr/>
+        <p:txBody>
+          <a:bodyPr/>
+          <a:lstStyle/>
+          <a:p>
+            <a:r>
+              <a:rPr lang="en-US" dirty="0"/>
+              <a:t>This is one possible solution, not that our function now has 4 parameters, so when we call the function we need to send these 4 parameters in the correct order.</a:t>
+            </a:r>
+          </a:p>
+          <a:p>
+            <a:r>
+              <a:rPr lang="en-US" dirty="0"/>
+              <a:t>The function still prints the output variable.</a:t>
+            </a:r>
+          </a:p>
+          <a:p>
+            <a:r>
+              <a:rPr lang="en-US" dirty="0"/>
+              <a:t>What should we do if instead of printing the output variable inside of the function we would like to print it outside?</a:t>
+            </a:r>
+          </a:p>
+          <a:p>
+            <a:r>
+              <a:rPr lang="en-US" dirty="0"/>
+              <a:t>We need to be able to return the variable that was just calculated.</a:t>
+            </a:r>
+          </a:p>
+          <a:p>
+            <a:r>
+              <a:rPr lang="en-US" dirty="0"/>
+              <a:t>And that is what we will see in the next slide.</a:t>
+            </a:r>
+          </a:p>
+        </p:txBody>
+      </p:sp>
+    </p:spTree>
+    <p:extLst>
+      <p:ext uri="{BB962C8B-B14F-4D97-AF65-F5344CB8AC3E}">
+        <p14:creationId xmlns:p14="http://schemas.microsoft.com/office/powerpoint/2010/main" val="611875486"/>
+      </p:ext>
+    </p:extLst>
+  </p:cSld>
+  <p:clrMapOvr>
+    <a:masterClrMapping/>
+  </p:clrMapOvr>
+</p:notes>
+</file>
+
+<file path=ppt/notesSlides/notesSlide8.xml><?xml version="1.0" encoding="utf-8"?>
+<p:notes xmlns:a="http://schemas.openxmlformats.org/drawingml/2006/main" xmlns:r="http://schemas.openxmlformats.org/officeDocument/2006/relationships" xmlns:p="http://schemas.openxmlformats.org/presentationml/2006/main">
+  <p:cSld>
+    <p:spTree>
+      <p:nvGrpSpPr>
+        <p:cNvPr id="1" name=""/>
+        <p:cNvGrpSpPr/>
+        <p:nvPr/>
+      </p:nvGrpSpPr>
+      <p:grpSpPr>
+        <a:xfrm>
+          <a:off x="0" y="0"/>
+          <a:ext cx="0" cy="0"/>
+          <a:chOff x="0" y="0"/>
+          <a:chExt cx="0" cy="0"/>
+        </a:xfrm>
+      </p:grpSpPr>
+      <p:sp>
+        <p:nvSpPr>
+          <p:cNvPr id="2" name="Slide Image Placeholder 1"/>
+          <p:cNvSpPr>
+            <a:spLocks noGrp="1" noRot="1" noChangeAspect="1"/>
+          </p:cNvSpPr>
+          <p:nvPr>
+            <p:ph type="sldImg"/>
+          </p:nvPr>
+        </p:nvSpPr>
+        <p:spPr>
+          <a:xfrm>
+            <a:off x="381000" y="685800"/>
+            <a:ext cx="6096000" cy="3429000"/>
+          </a:xfrm>
+        </p:spPr>
+      </p:sp>
+      <p:sp>
+        <p:nvSpPr>
+          <p:cNvPr id="3" name="Notes Placeholder 2"/>
+          <p:cNvSpPr>
+            <a:spLocks noGrp="1"/>
+          </p:cNvSpPr>
+          <p:nvPr>
+            <p:ph type="body" idx="1"/>
+          </p:nvPr>
+        </p:nvSpPr>
+        <p:spPr/>
+        <p:txBody>
+          <a:bodyPr/>
+          <a:lstStyle/>
+          <a:p>
+            <a:r>
+              <a:rPr lang="en-US" dirty="0"/>
+              <a:t>The best paradigm to follow is the one that the functions do some specific work and then return the answer of that work. So other programs can use those answers.</a:t>
+            </a:r>
+          </a:p>
+          <a:p>
+            <a:r>
+              <a:rPr lang="en-US" dirty="0"/>
+              <a:t>In our example, instead of printing the amount inside of the function the function is returning the amount calculated.</a:t>
+            </a:r>
+          </a:p>
+          <a:p>
+            <a:r>
+              <a:rPr lang="en-US" dirty="0"/>
+              <a:t>Since the function now returns a value, when we call the function we need to be able to store that value to use it later.</a:t>
+            </a:r>
+          </a:p>
+        </p:txBody>
+      </p:sp>
+    </p:spTree>
+    <p:extLst>
+      <p:ext uri="{BB962C8B-B14F-4D97-AF65-F5344CB8AC3E}">
+        <p14:creationId xmlns:p14="http://schemas.microsoft.com/office/powerpoint/2010/main" val="627962172"/>
+      </p:ext>
+    </p:extLst>
+  </p:cSld>
+  <p:clrMapOvr>
+    <a:masterClrMapping/>
+  </p:clrMapOvr>
+</p:notes>
+</file>
+
+<file path=ppt/notesSlides/notesSlide9.xml><?xml version="1.0" encoding="utf-8"?>
+<p:notes xmlns:a="http://schemas.openxmlformats.org/drawingml/2006/main" xmlns:r="http://schemas.openxmlformats.org/officeDocument/2006/relationships" xmlns:p="http://schemas.openxmlformats.org/presentationml/2006/main">
+  <p:cSld>
+    <p:spTree>
+      <p:nvGrpSpPr>
+        <p:cNvPr id="1" name=""/>
+        <p:cNvGrpSpPr/>
+        <p:nvPr/>
+      </p:nvGrpSpPr>
+      <p:grpSpPr>
+        <a:xfrm>
+          <a:off x="0" y="0"/>
+          <a:ext cx="0" cy="0"/>
+          <a:chOff x="0" y="0"/>
+          <a:chExt cx="0" cy="0"/>
+        </a:xfrm>
+      </p:grpSpPr>
+      <p:sp>
+        <p:nvSpPr>
+          <p:cNvPr id="2" name="Slide Image Placeholder 1"/>
+          <p:cNvSpPr>
+            <a:spLocks noGrp="1" noRot="1" noChangeAspect="1"/>
+          </p:cNvSpPr>
+          <p:nvPr>
+            <p:ph type="sldImg"/>
+          </p:nvPr>
+        </p:nvSpPr>
+        <p:spPr>
+          <a:xfrm>
+            <a:off x="381000" y="685800"/>
+            <a:ext cx="6096000" cy="3429000"/>
+          </a:xfrm>
+        </p:spPr>
+      </p:sp>
+      <p:sp>
+        <p:nvSpPr>
+          <p:cNvPr id="3" name="Notes Placeholder 2"/>
+          <p:cNvSpPr>
+            <a:spLocks noGrp="1"/>
+          </p:cNvSpPr>
+          <p:nvPr>
+            <p:ph type="body" idx="1"/>
+          </p:nvPr>
+        </p:nvSpPr>
+        <p:spPr/>
+        <p:txBody>
+          <a:bodyPr/>
+          <a:lstStyle/>
+          <a:p>
+            <a:r>
+              <a:rPr lang="en-US" dirty="0"/>
+              <a:t>We have four functions in this program, </a:t>
+            </a:r>
+            <a:r>
+              <a:rPr lang="en-US" dirty="0" err="1"/>
+              <a:t>arithmeticExpression</a:t>
+            </a:r>
+            <a:r>
+              <a:rPr lang="en-US" dirty="0"/>
+              <a:t>, </a:t>
+            </a:r>
+            <a:r>
+              <a:rPr lang="en-US" dirty="0" err="1"/>
+              <a:t>powerOfTwo</a:t>
+            </a:r>
+            <a:r>
+              <a:rPr lang="en-US" dirty="0"/>
+              <a:t>, </a:t>
+            </a:r>
+            <a:r>
+              <a:rPr lang="en-US" dirty="0" err="1"/>
+              <a:t>powerOfSomething</a:t>
+            </a:r>
+            <a:r>
+              <a:rPr lang="en-US" dirty="0"/>
+              <a:t> and main. Outside of all functions we have a call to the main function, which is the one responsible for reading the input variables and calling the other functions.</a:t>
+            </a:r>
+          </a:p>
+          <a:p>
+            <a:r>
+              <a:rPr lang="en-US" dirty="0"/>
+              <a:t>The </a:t>
+            </a:r>
+            <a:r>
+              <a:rPr lang="en-US" dirty="0" err="1"/>
+              <a:t>arithmeticExpression</a:t>
+            </a:r>
+            <a:r>
+              <a:rPr lang="en-US" dirty="0"/>
+              <a:t>, </a:t>
+            </a:r>
+            <a:r>
+              <a:rPr lang="en-US" dirty="0" err="1"/>
+              <a:t>powerOfTwo</a:t>
+            </a:r>
+            <a:r>
+              <a:rPr lang="en-US" dirty="0"/>
+              <a:t>, and </a:t>
+            </a:r>
+            <a:r>
+              <a:rPr lang="en-US" dirty="0" err="1"/>
+              <a:t>powerOfSomething</a:t>
+            </a:r>
+            <a:r>
+              <a:rPr lang="en-US" dirty="0"/>
+              <a:t> return values. So in order to call them inside of the main function, we need to either have a variable that stores the returned value or we need to call the function inside of the print function, so the returned value is going to be printed.</a:t>
+            </a:r>
+          </a:p>
+          <a:p>
+            <a:r>
+              <a:rPr lang="en-US" dirty="0"/>
+              <a:t>Python interpreter will start reading the file top to bottom. He will identify each function by its name and parameters, when it reaches the last line of the program it will call the main function. The first three instructions in main are input from the terminal. After the inputs are done, the </a:t>
+            </a:r>
+            <a:r>
+              <a:rPr lang="en-US" dirty="0" err="1"/>
+              <a:t>arithmeticExpression</a:t>
+            </a:r>
+            <a:r>
+              <a:rPr lang="en-US" dirty="0"/>
+              <a:t> function is being called by passing three parameters (which is the number of parameters that the function is expecting to receive) and the returned valued is being stored in the average variable.</a:t>
+            </a:r>
+          </a:p>
+          <a:p>
+            <a:r>
+              <a:rPr lang="en-US" dirty="0"/>
+              <a:t>After that an output message is printed, it is printed only one decimal number after the point.</a:t>
+            </a:r>
+          </a:p>
+          <a:p>
+            <a:r>
+              <a:rPr lang="en-US" dirty="0"/>
+              <a:t>Then the print function is being used again, and its parameter is a call to </a:t>
+            </a:r>
+            <a:r>
+              <a:rPr lang="en-US" dirty="0" err="1"/>
+              <a:t>powerOfTwo</a:t>
+            </a:r>
+            <a:r>
+              <a:rPr lang="en-US" dirty="0"/>
+              <a:t> function which has a parameter itself. The returned value of the </a:t>
+            </a:r>
+            <a:r>
+              <a:rPr lang="en-US" dirty="0" err="1"/>
+              <a:t>powerOfTwo</a:t>
+            </a:r>
+            <a:r>
+              <a:rPr lang="en-US" dirty="0"/>
+              <a:t> function will be used as the parameter to be printed.</a:t>
+            </a:r>
+          </a:p>
+          <a:p>
+            <a:r>
+              <a:rPr lang="en-US" dirty="0"/>
+              <a:t>The last print is calling the </a:t>
+            </a:r>
+            <a:r>
+              <a:rPr lang="en-US" dirty="0" err="1"/>
+              <a:t>powerOfSomething</a:t>
+            </a:r>
+            <a:r>
+              <a:rPr lang="en-US" dirty="0"/>
+              <a:t> function. That function has two parameters. In our example, the first one is the </a:t>
+            </a:r>
+            <a:r>
+              <a:rPr lang="en-US" dirty="0" err="1"/>
+              <a:t>powerOfTwo</a:t>
+            </a:r>
+            <a:r>
+              <a:rPr lang="en-US" dirty="0"/>
+              <a:t> function with number 2 as its parameter, the second parameter of </a:t>
+            </a:r>
+            <a:r>
+              <a:rPr lang="en-US" dirty="0" err="1"/>
+              <a:t>powerOfSometing</a:t>
+            </a:r>
+            <a:r>
+              <a:rPr lang="en-US" dirty="0"/>
+              <a:t> is val1. The order of the execution is, first </a:t>
+            </a:r>
+            <a:r>
+              <a:rPr lang="en-US" dirty="0" err="1"/>
+              <a:t>powerOfTwo</a:t>
+            </a:r>
+            <a:r>
+              <a:rPr lang="en-US" dirty="0"/>
+              <a:t> is called, its result is then used as the first parameter for </a:t>
+            </a:r>
+            <a:r>
+              <a:rPr lang="en-US" dirty="0" err="1"/>
+              <a:t>powerOfSomething</a:t>
+            </a:r>
+            <a:r>
+              <a:rPr lang="en-US" dirty="0"/>
+              <a:t>, then </a:t>
+            </a:r>
+            <a:r>
+              <a:rPr lang="en-US" dirty="0" err="1"/>
+              <a:t>powerOfSomething</a:t>
+            </a:r>
+            <a:r>
+              <a:rPr lang="en-US" dirty="0"/>
+              <a:t> is called and its result is going to be printed.</a:t>
+            </a:r>
+          </a:p>
+          <a:p>
+            <a:r>
+              <a:rPr lang="en-US" dirty="0"/>
+              <a:t>Watch the video that shows a step-by-step execution of this program in the Python tutor webpage.</a:t>
+            </a:r>
+          </a:p>
+        </p:txBody>
+      </p:sp>
+    </p:spTree>
+    <p:extLst>
+      <p:ext uri="{BB962C8B-B14F-4D97-AF65-F5344CB8AC3E}">
+        <p14:creationId xmlns:p14="http://schemas.microsoft.com/office/powerpoint/2010/main" val="2696206842"/>
       </p:ext>
     </p:extLst>
   </p:cSld>
@@ -21699,7 +21994,7 @@
           <p:cNvPr id="2" name="Title 1">
             <a:extLst>
               <a:ext uri="{FF2B5EF4-FFF2-40B4-BE49-F238E27FC236}">
-                <a16:creationId xmlns:a16="http://schemas.microsoft.com/office/drawing/2014/main" id="{950898D6-D36C-544F-AF62-95730C14E0C8}"/>
+                <a16:creationId xmlns:a16="http://schemas.microsoft.com/office/drawing/2014/main" id="{EDFD9FCD-80DE-7643-B6B7-559607D5CD6F}"/>
               </a:ext>
             </a:extLst>
           </p:cNvPr>
@@ -21712,7 +22007,7 @@
         </p:nvSpPr>
         <p:spPr>
           <a:xfrm>
-            <a:off x="415638" y="161243"/>
+            <a:off x="415638" y="16882"/>
             <a:ext cx="8312700" cy="672000"/>
           </a:xfrm>
         </p:spPr>
@@ -21722,7 +22017,7 @@
           <a:p>
             <a:r>
               <a:rPr lang="en-US" dirty="0"/>
-              <a:t>Student Challenge</a:t>
+              <a:t>Return Values – More Examples</a:t>
             </a:r>
           </a:p>
         </p:txBody>
@@ -21732,7 +22027,7 @@
           <p:cNvPr id="3" name="Text Placeholder 2">
             <a:extLst>
               <a:ext uri="{FF2B5EF4-FFF2-40B4-BE49-F238E27FC236}">
-                <a16:creationId xmlns:a16="http://schemas.microsoft.com/office/drawing/2014/main" id="{30DD9082-94D2-634F-9F23-5B100F336198}"/>
+                <a16:creationId xmlns:a16="http://schemas.microsoft.com/office/drawing/2014/main" id="{70BDAB88-183E-384C-92FE-602F163E4B06}"/>
               </a:ext>
             </a:extLst>
           </p:cNvPr>
@@ -21745,8 +22040,8 @@
         </p:nvSpPr>
         <p:spPr>
           <a:xfrm>
-            <a:off x="415638" y="884155"/>
-            <a:ext cx="8312700" cy="3936201"/>
+            <a:off x="415638" y="742758"/>
+            <a:ext cx="8097425" cy="527242"/>
           </a:xfrm>
         </p:spPr>
         <p:txBody>
@@ -21755,95 +22050,82 @@
           <a:p>
             <a:r>
               <a:rPr lang="en-US" sz="1800" dirty="0"/>
-              <a:t>Team Coding</a:t>
-            </a:r>
-          </a:p>
-          <a:p>
-            <a:r>
-              <a:rPr lang="en-US" sz="1800" dirty="0"/>
-              <a:t>As group, write two functions</a:t>
-            </a:r>
-          </a:p>
-          <a:p>
-            <a:pPr lvl="1"/>
-            <a:r>
-              <a:rPr lang="en-US" sz="1400" dirty="0"/>
-              <a:t>The first function takes in two parameters – first, last</a:t>
-            </a:r>
-          </a:p>
-          <a:p>
-            <a:pPr lvl="2"/>
-            <a:r>
-              <a:rPr lang="en-US" sz="1400" dirty="0"/>
-              <a:t>It prints the ”welcome to the class (last), (first)”</a:t>
-            </a:r>
-          </a:p>
-          <a:p>
-            <a:pPr lvl="1"/>
-            <a:r>
-              <a:rPr lang="en-US" sz="1400" dirty="0"/>
-              <a:t>The second function </a:t>
-            </a:r>
-          </a:p>
-          <a:p>
-            <a:pPr lvl="2"/>
-            <a:r>
-              <a:rPr lang="en-US" sz="1400" dirty="0"/>
-              <a:t>Calls input to ask the client their first name</a:t>
-            </a:r>
-          </a:p>
-          <a:p>
-            <a:pPr lvl="2"/>
-            <a:r>
-              <a:rPr lang="en-US" sz="1400" dirty="0"/>
-              <a:t>It calls input a second time to ask them their last name</a:t>
-            </a:r>
-          </a:p>
-          <a:p>
-            <a:pPr lvl="2"/>
-            <a:r>
-              <a:rPr lang="en-US" sz="1400" dirty="0"/>
-              <a:t>it calls your first function to print out the result</a:t>
-            </a:r>
-          </a:p>
-          <a:p>
-            <a:pPr lvl="2"/>
-            <a:endParaRPr lang="en-US" dirty="0"/>
-          </a:p>
-          <a:p>
-            <a:r>
-              <a:rPr lang="en-US" sz="1400" dirty="0"/>
-              <a:t>Have one person on the table code using their laptop and </a:t>
-            </a:r>
-            <a:r>
-              <a:rPr lang="en-US" sz="1400" dirty="0" err="1"/>
-              <a:t>zybooks</a:t>
-            </a:r>
-            <a:r>
-              <a:rPr lang="en-US" sz="1400" dirty="0"/>
-              <a:t> IDE</a:t>
-            </a:r>
-          </a:p>
-          <a:p>
-            <a:pPr lvl="1"/>
-            <a:r>
-              <a:rPr lang="en-US" sz="1400" dirty="0"/>
-              <a:t>The person who codes has to limit their input. They follow the instructions of others</a:t>
-            </a:r>
-          </a:p>
-          <a:p>
-            <a:pPr lvl="1"/>
-            <a:r>
-              <a:rPr lang="en-US" sz="1400" dirty="0"/>
-              <a:t>We will alternate who codes each class, so you won’t always be typing.</a:t>
-            </a:r>
+              <a:t>Lets analyze the program below:</a:t>
+            </a:r>
+            <a:endParaRPr lang="en-US" sz="1600" dirty="0"/>
+          </a:p>
+          <a:p>
+            <a:pPr marL="152407" indent="0">
+              <a:buNone/>
+            </a:pPr>
+            <a:endParaRPr lang="en-US" sz="1400" dirty="0"/>
           </a:p>
         </p:txBody>
       </p:sp>
+      <p:pic>
+        <p:nvPicPr>
+          <p:cNvPr id="6" name="Picture 5">
+            <a:extLst>
+              <a:ext uri="{FF2B5EF4-FFF2-40B4-BE49-F238E27FC236}">
+                <a16:creationId xmlns:a16="http://schemas.microsoft.com/office/drawing/2014/main" id="{A599CDBC-7A27-4275-8175-D8782301F827}"/>
+              </a:ext>
+            </a:extLst>
+          </p:cNvPr>
+          <p:cNvPicPr>
+            <a:picLocks noChangeAspect="1"/>
+          </p:cNvPicPr>
+          <p:nvPr/>
+        </p:nvPicPr>
+        <p:blipFill>
+          <a:blip r:embed="rId3"/>
+          <a:stretch>
+            <a:fillRect/>
+          </a:stretch>
+        </p:blipFill>
+        <p:spPr>
+          <a:xfrm>
+            <a:off x="870857" y="1270000"/>
+            <a:ext cx="6212114" cy="1432880"/>
+          </a:xfrm>
+          <a:prstGeom prst="rect">
+            <a:avLst/>
+          </a:prstGeom>
+        </p:spPr>
+      </p:pic>
+      <p:pic>
+        <p:nvPicPr>
+          <p:cNvPr id="7" name="Picture 6">
+            <a:extLst>
+              <a:ext uri="{FF2B5EF4-FFF2-40B4-BE49-F238E27FC236}">
+                <a16:creationId xmlns:a16="http://schemas.microsoft.com/office/drawing/2014/main" id="{5EA1B788-DB3E-4431-990D-6AA0B8D650EB}"/>
+              </a:ext>
+            </a:extLst>
+          </p:cNvPr>
+          <p:cNvPicPr>
+            <a:picLocks noChangeAspect="1"/>
+          </p:cNvPicPr>
+          <p:nvPr/>
+        </p:nvPicPr>
+        <p:blipFill>
+          <a:blip r:embed="rId4"/>
+          <a:stretch>
+            <a:fillRect/>
+          </a:stretch>
+        </p:blipFill>
+        <p:spPr>
+          <a:xfrm>
+            <a:off x="870857" y="2685143"/>
+            <a:ext cx="6212114" cy="1696642"/>
+          </a:xfrm>
+          <a:prstGeom prst="rect">
+            <a:avLst/>
+          </a:prstGeom>
+        </p:spPr>
+      </p:pic>
     </p:spTree>
     <p:extLst>
       <p:ext uri="{BB962C8B-B14F-4D97-AF65-F5344CB8AC3E}">
-        <p14:creationId xmlns:p14="http://schemas.microsoft.com/office/powerpoint/2010/main" val="109925682"/>
+        <p14:creationId xmlns:p14="http://schemas.microsoft.com/office/powerpoint/2010/main" val="4248284535"/>
       </p:ext>
     </p:extLst>
   </p:cSld>
@@ -21886,7 +22168,7 @@
         <p:spPr>
           <a:xfrm>
             <a:off x="274943" y="86078"/>
-            <a:ext cx="8312700" cy="672000"/>
+            <a:ext cx="8312700" cy="1175794"/>
           </a:xfrm>
           <a:prstGeom prst="rect">
             <a:avLst/>
@@ -21900,7 +22182,7 @@
           <a:p>
             <a:r>
               <a:rPr lang="en-US" dirty="0"/>
-              <a:t>Recall Activity – From Your Readings</a:t>
+              <a:t>Incremental Development and Function Stubs</a:t>
             </a:r>
             <a:endParaRPr dirty="0"/>
           </a:p>
@@ -21924,8 +22206,8 @@
         </p:nvSpPr>
         <p:spPr>
           <a:xfrm>
-            <a:off x="274943" y="728086"/>
-            <a:ext cx="3241962" cy="4025195"/>
+            <a:off x="274943" y="1261872"/>
+            <a:ext cx="3241962" cy="3491409"/>
           </a:xfrm>
         </p:spPr>
         <p:txBody>
@@ -21954,18 +22236,6 @@
               <a:rPr lang="en-US" sz="1800" dirty="0"/>
               <a:t>What does the pass keyword mean? When is it used?</a:t>
             </a:r>
-          </a:p>
-          <a:p>
-            <a:endParaRPr lang="en-US" sz="1800" dirty="0"/>
-          </a:p>
-          <a:p>
-            <a:r>
-              <a:rPr lang="en-US" sz="1800" dirty="0"/>
-              <a:t>Discuss your answer with your group</a:t>
-            </a:r>
-          </a:p>
-          <a:p>
-            <a:endParaRPr lang="en-US" sz="1800" dirty="0"/>
           </a:p>
         </p:txBody>
       </p:sp>
@@ -21991,7 +22261,7 @@
         </p:blipFill>
         <p:spPr>
           <a:xfrm>
-            <a:off x="3785658" y="1032227"/>
+            <a:off x="3785658" y="1336367"/>
             <a:ext cx="5358342" cy="3416914"/>
           </a:xfrm>
           <a:prstGeom prst="rect">
@@ -22056,7 +22326,11 @@
           <a:p>
             <a:r>
               <a:rPr lang="en-US" dirty="0"/>
-              <a:t>Recall Activity – From Your Readings</a:t>
+              <a:t>Docstring and </a:t>
+            </a:r>
+            <a:r>
+              <a:rPr lang="en-US"/>
+              <a:t>help function</a:t>
             </a:r>
             <a:endParaRPr dirty="0"/>
           </a:p>
@@ -22150,6 +22424,167 @@
 </p:sld>
 </file>
 
+<file path=ppt/slides/slide13.xml><?xml version="1.0" encoding="utf-8"?>
+<p:sld xmlns:a="http://schemas.openxmlformats.org/drawingml/2006/main" xmlns:r="http://schemas.openxmlformats.org/officeDocument/2006/relationships" xmlns:p="http://schemas.openxmlformats.org/presentationml/2006/main">
+  <p:cSld>
+    <p:spTree>
+      <p:nvGrpSpPr>
+        <p:cNvPr id="1" name=""/>
+        <p:cNvGrpSpPr/>
+        <p:nvPr/>
+      </p:nvGrpSpPr>
+      <p:grpSpPr>
+        <a:xfrm>
+          <a:off x="0" y="0"/>
+          <a:ext cx="0" cy="0"/>
+          <a:chOff x="0" y="0"/>
+          <a:chExt cx="0" cy="0"/>
+        </a:xfrm>
+      </p:grpSpPr>
+      <p:sp>
+        <p:nvSpPr>
+          <p:cNvPr id="2" name="Title 1">
+            <a:extLst>
+              <a:ext uri="{FF2B5EF4-FFF2-40B4-BE49-F238E27FC236}">
+                <a16:creationId xmlns:a16="http://schemas.microsoft.com/office/drawing/2014/main" id="{950898D6-D36C-544F-AF62-95730C14E0C8}"/>
+              </a:ext>
+            </a:extLst>
+          </p:cNvPr>
+          <p:cNvSpPr>
+            <a:spLocks noGrp="1"/>
+          </p:cNvSpPr>
+          <p:nvPr>
+            <p:ph type="title"/>
+          </p:nvPr>
+        </p:nvSpPr>
+        <p:spPr>
+          <a:xfrm>
+            <a:off x="415638" y="161243"/>
+            <a:ext cx="8312700" cy="672000"/>
+          </a:xfrm>
+        </p:spPr>
+        <p:txBody>
+          <a:bodyPr/>
+          <a:lstStyle/>
+          <a:p>
+            <a:r>
+              <a:rPr lang="en-US" dirty="0"/>
+              <a:t>Student Challenge</a:t>
+            </a:r>
+          </a:p>
+        </p:txBody>
+      </p:sp>
+      <p:sp>
+        <p:nvSpPr>
+          <p:cNvPr id="3" name="Text Placeholder 2">
+            <a:extLst>
+              <a:ext uri="{FF2B5EF4-FFF2-40B4-BE49-F238E27FC236}">
+                <a16:creationId xmlns:a16="http://schemas.microsoft.com/office/drawing/2014/main" id="{30DD9082-94D2-634F-9F23-5B100F336198}"/>
+              </a:ext>
+            </a:extLst>
+          </p:cNvPr>
+          <p:cNvSpPr>
+            <a:spLocks noGrp="1"/>
+          </p:cNvSpPr>
+          <p:nvPr>
+            <p:ph type="body" idx="1"/>
+          </p:nvPr>
+        </p:nvSpPr>
+        <p:spPr>
+          <a:xfrm>
+            <a:off x="415638" y="884155"/>
+            <a:ext cx="8312700" cy="3936201"/>
+          </a:xfrm>
+        </p:spPr>
+        <p:txBody>
+          <a:bodyPr/>
+          <a:lstStyle/>
+          <a:p>
+            <a:r>
+              <a:rPr lang="en-US" sz="1800" dirty="0"/>
+              <a:t>Write two functions</a:t>
+            </a:r>
+          </a:p>
+          <a:p>
+            <a:pPr lvl="1"/>
+            <a:r>
+              <a:rPr lang="en-US" sz="1400" dirty="0"/>
+              <a:t>The first function takes in two parameters – first, last</a:t>
+            </a:r>
+          </a:p>
+          <a:p>
+            <a:pPr lvl="2"/>
+            <a:r>
+              <a:rPr lang="en-US" sz="1400" dirty="0"/>
+              <a:t>It prints the ”welcome to the class (last), (first)”</a:t>
+            </a:r>
+          </a:p>
+          <a:p>
+            <a:pPr lvl="1"/>
+            <a:r>
+              <a:rPr lang="en-US" sz="1400" dirty="0"/>
+              <a:t>The second function </a:t>
+            </a:r>
+          </a:p>
+          <a:p>
+            <a:pPr lvl="2"/>
+            <a:r>
+              <a:rPr lang="en-US" sz="1400" dirty="0"/>
+              <a:t>Calls input to ask the client their first name</a:t>
+            </a:r>
+          </a:p>
+          <a:p>
+            <a:pPr lvl="2"/>
+            <a:r>
+              <a:rPr lang="en-US" sz="1400" dirty="0"/>
+              <a:t>It calls input a second time to ask them their last name</a:t>
+            </a:r>
+          </a:p>
+          <a:p>
+            <a:pPr lvl="2"/>
+            <a:r>
+              <a:rPr lang="en-US" sz="1400" dirty="0"/>
+              <a:t>it calls your first function to print out the result</a:t>
+            </a:r>
+          </a:p>
+          <a:p>
+            <a:pPr lvl="2"/>
+            <a:endParaRPr lang="en-US" dirty="0"/>
+          </a:p>
+          <a:p>
+            <a:r>
+              <a:rPr lang="en-US" sz="1800" dirty="0"/>
+              <a:t>Use the Python Tutor editor (</a:t>
+            </a:r>
+            <a:r>
+              <a:rPr lang="en-US" sz="1800" dirty="0">
+                <a:hlinkClick r:id="rId2"/>
+              </a:rPr>
+              <a:t>https://pythontutor.com/visualize.html#mode=edit</a:t>
+            </a:r>
+            <a:r>
+              <a:rPr lang="en-US" sz="1800" dirty="0"/>
+              <a:t>)  to see a step-by-step execution of your program.</a:t>
+            </a:r>
+          </a:p>
+        </p:txBody>
+      </p:sp>
+    </p:spTree>
+    <p:extLst>
+      <p:ext uri="{BB962C8B-B14F-4D97-AF65-F5344CB8AC3E}">
+        <p14:creationId xmlns:p14="http://schemas.microsoft.com/office/powerpoint/2010/main" val="109925682"/>
+      </p:ext>
+    </p:extLst>
+  </p:cSld>
+  <p:clrMapOvr>
+    <a:masterClrMapping/>
+  </p:clrMapOvr>
+  <p:transition>
+    <p:fade/>
+  </p:transition>
+</p:sld>
+</file>
+
 <file path=ppt/slides/slide2.xml><?xml version="1.0" encoding="utf-8"?>
 <p:sld xmlns:a="http://schemas.openxmlformats.org/drawingml/2006/main" xmlns:r="http://schemas.openxmlformats.org/officeDocument/2006/relationships" xmlns:p="http://schemas.openxmlformats.org/presentationml/2006/main">
   <p:cSld>
@@ -22414,123 +22849,6 @@
   <p:cSld>
     <p:spTree>
       <p:nvGrpSpPr>
-        <p:cNvPr id="1" name="Shape 191"/>
-        <p:cNvGrpSpPr/>
-        <p:nvPr/>
-      </p:nvGrpSpPr>
-      <p:grpSpPr>
-        <a:xfrm>
-          <a:off x="0" y="0"/>
-          <a:ext cx="0" cy="0"/>
-          <a:chOff x="0" y="0"/>
-          <a:chExt cx="0" cy="0"/>
-        </a:xfrm>
-      </p:grpSpPr>
-      <p:sp>
-        <p:nvSpPr>
-          <p:cNvPr id="192" name="Google Shape;192;p40"/>
-          <p:cNvSpPr txBox="1">
-            <a:spLocks noGrp="1"/>
-          </p:cNvSpPr>
-          <p:nvPr>
-            <p:ph type="title"/>
-          </p:nvPr>
-        </p:nvSpPr>
-        <p:spPr>
-          <a:xfrm>
-            <a:off x="489432" y="252226"/>
-            <a:ext cx="8312700" cy="672000"/>
-          </a:xfrm>
-          <a:prstGeom prst="rect">
-            <a:avLst/>
-          </a:prstGeom>
-        </p:spPr>
-        <p:txBody>
-          <a:bodyPr spcFirstLastPara="1" vert="horz" wrap="square" lIns="60500" tIns="60500" rIns="60500" bIns="60500" rtlCol="0" anchor="b" anchorCtr="0">
-            <a:noAutofit/>
-          </a:bodyPr>
-          <a:lstStyle/>
-          <a:p>
-            <a:r>
-              <a:rPr lang="en-US" dirty="0"/>
-              <a:t>Recall Activity</a:t>
-            </a:r>
-            <a:endParaRPr dirty="0"/>
-          </a:p>
-        </p:txBody>
-      </p:sp>
-      <p:sp>
-        <p:nvSpPr>
-          <p:cNvPr id="6" name="Text Placeholder 5">
-            <a:extLst>
-              <a:ext uri="{FF2B5EF4-FFF2-40B4-BE49-F238E27FC236}">
-                <a16:creationId xmlns:a16="http://schemas.microsoft.com/office/drawing/2014/main" id="{BBA84413-A189-4E45-8BC1-0BAF8D04460A}"/>
-              </a:ext>
-            </a:extLst>
-          </p:cNvPr>
-          <p:cNvSpPr>
-            <a:spLocks noGrp="1"/>
-          </p:cNvSpPr>
-          <p:nvPr>
-            <p:ph type="body" idx="1"/>
-          </p:nvPr>
-        </p:nvSpPr>
-        <p:spPr>
-          <a:xfrm>
-            <a:off x="464818" y="1150620"/>
-            <a:ext cx="7917181" cy="3322320"/>
-          </a:xfrm>
-        </p:spPr>
-        <p:txBody>
-          <a:bodyPr/>
-          <a:lstStyle/>
-          <a:p>
-            <a:r>
-              <a:rPr lang="en-US" sz="1800" dirty="0"/>
-              <a:t>Individually</a:t>
-            </a:r>
-          </a:p>
-          <a:p>
-            <a:pPr lvl="1"/>
-            <a:r>
-              <a:rPr lang="en-US" sz="1600" dirty="0"/>
-              <a:t>Grab a paper and write at least three concepts that you can remember from our last class</a:t>
-            </a:r>
-          </a:p>
-          <a:p>
-            <a:r>
-              <a:rPr lang="en-US" sz="1700" dirty="0"/>
-              <a:t>With your neighbor(s)</a:t>
-            </a:r>
-          </a:p>
-          <a:p>
-            <a:pPr lvl="1"/>
-            <a:r>
-              <a:rPr lang="en-US" sz="1600" dirty="0"/>
-              <a:t>Discuss what each other could remember. Did you remember the same things? What did you learn from each other?</a:t>
-            </a:r>
-          </a:p>
-          <a:p>
-            <a:r>
-              <a:rPr lang="en-US" sz="1700" dirty="0"/>
-              <a:t>Turn you paper to the TAs or myself at the end of the class</a:t>
-            </a:r>
-          </a:p>
-        </p:txBody>
-      </p:sp>
-    </p:spTree>
-  </p:cSld>
-  <p:clrMapOvr>
-    <a:masterClrMapping/>
-  </p:clrMapOvr>
-</p:sld>
-</file>
-
-<file path=ppt/slides/slide4.xml><?xml version="1.0" encoding="utf-8"?>
-<p:sld xmlns:a="http://schemas.openxmlformats.org/drawingml/2006/main" xmlns:r="http://schemas.openxmlformats.org/officeDocument/2006/relationships" xmlns:p="http://schemas.openxmlformats.org/presentationml/2006/main">
-  <p:cSld>
-    <p:spTree>
-      <p:nvGrpSpPr>
         <p:cNvPr id="1" name="Shape 222"/>
         <p:cNvGrpSpPr/>
         <p:nvPr/>
@@ -22579,7 +22897,7 @@
             </a:pPr>
             <a:r>
               <a:rPr lang="en-US" sz="2800" dirty="0"/>
-              <a:t>Remembering - Peer Coding from Last Class</a:t>
+              <a:t>Remembering - Coding from Last Class</a:t>
             </a:r>
             <a:endParaRPr sz="2800" dirty="0"/>
           </a:p>
@@ -22706,7 +23024,7 @@
 </p:sld>
 </file>
 
-<file path=ppt/slides/slide5.xml><?xml version="1.0" encoding="utf-8"?>
+<file path=ppt/slides/slide4.xml><?xml version="1.0" encoding="utf-8"?>
 <p:sld xmlns:a="http://schemas.openxmlformats.org/drawingml/2006/main" xmlns:r="http://schemas.openxmlformats.org/officeDocument/2006/relationships" xmlns:p="http://schemas.openxmlformats.org/presentationml/2006/main">
   <p:cSld>
     <p:spTree>
@@ -22813,7 +23131,7 @@
           <p:nvPr/>
         </p:nvPicPr>
         <p:blipFill>
-          <a:blip r:embed="rId2"/>
+          <a:blip r:embed="rId3"/>
           <a:stretch>
             <a:fillRect/>
           </a:stretch>
@@ -23123,7 +23441,7 @@
 </p:sld>
 </file>
 
-<file path=ppt/slides/slide6.xml><?xml version="1.0" encoding="utf-8"?>
+<file path=ppt/slides/slide5.xml><?xml version="1.0" encoding="utf-8"?>
 <p:sld xmlns:a="http://schemas.openxmlformats.org/drawingml/2006/main" xmlns:r="http://schemas.openxmlformats.org/officeDocument/2006/relationships" xmlns:p="http://schemas.openxmlformats.org/presentationml/2006/main">
   <p:cSld>
     <p:spTree>
@@ -23563,7 +23881,7 @@
 </p:sld>
 </file>
 
-<file path=ppt/slides/slide7.xml><?xml version="1.0" encoding="utf-8"?>
+<file path=ppt/slides/slide6.xml><?xml version="1.0" encoding="utf-8"?>
 <p:sld xmlns:a="http://schemas.openxmlformats.org/drawingml/2006/main" xmlns:r="http://schemas.openxmlformats.org/officeDocument/2006/relationships" xmlns:p="http://schemas.openxmlformats.org/presentationml/2006/main">
   <p:cSld>
     <p:spTree>
@@ -23598,7 +23916,7 @@
         </p:nvSpPr>
         <p:spPr>
           <a:xfrm>
-            <a:off x="318533" y="156303"/>
+            <a:off x="89933" y="160393"/>
             <a:ext cx="8312700" cy="672000"/>
           </a:xfrm>
         </p:spPr>
@@ -23608,7 +23926,7 @@
           <a:p>
             <a:r>
               <a:rPr lang="en-US" dirty="0"/>
-              <a:t>Function</a:t>
+              <a:t>Function – Part 1</a:t>
             </a:r>
           </a:p>
         </p:txBody>
@@ -23686,7 +24004,7 @@
             <a:pPr lvl="1"/>
             <a:r>
               <a:rPr lang="en-US" sz="1600" dirty="0"/>
-              <a:t>print(your value) </a:t>
+              <a:t>print(value) </a:t>
             </a:r>
           </a:p>
           <a:p>
@@ -23700,7 +24018,7 @@
             <a:pPr lvl="2"/>
             <a:r>
               <a:rPr lang="en-US" sz="1600" dirty="0"/>
-              <a:t>your value is a parameter!</a:t>
+              <a:t>value is a parameter!</a:t>
             </a:r>
           </a:p>
         </p:txBody>
@@ -23720,7 +24038,7 @@
           <p:nvPr/>
         </p:nvPicPr>
         <p:blipFill>
-          <a:blip r:embed="rId2"/>
+          <a:blip r:embed="rId3"/>
           <a:stretch>
             <a:fillRect/>
           </a:stretch>
@@ -23961,7 +24279,7 @@
 </p:sld>
 </file>
 
-<file path=ppt/slides/slide8.xml><?xml version="1.0" encoding="utf-8"?>
+<file path=ppt/slides/slide7.xml><?xml version="1.0" encoding="utf-8"?>
 <p:sld xmlns:a="http://schemas.openxmlformats.org/drawingml/2006/main" xmlns:r="http://schemas.openxmlformats.org/officeDocument/2006/relationships" xmlns:p="http://schemas.openxmlformats.org/presentationml/2006/main">
   <p:cSld>
     <p:spTree>
@@ -23996,8 +24314,8 @@
         </p:nvSpPr>
         <p:spPr>
           <a:xfrm>
-            <a:off x="318533" y="156303"/>
-            <a:ext cx="3102000" cy="672000"/>
+            <a:off x="0" y="156303"/>
+            <a:ext cx="3637362" cy="672000"/>
           </a:xfrm>
         </p:spPr>
         <p:txBody>
@@ -24006,7 +24324,7 @@
           <a:p>
             <a:r>
               <a:rPr lang="en-US" dirty="0"/>
-              <a:t>Function</a:t>
+              <a:t>Function – Part 2</a:t>
             </a:r>
           </a:p>
         </p:txBody>
@@ -24026,7 +24344,7 @@
           <p:nvPr/>
         </p:nvPicPr>
         <p:blipFill>
-          <a:blip r:embed="rId2"/>
+          <a:blip r:embed="rId3"/>
           <a:stretch>
             <a:fillRect/>
           </a:stretch>
@@ -24056,7 +24374,7 @@
           <p:nvPr/>
         </p:nvPicPr>
         <p:blipFill>
-          <a:blip r:embed="rId3"/>
+          <a:blip r:embed="rId4"/>
           <a:stretch>
             <a:fillRect/>
           </a:stretch>
@@ -24129,7 +24447,7 @@
           <p:nvPr/>
         </p:nvPicPr>
         <p:blipFill>
-          <a:blip r:embed="rId4"/>
+          <a:blip r:embed="rId5"/>
           <a:stretch>
             <a:fillRect/>
           </a:stretch>
@@ -24372,6 +24690,102 @@
 </p:sld>
 </file>
 
+<file path=ppt/slides/slide8.xml><?xml version="1.0" encoding="utf-8"?>
+<p:sld xmlns:a="http://schemas.openxmlformats.org/drawingml/2006/main" xmlns:r="http://schemas.openxmlformats.org/officeDocument/2006/relationships" xmlns:p="http://schemas.openxmlformats.org/presentationml/2006/main">
+  <p:cSld>
+    <p:spTree>
+      <p:nvGrpSpPr>
+        <p:cNvPr id="1" name=""/>
+        <p:cNvGrpSpPr/>
+        <p:nvPr/>
+      </p:nvGrpSpPr>
+      <p:grpSpPr>
+        <a:xfrm>
+          <a:off x="0" y="0"/>
+          <a:ext cx="0" cy="0"/>
+          <a:chOff x="0" y="0"/>
+          <a:chExt cx="0" cy="0"/>
+        </a:xfrm>
+      </p:grpSpPr>
+      <p:sp>
+        <p:nvSpPr>
+          <p:cNvPr id="2" name="Title 1">
+            <a:extLst>
+              <a:ext uri="{FF2B5EF4-FFF2-40B4-BE49-F238E27FC236}">
+                <a16:creationId xmlns:a16="http://schemas.microsoft.com/office/drawing/2014/main" id="{CA19BA98-269C-AE43-9819-F21FFB060478}"/>
+              </a:ext>
+            </a:extLst>
+          </p:cNvPr>
+          <p:cNvSpPr>
+            <a:spLocks noGrp="1"/>
+          </p:cNvSpPr>
+          <p:nvPr>
+            <p:ph type="title"/>
+          </p:nvPr>
+        </p:nvSpPr>
+        <p:spPr>
+          <a:xfrm>
+            <a:off x="318532" y="156303"/>
+            <a:ext cx="4811251" cy="672000"/>
+          </a:xfrm>
+        </p:spPr>
+        <p:txBody>
+          <a:bodyPr/>
+          <a:lstStyle/>
+          <a:p>
+            <a:r>
+              <a:rPr lang="en-US" dirty="0"/>
+              <a:t>Function – Part 3</a:t>
+            </a:r>
+          </a:p>
+        </p:txBody>
+      </p:sp>
+      <p:pic>
+        <p:nvPicPr>
+          <p:cNvPr id="3" name="Picture 2">
+            <a:extLst>
+              <a:ext uri="{FF2B5EF4-FFF2-40B4-BE49-F238E27FC236}">
+                <a16:creationId xmlns:a16="http://schemas.microsoft.com/office/drawing/2014/main" id="{FDCDC68F-2015-4B51-AD0C-3DBED745F858}"/>
+              </a:ext>
+            </a:extLst>
+          </p:cNvPr>
+          <p:cNvPicPr>
+            <a:picLocks noChangeAspect="1"/>
+          </p:cNvPicPr>
+          <p:nvPr/>
+        </p:nvPicPr>
+        <p:blipFill>
+          <a:blip r:embed="rId3"/>
+          <a:stretch>
+            <a:fillRect/>
+          </a:stretch>
+        </p:blipFill>
+        <p:spPr>
+          <a:xfrm>
+            <a:off x="402336" y="1303468"/>
+            <a:ext cx="8193024" cy="3055852"/>
+          </a:xfrm>
+          <a:prstGeom prst="rect">
+            <a:avLst/>
+          </a:prstGeom>
+        </p:spPr>
+      </p:pic>
+    </p:spTree>
+    <p:extLst>
+      <p:ext uri="{BB962C8B-B14F-4D97-AF65-F5344CB8AC3E}">
+        <p14:creationId xmlns:p14="http://schemas.microsoft.com/office/powerpoint/2010/main" val="933786182"/>
+      </p:ext>
+    </p:extLst>
+  </p:cSld>
+  <p:clrMapOvr>
+    <a:masterClrMapping/>
+  </p:clrMapOvr>
+  <p:transition>
+    <p:fade/>
+  </p:transition>
+</p:sld>
+</file>
+
 <file path=ppt/slides/slide9.xml><?xml version="1.0" encoding="utf-8"?>
 <p:sld xmlns:a="http://schemas.openxmlformats.org/drawingml/2006/main" xmlns:r="http://schemas.openxmlformats.org/officeDocument/2006/relationships" xmlns:p="http://schemas.openxmlformats.org/presentationml/2006/main">
   <p:cSld>
@@ -24440,8 +24854,8 @@
         </p:nvSpPr>
         <p:spPr>
           <a:xfrm>
-            <a:off x="415639" y="742758"/>
-            <a:ext cx="3675716" cy="1464663"/>
+            <a:off x="415638" y="742758"/>
+            <a:ext cx="8097425" cy="1640242"/>
           </a:xfrm>
         </p:spPr>
         <p:txBody>
@@ -24450,12 +24864,6 @@
           <a:p>
             <a:r>
               <a:rPr lang="en-US" sz="1800" dirty="0"/>
-              <a:t>Better yet</a:t>
-            </a:r>
-          </a:p>
-          <a:p>
-            <a:r>
-              <a:rPr lang="en-US" sz="1800" dirty="0"/>
               <a:t>Functions do some work</a:t>
             </a:r>
           </a:p>
@@ -24463,20 +24871,66 @@
             <a:pPr lvl="1"/>
             <a:r>
               <a:rPr lang="en-US" sz="1600" dirty="0"/>
-              <a:t>and then return the answer</a:t>
-            </a:r>
+              <a:t>and then return the answer of that work</a:t>
+            </a:r>
+          </a:p>
+          <a:p>
+            <a:r>
+              <a:rPr lang="en-US" sz="1700" dirty="0"/>
+              <a:t>Other programs can then use those answers</a:t>
+            </a:r>
+          </a:p>
+          <a:p>
+            <a:r>
+              <a:rPr lang="en-US" sz="1700" dirty="0"/>
+              <a:t>Always the best paradigm to follow</a:t>
+            </a:r>
+          </a:p>
+          <a:p>
+            <a:pPr lvl="1"/>
+            <a:endParaRPr lang="en-US" sz="1600" dirty="0"/>
           </a:p>
           <a:p>
             <a:endParaRPr lang="en-US" sz="1400" dirty="0"/>
           </a:p>
         </p:txBody>
       </p:sp>
+      <p:pic>
+        <p:nvPicPr>
+          <p:cNvPr id="7" name="Picture 6">
+            <a:extLst>
+              <a:ext uri="{FF2B5EF4-FFF2-40B4-BE49-F238E27FC236}">
+                <a16:creationId xmlns:a16="http://schemas.microsoft.com/office/drawing/2014/main" id="{273F4C86-378F-46D2-AD42-5A018970F28E}"/>
+              </a:ext>
+            </a:extLst>
+          </p:cNvPr>
+          <p:cNvPicPr>
+            <a:picLocks noChangeAspect="1"/>
+          </p:cNvPicPr>
+          <p:nvPr/>
+        </p:nvPicPr>
+        <p:blipFill>
+          <a:blip r:embed="rId3"/>
+          <a:stretch>
+            <a:fillRect/>
+          </a:stretch>
+        </p:blipFill>
+        <p:spPr>
+          <a:xfrm>
+            <a:off x="667512" y="2760500"/>
+            <a:ext cx="4462272" cy="1942982"/>
+          </a:xfrm>
+          <a:prstGeom prst="rect">
+            <a:avLst/>
+          </a:prstGeom>
+        </p:spPr>
+      </p:pic>
       <p:sp>
         <p:nvSpPr>
-          <p:cNvPr id="4" name="Rectangle 3">
+          <p:cNvPr id="8" name="Arrow: Left 7">
             <a:extLst>
               <a:ext uri="{FF2B5EF4-FFF2-40B4-BE49-F238E27FC236}">
-                <a16:creationId xmlns:a16="http://schemas.microsoft.com/office/drawing/2014/main" id="{785DF65D-37A5-4B40-93B0-4EE33B4018C6}"/>
+                <a16:creationId xmlns:a16="http://schemas.microsoft.com/office/drawing/2014/main" id="{B3B162F6-664E-48BD-8471-3B19C70ED9E9}"/>
               </a:ext>
             </a:extLst>
           </p:cNvPr>
@@ -24485,448 +24939,124 @@
         </p:nvSpPr>
         <p:spPr>
           <a:xfrm>
-            <a:off x="300354" y="2591190"/>
-            <a:ext cx="6056219" cy="2173993"/>
+            <a:off x="2148840" y="3127248"/>
+            <a:ext cx="3483864" cy="246888"/>
           </a:xfrm>
-          <a:prstGeom prst="rect">
+          <a:prstGeom prst="leftArrow">
             <a:avLst/>
           </a:prstGeom>
+          <a:solidFill>
+            <a:schemeClr val="accent6">
+              <a:lumMod val="75000"/>
+            </a:schemeClr>
+          </a:solidFill>
           <a:ln>
-            <a:solidFill>
-              <a:schemeClr val="tx2"/>
-            </a:solidFill>
+            <a:noFill/>
           </a:ln>
+          <a:effectLst/>
         </p:spPr>
+        <p:style>
+          <a:lnRef idx="1">
+            <a:schemeClr val="accent1"/>
+          </a:lnRef>
+          <a:fillRef idx="3">
+            <a:schemeClr val="accent1"/>
+          </a:fillRef>
+          <a:effectRef idx="2">
+            <a:schemeClr val="accent1"/>
+          </a:effectRef>
+          <a:fontRef idx="minor">
+            <a:schemeClr val="lt1"/>
+          </a:fontRef>
+        </p:style>
         <p:txBody>
-          <a:bodyPr wrap="square">
-            <a:spAutoFit/>
-          </a:bodyPr>
+          <a:bodyPr lIns="274320" tIns="182880" rIns="274320" bIns="182880" rtlCol="0" anchor="ctr"/>
           <a:lstStyle/>
           <a:p>
-            <a:r>
-              <a:rPr lang="en-US" dirty="0">
-                <a:solidFill>
-                  <a:srgbClr val="CC7832"/>
-                </a:solidFill>
-                <a:latin typeface="Consolas" panose="020B0609020204030204" pitchFamily="49" charset="0"/>
-                <a:cs typeface="Consolas" panose="020B0609020204030204" pitchFamily="49" charset="0"/>
-              </a:rPr>
-              <a:t>def </a:t>
-            </a:r>
-            <a:r>
-              <a:rPr lang="en-US" dirty="0" err="1">
-                <a:solidFill>
-                  <a:srgbClr val="FFC66D"/>
-                </a:solidFill>
-                <a:latin typeface="Consolas" panose="020B0609020204030204" pitchFamily="49" charset="0"/>
-                <a:cs typeface="Consolas" panose="020B0609020204030204" pitchFamily="49" charset="0"/>
-              </a:rPr>
-              <a:t>get_real_code</a:t>
-            </a:r>
-            <a:r>
-              <a:rPr lang="en-US" dirty="0">
-                <a:latin typeface="Consolas" panose="020B0609020204030204" pitchFamily="49" charset="0"/>
-                <a:cs typeface="Consolas" panose="020B0609020204030204" pitchFamily="49" charset="0"/>
-              </a:rPr>
-              <a:t>(code):</a:t>
-            </a:r>
-            <a:br>
-              <a:rPr lang="en-US" dirty="0">
-                <a:latin typeface="Consolas" panose="020B0609020204030204" pitchFamily="49" charset="0"/>
-                <a:cs typeface="Consolas" panose="020B0609020204030204" pitchFamily="49" charset="0"/>
-              </a:rPr>
-            </a:br>
-            <a:r>
-              <a:rPr lang="en-US" dirty="0">
-                <a:latin typeface="Consolas" panose="020B0609020204030204" pitchFamily="49" charset="0"/>
-                <a:cs typeface="Consolas" panose="020B0609020204030204" pitchFamily="49" charset="0"/>
-              </a:rPr>
-              <a:t>    </a:t>
-            </a:r>
-            <a:r>
-              <a:rPr lang="en-US" dirty="0">
-                <a:solidFill>
-                  <a:srgbClr val="CC7832"/>
-                </a:solidFill>
-                <a:latin typeface="Consolas" panose="020B0609020204030204" pitchFamily="49" charset="0"/>
-                <a:cs typeface="Consolas" panose="020B0609020204030204" pitchFamily="49" charset="0"/>
-              </a:rPr>
-              <a:t>return </a:t>
-            </a:r>
-            <a:r>
-              <a:rPr lang="en-US" dirty="0">
-                <a:latin typeface="Consolas" panose="020B0609020204030204" pitchFamily="49" charset="0"/>
-                <a:cs typeface="Consolas" panose="020B0609020204030204" pitchFamily="49" charset="0"/>
-              </a:rPr>
-              <a:t>(code * </a:t>
-            </a:r>
-            <a:r>
-              <a:rPr lang="en-US" dirty="0">
-                <a:solidFill>
-                  <a:srgbClr val="6897BB"/>
-                </a:solidFill>
-                <a:latin typeface="Consolas" panose="020B0609020204030204" pitchFamily="49" charset="0"/>
-                <a:cs typeface="Consolas" panose="020B0609020204030204" pitchFamily="49" charset="0"/>
-              </a:rPr>
-              <a:t>3 </a:t>
-            </a:r>
-            <a:r>
-              <a:rPr lang="en-US" dirty="0">
-                <a:latin typeface="Consolas" panose="020B0609020204030204" pitchFamily="49" charset="0"/>
-                <a:cs typeface="Consolas" panose="020B0609020204030204" pitchFamily="49" charset="0"/>
-              </a:rPr>
-              <a:t>/ </a:t>
-            </a:r>
-            <a:r>
-              <a:rPr lang="en-US" dirty="0">
-                <a:solidFill>
-                  <a:srgbClr val="6897BB"/>
-                </a:solidFill>
-                <a:latin typeface="Consolas" panose="020B0609020204030204" pitchFamily="49" charset="0"/>
-                <a:cs typeface="Consolas" panose="020B0609020204030204" pitchFamily="49" charset="0"/>
-              </a:rPr>
-              <a:t>2</a:t>
-            </a:r>
-            <a:r>
-              <a:rPr lang="en-US" dirty="0">
-                <a:latin typeface="Consolas" panose="020B0609020204030204" pitchFamily="49" charset="0"/>
-                <a:cs typeface="Consolas" panose="020B0609020204030204" pitchFamily="49" charset="0"/>
-              </a:rPr>
-              <a:t>) - </a:t>
-            </a:r>
-            <a:r>
-              <a:rPr lang="en-US" dirty="0">
-                <a:solidFill>
-                  <a:srgbClr val="6897BB"/>
-                </a:solidFill>
-                <a:latin typeface="Consolas" panose="020B0609020204030204" pitchFamily="49" charset="0"/>
-                <a:cs typeface="Consolas" panose="020B0609020204030204" pitchFamily="49" charset="0"/>
-              </a:rPr>
-              <a:t>2.1 </a:t>
-            </a:r>
-            <a:br>
-              <a:rPr lang="en-US" dirty="0">
-                <a:solidFill>
-                  <a:srgbClr val="6897BB"/>
-                </a:solidFill>
-                <a:latin typeface="Consolas" panose="020B0609020204030204" pitchFamily="49" charset="0"/>
-                <a:cs typeface="Consolas" panose="020B0609020204030204" pitchFamily="49" charset="0"/>
-              </a:rPr>
-            </a:br>
-            <a:br>
-              <a:rPr lang="en-US" dirty="0">
-                <a:solidFill>
-                  <a:srgbClr val="6897BB"/>
-                </a:solidFill>
-                <a:latin typeface="Consolas" panose="020B0609020204030204" pitchFamily="49" charset="0"/>
-                <a:cs typeface="Consolas" panose="020B0609020204030204" pitchFamily="49" charset="0"/>
-              </a:rPr>
-            </a:br>
-            <a:r>
-              <a:rPr lang="en-US" dirty="0">
-                <a:solidFill>
-                  <a:srgbClr val="CC7832"/>
-                </a:solidFill>
-                <a:latin typeface="Consolas" panose="020B0609020204030204" pitchFamily="49" charset="0"/>
-                <a:cs typeface="Consolas" panose="020B0609020204030204" pitchFamily="49" charset="0"/>
-              </a:rPr>
-              <a:t>def </a:t>
-            </a:r>
-            <a:r>
-              <a:rPr lang="en-US" dirty="0" err="1">
-                <a:solidFill>
-                  <a:srgbClr val="FFC66D"/>
-                </a:solidFill>
-                <a:latin typeface="Consolas" panose="020B0609020204030204" pitchFamily="49" charset="0"/>
-                <a:cs typeface="Consolas" panose="020B0609020204030204" pitchFamily="49" charset="0"/>
-              </a:rPr>
-              <a:t>print_machine_info</a:t>
-            </a:r>
-            <a:r>
-              <a:rPr lang="en-US" dirty="0">
-                <a:latin typeface="Consolas" panose="020B0609020204030204" pitchFamily="49" charset="0"/>
-                <a:cs typeface="Consolas" panose="020B0609020204030204" pitchFamily="49" charset="0"/>
-              </a:rPr>
-              <a:t>(computer</a:t>
-            </a:r>
-            <a:r>
-              <a:rPr lang="en-US" dirty="0">
-                <a:solidFill>
-                  <a:srgbClr val="CC7832"/>
-                </a:solidFill>
-                <a:latin typeface="Consolas" panose="020B0609020204030204" pitchFamily="49" charset="0"/>
-                <a:cs typeface="Consolas" panose="020B0609020204030204" pitchFamily="49" charset="0"/>
-              </a:rPr>
-              <a:t>, </a:t>
-            </a:r>
-            <a:r>
-              <a:rPr lang="en-US" dirty="0">
-                <a:latin typeface="Consolas" panose="020B0609020204030204" pitchFamily="49" charset="0"/>
-                <a:cs typeface="Consolas" panose="020B0609020204030204" pitchFamily="49" charset="0"/>
-              </a:rPr>
-              <a:t>code):</a:t>
-            </a:r>
-            <a:br>
-              <a:rPr lang="en-US" dirty="0">
-                <a:latin typeface="Consolas" panose="020B0609020204030204" pitchFamily="49" charset="0"/>
-                <a:cs typeface="Consolas" panose="020B0609020204030204" pitchFamily="49" charset="0"/>
-              </a:rPr>
-            </a:br>
-            <a:r>
-              <a:rPr lang="en-US" dirty="0">
-                <a:latin typeface="Consolas" panose="020B0609020204030204" pitchFamily="49" charset="0"/>
-                <a:cs typeface="Consolas" panose="020B0609020204030204" pitchFamily="49" charset="0"/>
-              </a:rPr>
-              <a:t>    </a:t>
-            </a:r>
-            <a:r>
-              <a:rPr lang="en-US" dirty="0">
-                <a:solidFill>
-                  <a:srgbClr val="8888C6"/>
-                </a:solidFill>
-                <a:latin typeface="Consolas" panose="020B0609020204030204" pitchFamily="49" charset="0"/>
-                <a:cs typeface="Consolas" panose="020B0609020204030204" pitchFamily="49" charset="0"/>
-              </a:rPr>
-              <a:t>print</a:t>
-            </a:r>
-            <a:r>
-              <a:rPr lang="en-US" dirty="0">
-                <a:latin typeface="Consolas" panose="020B0609020204030204" pitchFamily="49" charset="0"/>
-                <a:cs typeface="Consolas" panose="020B0609020204030204" pitchFamily="49" charset="0"/>
-              </a:rPr>
-              <a:t>(</a:t>
-            </a:r>
-            <a:r>
-              <a:rPr lang="en-US" dirty="0">
-                <a:solidFill>
-                  <a:srgbClr val="6A8759"/>
-                </a:solidFill>
-                <a:latin typeface="Consolas" panose="020B0609020204030204" pitchFamily="49" charset="0"/>
-                <a:cs typeface="Consolas" panose="020B0609020204030204" pitchFamily="49" charset="0"/>
-              </a:rPr>
-              <a:t>"The code to the " </a:t>
-            </a:r>
-            <a:r>
-              <a:rPr lang="en-US" dirty="0">
-                <a:latin typeface="Consolas" panose="020B0609020204030204" pitchFamily="49" charset="0"/>
-                <a:cs typeface="Consolas" panose="020B0609020204030204" pitchFamily="49" charset="0"/>
-              </a:rPr>
-              <a:t>+ computer + </a:t>
-            </a:r>
-            <a:r>
-              <a:rPr lang="en-US" dirty="0">
-                <a:solidFill>
-                  <a:srgbClr val="6A8759"/>
-                </a:solidFill>
-                <a:latin typeface="Consolas" panose="020B0609020204030204" pitchFamily="49" charset="0"/>
-                <a:cs typeface="Consolas" panose="020B0609020204030204" pitchFamily="49" charset="0"/>
-              </a:rPr>
-              <a:t>" is "</a:t>
-            </a:r>
-            <a:r>
-              <a:rPr lang="en-US" dirty="0">
-                <a:solidFill>
-                  <a:srgbClr val="CC7832"/>
-                </a:solidFill>
-                <a:latin typeface="Consolas" panose="020B0609020204030204" pitchFamily="49" charset="0"/>
-                <a:cs typeface="Consolas" panose="020B0609020204030204" pitchFamily="49" charset="0"/>
-              </a:rPr>
-              <a:t>, </a:t>
-            </a:r>
-            <a:r>
-              <a:rPr lang="en-US" dirty="0">
-                <a:solidFill>
-                  <a:srgbClr val="AA4926"/>
-                </a:solidFill>
-                <a:latin typeface="Consolas" panose="020B0609020204030204" pitchFamily="49" charset="0"/>
-                <a:cs typeface="Consolas" panose="020B0609020204030204" pitchFamily="49" charset="0"/>
-              </a:rPr>
-              <a:t>end</a:t>
-            </a:r>
-            <a:r>
-              <a:rPr lang="en-US" dirty="0">
-                <a:latin typeface="Consolas" panose="020B0609020204030204" pitchFamily="49" charset="0"/>
-                <a:cs typeface="Consolas" panose="020B0609020204030204" pitchFamily="49" charset="0"/>
-              </a:rPr>
-              <a:t>=</a:t>
-            </a:r>
-            <a:r>
-              <a:rPr lang="en-US" dirty="0">
-                <a:solidFill>
-                  <a:srgbClr val="6A8759"/>
-                </a:solidFill>
-                <a:latin typeface="Consolas" panose="020B0609020204030204" pitchFamily="49" charset="0"/>
-                <a:cs typeface="Consolas" panose="020B0609020204030204" pitchFamily="49" charset="0"/>
-              </a:rPr>
-              <a:t>''</a:t>
-            </a:r>
-            <a:r>
-              <a:rPr lang="en-US" dirty="0">
-                <a:latin typeface="Consolas" panose="020B0609020204030204" pitchFamily="49" charset="0"/>
-                <a:cs typeface="Consolas" panose="020B0609020204030204" pitchFamily="49" charset="0"/>
-              </a:rPr>
-              <a:t>)</a:t>
-            </a:r>
-            <a:br>
-              <a:rPr lang="en-US" dirty="0">
-                <a:latin typeface="Consolas" panose="020B0609020204030204" pitchFamily="49" charset="0"/>
-                <a:cs typeface="Consolas" panose="020B0609020204030204" pitchFamily="49" charset="0"/>
-              </a:rPr>
-            </a:br>
-            <a:r>
-              <a:rPr lang="en-US" dirty="0">
-                <a:latin typeface="Consolas" panose="020B0609020204030204" pitchFamily="49" charset="0"/>
-                <a:cs typeface="Consolas" panose="020B0609020204030204" pitchFamily="49" charset="0"/>
-              </a:rPr>
-              <a:t>    </a:t>
-            </a:r>
-            <a:r>
-              <a:rPr lang="en-US" dirty="0">
-                <a:solidFill>
-                  <a:srgbClr val="8888C6"/>
-                </a:solidFill>
-                <a:latin typeface="Consolas" panose="020B0609020204030204" pitchFamily="49" charset="0"/>
-                <a:cs typeface="Consolas" panose="020B0609020204030204" pitchFamily="49" charset="0"/>
-              </a:rPr>
-              <a:t>print</a:t>
-            </a:r>
-            <a:r>
-              <a:rPr lang="en-US" dirty="0">
-                <a:latin typeface="Consolas" panose="020B0609020204030204" pitchFamily="49" charset="0"/>
-                <a:cs typeface="Consolas" panose="020B0609020204030204" pitchFamily="49" charset="0"/>
-              </a:rPr>
-              <a:t>(</a:t>
-            </a:r>
-            <a:r>
-              <a:rPr lang="en-US" dirty="0" err="1">
-                <a:latin typeface="Consolas" panose="020B0609020204030204" pitchFamily="49" charset="0"/>
-                <a:cs typeface="Consolas" panose="020B0609020204030204" pitchFamily="49" charset="0"/>
-              </a:rPr>
-              <a:t>get_real_code</a:t>
-            </a:r>
-            <a:r>
-              <a:rPr lang="en-US" dirty="0">
-                <a:latin typeface="Consolas" panose="020B0609020204030204" pitchFamily="49" charset="0"/>
-                <a:cs typeface="Consolas" panose="020B0609020204030204" pitchFamily="49" charset="0"/>
-              </a:rPr>
-              <a:t>(code))</a:t>
-            </a:r>
-            <a:br>
-              <a:rPr lang="en-US" dirty="0">
-                <a:latin typeface="Consolas" panose="020B0609020204030204" pitchFamily="49" charset="0"/>
-                <a:cs typeface="Consolas" panose="020B0609020204030204" pitchFamily="49" charset="0"/>
-              </a:rPr>
-            </a:br>
-            <a:br>
-              <a:rPr lang="en-US" dirty="0">
-                <a:latin typeface="Consolas" panose="020B0609020204030204" pitchFamily="49" charset="0"/>
-                <a:cs typeface="Consolas" panose="020B0609020204030204" pitchFamily="49" charset="0"/>
-              </a:rPr>
-            </a:br>
-            <a:r>
-              <a:rPr lang="en-US" dirty="0">
-                <a:solidFill>
-                  <a:srgbClr val="CC7832"/>
-                </a:solidFill>
-                <a:latin typeface="Consolas" panose="020B0609020204030204" pitchFamily="49" charset="0"/>
-                <a:cs typeface="Consolas" panose="020B0609020204030204" pitchFamily="49" charset="0"/>
-              </a:rPr>
-              <a:t>def </a:t>
-            </a:r>
-            <a:r>
-              <a:rPr lang="en-US" dirty="0" err="1">
-                <a:solidFill>
-                  <a:srgbClr val="FFC66D"/>
-                </a:solidFill>
-                <a:latin typeface="Consolas" panose="020B0609020204030204" pitchFamily="49" charset="0"/>
-                <a:cs typeface="Consolas" panose="020B0609020204030204" pitchFamily="49" charset="0"/>
-              </a:rPr>
-              <a:t>use_formula</a:t>
-            </a:r>
-            <a:r>
-              <a:rPr lang="en-US" dirty="0">
-                <a:latin typeface="Consolas" panose="020B0609020204030204" pitchFamily="49" charset="0"/>
-                <a:cs typeface="Consolas" panose="020B0609020204030204" pitchFamily="49" charset="0"/>
-              </a:rPr>
-              <a:t>(code):</a:t>
-            </a:r>
-            <a:br>
-              <a:rPr lang="en-US" dirty="0">
-                <a:latin typeface="Consolas" panose="020B0609020204030204" pitchFamily="49" charset="0"/>
-                <a:cs typeface="Consolas" panose="020B0609020204030204" pitchFamily="49" charset="0"/>
-              </a:rPr>
-            </a:br>
-            <a:r>
-              <a:rPr lang="en-US" dirty="0">
-                <a:latin typeface="Consolas" panose="020B0609020204030204" pitchFamily="49" charset="0"/>
-                <a:cs typeface="Consolas" panose="020B0609020204030204" pitchFamily="49" charset="0"/>
-              </a:rPr>
-              <a:t>    </a:t>
-            </a:r>
-            <a:r>
-              <a:rPr lang="en-US" dirty="0" err="1">
-                <a:latin typeface="Consolas" panose="020B0609020204030204" pitchFamily="49" charset="0"/>
-                <a:cs typeface="Consolas" panose="020B0609020204030204" pitchFamily="49" charset="0"/>
-              </a:rPr>
-              <a:t>solve_cipher</a:t>
-            </a:r>
-            <a:r>
-              <a:rPr lang="en-US" dirty="0">
-                <a:latin typeface="Consolas" panose="020B0609020204030204" pitchFamily="49" charset="0"/>
-                <a:cs typeface="Consolas" panose="020B0609020204030204" pitchFamily="49" charset="0"/>
-              </a:rPr>
-              <a:t>(</a:t>
-            </a:r>
-            <a:r>
-              <a:rPr lang="en-US" dirty="0" err="1">
-                <a:latin typeface="Consolas" panose="020B0609020204030204" pitchFamily="49" charset="0"/>
-                <a:cs typeface="Consolas" panose="020B0609020204030204" pitchFamily="49" charset="0"/>
-              </a:rPr>
-              <a:t>get_real_code</a:t>
-            </a:r>
-            <a:r>
-              <a:rPr lang="en-US" dirty="0">
-                <a:latin typeface="Consolas" panose="020B0609020204030204" pitchFamily="49" charset="0"/>
-                <a:cs typeface="Consolas" panose="020B0609020204030204" pitchFamily="49" charset="0"/>
-              </a:rPr>
-              <a:t>(code) * </a:t>
-            </a:r>
-            <a:r>
-              <a:rPr lang="en-US" dirty="0">
-                <a:solidFill>
-                  <a:srgbClr val="6897BB"/>
-                </a:solidFill>
-                <a:latin typeface="Consolas" panose="020B0609020204030204" pitchFamily="49" charset="0"/>
-                <a:cs typeface="Consolas" panose="020B0609020204030204" pitchFamily="49" charset="0"/>
-              </a:rPr>
-              <a:t>10</a:t>
-            </a:r>
-            <a:r>
-              <a:rPr lang="en-US" dirty="0">
-                <a:latin typeface="Consolas" panose="020B0609020204030204" pitchFamily="49" charset="0"/>
-                <a:cs typeface="Consolas" panose="020B0609020204030204" pitchFamily="49" charset="0"/>
-              </a:rPr>
-              <a:t>)</a:t>
-            </a:r>
-            <a:br>
-              <a:rPr lang="en-US" sz="927" dirty="0">
-                <a:latin typeface="Consolas" panose="020B0609020204030204" pitchFamily="49" charset="0"/>
-                <a:cs typeface="Consolas" panose="020B0609020204030204" pitchFamily="49" charset="0"/>
-              </a:rPr>
-            </a:br>
-            <a:endParaRPr lang="en-US" sz="927" dirty="0">
-              <a:latin typeface="Consolas" panose="020B0609020204030204" pitchFamily="49" charset="0"/>
-              <a:cs typeface="Consolas" panose="020B0609020204030204" pitchFamily="49" charset="0"/>
+            <a:pPr algn="ctr"/>
+            <a:endParaRPr lang="en-US" dirty="0">
+              <a:solidFill>
+                <a:schemeClr val="accent6">
+                  <a:lumMod val="60000"/>
+                  <a:lumOff val="40000"/>
+                </a:schemeClr>
+              </a:solidFill>
+              <a:latin typeface="Proxima Nova" charset="0"/>
+              <a:ea typeface="Proxima Nova" charset="0"/>
+              <a:cs typeface="Proxima Nova" charset="0"/>
             </a:endParaRPr>
           </a:p>
         </p:txBody>
       </p:sp>
       <p:sp>
         <p:nvSpPr>
-          <p:cNvPr id="5" name="TextBox 4">
+          <p:cNvPr id="9" name="Arrow: Left 8">
             <a:extLst>
               <a:ext uri="{FF2B5EF4-FFF2-40B4-BE49-F238E27FC236}">
-                <a16:creationId xmlns:a16="http://schemas.microsoft.com/office/drawing/2014/main" id="{7159283C-F886-4C4D-8754-7449C47F8DF5}"/>
+                <a16:creationId xmlns:a16="http://schemas.microsoft.com/office/drawing/2014/main" id="{C8E0E79F-D171-4C2C-A0A3-AAB7D7BEEDCE}"/>
+              </a:ext>
+            </a:extLst>
+          </p:cNvPr>
+          <p:cNvSpPr/>
+          <p:nvPr/>
+        </p:nvSpPr>
+        <p:spPr>
+          <a:xfrm>
+            <a:off x="3718560" y="4277298"/>
+            <a:ext cx="1914144" cy="246888"/>
+          </a:xfrm>
+          <a:prstGeom prst="leftArrow">
+            <a:avLst/>
+          </a:prstGeom>
+          <a:solidFill>
+            <a:schemeClr val="accent6">
+              <a:lumMod val="75000"/>
+            </a:schemeClr>
+          </a:solidFill>
+          <a:ln>
+            <a:noFill/>
+          </a:ln>
+          <a:effectLst/>
+        </p:spPr>
+        <p:style>
+          <a:lnRef idx="1">
+            <a:schemeClr val="accent1"/>
+          </a:lnRef>
+          <a:fillRef idx="3">
+            <a:schemeClr val="accent1"/>
+          </a:fillRef>
+          <a:effectRef idx="2">
+            <a:schemeClr val="accent1"/>
+          </a:effectRef>
+          <a:fontRef idx="minor">
+            <a:schemeClr val="lt1"/>
+          </a:fontRef>
+        </p:style>
+        <p:txBody>
+          <a:bodyPr lIns="274320" tIns="182880" rIns="274320" bIns="182880" rtlCol="0" anchor="ctr"/>
+          <a:lstStyle/>
+          <a:p>
+            <a:pPr algn="ctr"/>
+            <a:endParaRPr lang="en-US" dirty="0">
+              <a:solidFill>
+                <a:schemeClr val="accent6">
+                  <a:lumMod val="60000"/>
+                  <a:lumOff val="40000"/>
+                </a:schemeClr>
+              </a:solidFill>
+              <a:latin typeface="Proxima Nova" charset="0"/>
+              <a:ea typeface="Proxima Nova" charset="0"/>
+              <a:cs typeface="Proxima Nova" charset="0"/>
+            </a:endParaRPr>
+          </a:p>
+        </p:txBody>
+      </p:sp>
+      <p:sp>
+        <p:nvSpPr>
+          <p:cNvPr id="10" name="TextBox 9">
+            <a:extLst>
+              <a:ext uri="{FF2B5EF4-FFF2-40B4-BE49-F238E27FC236}">
+                <a16:creationId xmlns:a16="http://schemas.microsoft.com/office/drawing/2014/main" id="{E1F974CE-3E4E-4635-8552-CCBE275FFDD7}"/>
               </a:ext>
             </a:extLst>
           </p:cNvPr>
@@ -24935,8 +25065,8 @@
         </p:nvSpPr>
         <p:spPr>
           <a:xfrm>
-            <a:off x="6528645" y="2591190"/>
-            <a:ext cx="2199693" cy="1815882"/>
+            <a:off x="5632703" y="2823220"/>
+            <a:ext cx="3319271" cy="830997"/>
           </a:xfrm>
           <a:prstGeom prst="rect">
             <a:avLst/>
@@ -24951,321 +25081,50 @@
           <a:p>
             <a:r>
               <a:rPr lang="en-US" sz="1600" dirty="0"/>
-              <a:t>Your turn – one person coding  - type the code above, and then as a group figure out ways to modify it!</a:t>
-            </a:r>
-          </a:p>
-          <a:p>
+              <a:t>Function </a:t>
+            </a:r>
+            <a:r>
+              <a:rPr lang="en-US" sz="1600" dirty="0" err="1"/>
+              <a:t>principal_plus_interest</a:t>
+            </a:r>
             <a:r>
               <a:rPr lang="en-US" sz="1600" dirty="0"/>
-              <a:t>How do you test those changes?</a:t>
+              <a:t> is returning the value that was calculated</a:t>
             </a:r>
           </a:p>
         </p:txBody>
       </p:sp>
       <p:sp>
         <p:nvSpPr>
-          <p:cNvPr id="6" name="Text Placeholder 2">
+          <p:cNvPr id="11" name="TextBox 10">
             <a:extLst>
               <a:ext uri="{FF2B5EF4-FFF2-40B4-BE49-F238E27FC236}">
-                <a16:creationId xmlns:a16="http://schemas.microsoft.com/office/drawing/2014/main" id="{016EDDDC-3EA4-FDF3-3BCA-36EE8C72DD40}"/>
+                <a16:creationId xmlns:a16="http://schemas.microsoft.com/office/drawing/2014/main" id="{ECC0F5BD-3158-4046-B0E8-1328FFDDE050}"/>
               </a:ext>
             </a:extLst>
           </p:cNvPr>
-          <p:cNvSpPr txBox="1">
-            <a:spLocks/>
-          </p:cNvSpPr>
+          <p:cNvSpPr txBox="1"/>
           <p:nvPr/>
         </p:nvSpPr>
         <p:spPr>
           <a:xfrm>
-            <a:off x="4319423" y="0"/>
-            <a:ext cx="4941808" cy="2122129"/>
+            <a:off x="5632704" y="3862133"/>
+            <a:ext cx="3319271" cy="1077218"/>
           </a:xfrm>
           <a:prstGeom prst="rect">
             <a:avLst/>
           </a:prstGeom>
           <a:noFill/>
-          <a:ln>
-            <a:noFill/>
-          </a:ln>
         </p:spPr>
         <p:txBody>
-          <a:bodyPr spcFirstLastPara="1" vert="horz" wrap="square" lIns="60500" tIns="60500" rIns="60500" bIns="60500" rtlCol="0" anchor="t" anchorCtr="0">
-            <a:noAutofit/>
+          <a:bodyPr wrap="square" rtlCol="0">
+            <a:spAutoFit/>
           </a:bodyPr>
-          <a:lstStyle>
-            <a:lvl1pPr marL="457221" marR="0" lvl="0" indent="-304814" algn="l" defTabSz="463005" rtl="0" eaLnBrk="1" latinLnBrk="0" hangingPunct="1">
-              <a:lnSpc>
-                <a:spcPct val="120000"/>
-              </a:lnSpc>
-              <a:spcBef>
-                <a:spcPts val="400"/>
-              </a:spcBef>
-              <a:spcAft>
-                <a:spcPts val="0"/>
-              </a:spcAft>
-              <a:buClr>
-                <a:srgbClr val="000000"/>
-              </a:buClr>
-              <a:buSzPts val="1200"/>
-              <a:buFont typeface="Arial"/>
-              <a:buChar char="•"/>
-              <a:defRPr sz="1200" b="0" i="0" u="none" strike="noStrike" kern="1200" cap="none">
-                <a:solidFill>
-                  <a:srgbClr val="000000"/>
-                </a:solidFill>
-                <a:latin typeface="Proxima Nova"/>
-                <a:ea typeface="Proxima Nova"/>
-                <a:cs typeface="Proxima Nova"/>
-                <a:sym typeface="Proxima Nova"/>
-              </a:defRPr>
-            </a:lvl1pPr>
-            <a:lvl2pPr marL="914442" marR="0" lvl="1" indent="-298464" algn="l" defTabSz="463005" rtl="0" eaLnBrk="1" latinLnBrk="0" hangingPunct="1">
-              <a:lnSpc>
-                <a:spcPct val="120000"/>
-              </a:lnSpc>
-              <a:spcBef>
-                <a:spcPts val="400"/>
-              </a:spcBef>
-              <a:spcAft>
-                <a:spcPts val="0"/>
-              </a:spcAft>
-              <a:buClr>
-                <a:srgbClr val="000000"/>
-              </a:buClr>
-              <a:buSzPts val="1100"/>
-              <a:buFont typeface="Arial"/>
-              <a:buChar char="–"/>
-              <a:defRPr sz="1100" b="0" i="0" u="none" strike="noStrike" kern="1200" cap="none">
-                <a:solidFill>
-                  <a:srgbClr val="000000"/>
-                </a:solidFill>
-                <a:latin typeface="Proxima Nova"/>
-                <a:ea typeface="Proxima Nova"/>
-                <a:cs typeface="Proxima Nova"/>
-                <a:sym typeface="Proxima Nova"/>
-              </a:defRPr>
-            </a:lvl2pPr>
-            <a:lvl3pPr marL="1371663" marR="0" lvl="2" indent="-298464" algn="l" defTabSz="463005" rtl="0" eaLnBrk="1" latinLnBrk="0" hangingPunct="1">
-              <a:lnSpc>
-                <a:spcPct val="120000"/>
-              </a:lnSpc>
-              <a:spcBef>
-                <a:spcPts val="400"/>
-              </a:spcBef>
-              <a:spcAft>
-                <a:spcPts val="0"/>
-              </a:spcAft>
-              <a:buClr>
-                <a:srgbClr val="000000"/>
-              </a:buClr>
-              <a:buSzPts val="1100"/>
-              <a:buFont typeface="Arial"/>
-              <a:buChar char="•"/>
-              <a:defRPr sz="1100" b="0" i="0" u="none" strike="noStrike" kern="1200" cap="none">
-                <a:solidFill>
-                  <a:srgbClr val="000000"/>
-                </a:solidFill>
-                <a:latin typeface="Proxima Nova"/>
-                <a:ea typeface="Proxima Nova"/>
-                <a:cs typeface="Proxima Nova"/>
-                <a:sym typeface="Proxima Nova"/>
-              </a:defRPr>
-            </a:lvl3pPr>
-            <a:lvl4pPr marL="1828884" marR="0" lvl="3" indent="-298464" algn="l" defTabSz="463005" rtl="0" eaLnBrk="1" latinLnBrk="0" hangingPunct="1">
-              <a:lnSpc>
-                <a:spcPct val="120000"/>
-              </a:lnSpc>
-              <a:spcBef>
-                <a:spcPts val="400"/>
-              </a:spcBef>
-              <a:spcAft>
-                <a:spcPts val="0"/>
-              </a:spcAft>
-              <a:buClr>
-                <a:srgbClr val="000000"/>
-              </a:buClr>
-              <a:buSzPts val="1100"/>
-              <a:buFont typeface="Arial"/>
-              <a:buChar char="–"/>
-              <a:defRPr sz="1100" b="0" i="0" u="none" strike="noStrike" kern="1200" cap="none">
-                <a:solidFill>
-                  <a:srgbClr val="000000"/>
-                </a:solidFill>
-                <a:latin typeface="Proxima Nova"/>
-                <a:ea typeface="Proxima Nova"/>
-                <a:cs typeface="Proxima Nova"/>
-                <a:sym typeface="Proxima Nova"/>
-              </a:defRPr>
-            </a:lvl4pPr>
-            <a:lvl5pPr marL="2286105" marR="0" lvl="4" indent="-298464" algn="l" defTabSz="463005" rtl="0" eaLnBrk="1" latinLnBrk="0" hangingPunct="1">
-              <a:spcBef>
-                <a:spcPts val="400"/>
-              </a:spcBef>
-              <a:spcAft>
-                <a:spcPts val="0"/>
-              </a:spcAft>
-              <a:buClr>
-                <a:srgbClr val="000000"/>
-              </a:buClr>
-              <a:buSzPts val="1100"/>
-              <a:buFont typeface="Arial"/>
-              <a:buChar char="»"/>
-              <a:defRPr sz="1100" b="0" i="0" u="none" strike="noStrike" kern="1200" cap="none">
-                <a:solidFill>
-                  <a:srgbClr val="000000"/>
-                </a:solidFill>
-                <a:latin typeface="Source Sans Pro"/>
-                <a:ea typeface="Source Sans Pro"/>
-                <a:cs typeface="Source Sans Pro"/>
-                <a:sym typeface="Source Sans Pro"/>
-              </a:defRPr>
-            </a:lvl5pPr>
-            <a:lvl6pPr marL="2743326" marR="0" lvl="5" indent="-355616" algn="l" defTabSz="463005" rtl="0" eaLnBrk="1" latinLnBrk="0" hangingPunct="1">
-              <a:spcBef>
-                <a:spcPts val="400"/>
-              </a:spcBef>
-              <a:spcAft>
-                <a:spcPts val="0"/>
-              </a:spcAft>
-              <a:buClr>
-                <a:srgbClr val="000000"/>
-              </a:buClr>
-              <a:buSzPts val="2000"/>
-              <a:buFont typeface="Arial"/>
-              <a:buChar char="•"/>
-              <a:defRPr sz="2000" b="0" i="0" u="none" strike="noStrike" kern="1200" cap="none">
-                <a:solidFill>
-                  <a:srgbClr val="000000"/>
-                </a:solidFill>
-                <a:latin typeface="Arial"/>
-                <a:ea typeface="Arial"/>
-                <a:cs typeface="Arial"/>
-                <a:sym typeface="Arial"/>
-              </a:defRPr>
-            </a:lvl6pPr>
-            <a:lvl7pPr marL="3200547" marR="0" lvl="6" indent="-355616" algn="l" defTabSz="463005" rtl="0" eaLnBrk="1" latinLnBrk="0" hangingPunct="1">
-              <a:spcBef>
-                <a:spcPts val="400"/>
-              </a:spcBef>
-              <a:spcAft>
-                <a:spcPts val="0"/>
-              </a:spcAft>
-              <a:buClr>
-                <a:srgbClr val="000000"/>
-              </a:buClr>
-              <a:buSzPts val="2000"/>
-              <a:buFont typeface="Arial"/>
-              <a:buChar char="•"/>
-              <a:defRPr sz="2000" b="0" i="0" u="none" strike="noStrike" kern="1200" cap="none">
-                <a:solidFill>
-                  <a:srgbClr val="000000"/>
-                </a:solidFill>
-                <a:latin typeface="Arial"/>
-                <a:ea typeface="Arial"/>
-                <a:cs typeface="Arial"/>
-                <a:sym typeface="Arial"/>
-              </a:defRPr>
-            </a:lvl7pPr>
-            <a:lvl8pPr marL="3657768" marR="0" lvl="7" indent="-355616" algn="l" defTabSz="463005" rtl="0" eaLnBrk="1" latinLnBrk="0" hangingPunct="1">
-              <a:spcBef>
-                <a:spcPts val="400"/>
-              </a:spcBef>
-              <a:spcAft>
-                <a:spcPts val="0"/>
-              </a:spcAft>
-              <a:buClr>
-                <a:srgbClr val="000000"/>
-              </a:buClr>
-              <a:buSzPts val="2000"/>
-              <a:buFont typeface="Arial"/>
-              <a:buChar char="•"/>
-              <a:defRPr sz="2000" b="0" i="0" u="none" strike="noStrike" kern="1200" cap="none">
-                <a:solidFill>
-                  <a:srgbClr val="000000"/>
-                </a:solidFill>
-                <a:latin typeface="Arial"/>
-                <a:ea typeface="Arial"/>
-                <a:cs typeface="Arial"/>
-                <a:sym typeface="Arial"/>
-              </a:defRPr>
-            </a:lvl8pPr>
-            <a:lvl9pPr marL="4114989" marR="0" lvl="8" indent="-355616" algn="l" defTabSz="463005" rtl="0" eaLnBrk="1" latinLnBrk="0" hangingPunct="1">
-              <a:spcBef>
-                <a:spcPts val="400"/>
-              </a:spcBef>
-              <a:spcAft>
-                <a:spcPts val="0"/>
-              </a:spcAft>
-              <a:buClr>
-                <a:srgbClr val="000000"/>
-              </a:buClr>
-              <a:buSzPts val="2000"/>
-              <a:buFont typeface="Arial"/>
-              <a:buChar char="•"/>
-              <a:defRPr sz="2000" b="0" i="0" u="none" strike="noStrike" kern="1200" cap="none">
-                <a:solidFill>
-                  <a:srgbClr val="000000"/>
-                </a:solidFill>
-                <a:latin typeface="Arial"/>
-                <a:ea typeface="Arial"/>
-                <a:cs typeface="Arial"/>
-                <a:sym typeface="Arial"/>
-              </a:defRPr>
-            </a:lvl9pPr>
-          </a:lstStyle>
-          <a:p>
-            <a:r>
-              <a:rPr lang="en-US" sz="1800" dirty="0"/>
-              <a:t>Other programs  can then use those  answers</a:t>
-            </a:r>
-          </a:p>
-          <a:p>
-            <a:pPr lvl="1"/>
-            <a:r>
-              <a:rPr lang="en-US" sz="1400" dirty="0"/>
-              <a:t>As  they  need / best  for  their problem</a:t>
-            </a:r>
-          </a:p>
-          <a:p>
-            <a:pPr lvl="1"/>
-            <a:r>
-              <a:rPr lang="en-US" sz="1400" dirty="0"/>
-              <a:t>Always  the best paradigm to follow</a:t>
-            </a:r>
-          </a:p>
-          <a:p>
-            <a:pPr lvl="1"/>
-            <a:r>
-              <a:rPr lang="en-US" sz="1400" dirty="0"/>
-              <a:t>Notice </a:t>
-            </a:r>
-            <a:r>
-              <a:rPr lang="en-US" sz="1400" b="1" dirty="0"/>
-              <a:t>return</a:t>
-            </a:r>
-            <a:r>
-              <a:rPr lang="en-US" sz="1400" dirty="0"/>
-              <a:t>  in </a:t>
-            </a:r>
-            <a:r>
-              <a:rPr lang="en-US" sz="1400" dirty="0" err="1"/>
-              <a:t>get_real_code</a:t>
-            </a:r>
-            <a:endParaRPr lang="en-US" sz="1400" dirty="0"/>
-          </a:p>
-          <a:p>
-            <a:pPr lvl="2"/>
-            <a:r>
-              <a:rPr lang="en-US" sz="1400" dirty="0"/>
-              <a:t>returns the value, done with the  function</a:t>
-            </a:r>
-          </a:p>
-          <a:p>
-            <a:pPr lvl="1"/>
-            <a:r>
-              <a:rPr lang="en-US" sz="1400" dirty="0"/>
-              <a:t>Pure Functional - Most all functions should return something! </a:t>
+          <a:lstStyle/>
+          <a:p>
+            <a:r>
+              <a:rPr lang="en-US" sz="1600" dirty="0"/>
+              <a:t>We need to store the variable that is returned when we call the function, in order to be able to use it</a:t>
             </a:r>
           </a:p>
         </p:txBody>
@@ -25283,92 +25142,6 @@
   <p:transition>
     <p:fade/>
   </p:transition>
-  <p:timing>
-    <p:tnLst>
-      <p:par>
-        <p:cTn id="1" dur="indefinite" restart="never" nodeType="tmRoot">
-          <p:childTnLst>
-            <p:seq concurrent="1" nextAc="seek">
-              <p:cTn id="2" dur="indefinite" nodeType="mainSeq">
-                <p:childTnLst>
-                  <p:par>
-                    <p:cTn id="3" fill="hold">
-                      <p:stCondLst>
-                        <p:cond delay="indefinite"/>
-                      </p:stCondLst>
-                      <p:childTnLst>
-                        <p:par>
-                          <p:cTn id="4" fill="hold">
-                            <p:stCondLst>
-                              <p:cond delay="0"/>
-                            </p:stCondLst>
-                            <p:childTnLst>
-                              <p:par>
-                                <p:cTn id="5" presetID="9" presetClass="entr" presetSubtype="0" fill="hold" grpId="0" nodeType="clickEffect">
-                                  <p:stCondLst>
-                                    <p:cond delay="0"/>
-                                  </p:stCondLst>
-                                  <p:childTnLst>
-                                    <p:set>
-                                      <p:cBhvr>
-                                        <p:cTn id="6" dur="1" fill="hold">
-                                          <p:stCondLst>
-                                            <p:cond delay="0"/>
-                                          </p:stCondLst>
-                                        </p:cTn>
-                                        <p:tgtEl>
-                                          <p:spTgt spid="5"/>
-                                        </p:tgtEl>
-                                        <p:attrNameLst>
-                                          <p:attrName>style.visibility</p:attrName>
-                                        </p:attrNameLst>
-                                      </p:cBhvr>
-                                      <p:to>
-                                        <p:strVal val="visible"/>
-                                      </p:to>
-                                    </p:set>
-                                    <p:animEffect transition="in" filter="dissolve">
-                                      <p:cBhvr>
-                                        <p:cTn id="7" dur="500"/>
-                                        <p:tgtEl>
-                                          <p:spTgt spid="5"/>
-                                        </p:tgtEl>
-                                      </p:cBhvr>
-                                    </p:animEffect>
-                                  </p:childTnLst>
-                                </p:cTn>
-                              </p:par>
-                            </p:childTnLst>
-                          </p:cTn>
-                        </p:par>
-                      </p:childTnLst>
-                    </p:cTn>
-                  </p:par>
-                </p:childTnLst>
-              </p:cTn>
-              <p:prevCondLst>
-                <p:cond evt="onPrev" delay="0">
-                  <p:tgtEl>
-                    <p:sldTgt/>
-                  </p:tgtEl>
-                </p:cond>
-              </p:prevCondLst>
-              <p:nextCondLst>
-                <p:cond evt="onNext" delay="0">
-                  <p:tgtEl>
-                    <p:sldTgt/>
-                  </p:tgtEl>
-                </p:cond>
-              </p:nextCondLst>
-            </p:seq>
-          </p:childTnLst>
-        </p:cTn>
-      </p:par>
-    </p:tnLst>
-    <p:bldLst>
-      <p:bldP spid="5" grpId="0"/>
-    </p:bldLst>
-  </p:timing>
 </p:sld>
 </file>
 
@@ -26276,8 +26049,17 @@
 </file>
 
 <file path=customXml/item1.xml><?xml version="1.0" encoding="utf-8"?>
-<ct:contentTypeSchema xmlns:ct="http://schemas.microsoft.com/office/2006/metadata/contentType" xmlns:ma="http://schemas.microsoft.com/office/2006/metadata/properties/metaAttributes" ct:_="" ma:_="" ma:contentTypeName="Document" ma:contentTypeID="0x010100074387D78AC76C4289401EF66FB51FCC" ma:contentTypeVersion="14" ma:contentTypeDescription="Create a new document." ma:contentTypeScope="" ma:versionID="16aa88660fc2fdca5573e381835fe0c9">
-  <xsd:schema xmlns:xsd="http://www.w3.org/2001/XMLSchema" xmlns:xs="http://www.w3.org/2001/XMLSchema" xmlns:p="http://schemas.microsoft.com/office/2006/metadata/properties" xmlns:ns3="92c41bee-f0ee-4aa6-9399-a35fbb883510" xmlns:ns4="e06ed288-fd75-4b50-bbed-f5a5df88c31c" targetNamespace="http://schemas.microsoft.com/office/2006/metadata/properties" ma:root="true" ma:fieldsID="d08ce21c39dd96af8dcee1a6fd74aaf6" ns3:_="" ns4:_="">
+<?mso-contentType ?>
+<FormTemplates xmlns="http://schemas.microsoft.com/sharepoint/v3/contenttype/forms">
+  <Display>DocumentLibraryForm</Display>
+  <Edit>DocumentLibraryForm</Edit>
+  <New>DocumentLibraryForm</New>
+</FormTemplates>
+</file>
+
+<file path=customXml/item2.xml><?xml version="1.0" encoding="utf-8"?>
+<ct:contentTypeSchema xmlns:ct="http://schemas.microsoft.com/office/2006/metadata/contentType" xmlns:ma="http://schemas.microsoft.com/office/2006/metadata/properties/metaAttributes" ct:_="" ma:_="" ma:contentTypeName="Document" ma:contentTypeID="0x010100074387D78AC76C4289401EF66FB51FCC" ma:contentTypeVersion="18" ma:contentTypeDescription="Create a new document." ma:contentTypeScope="" ma:versionID="684bb740e09a87c3c1f2cd8296ab2d11">
+  <xsd:schema xmlns:xsd="http://www.w3.org/2001/XMLSchema" xmlns:xs="http://www.w3.org/2001/XMLSchema" xmlns:p="http://schemas.microsoft.com/office/2006/metadata/properties" xmlns:ns3="92c41bee-f0ee-4aa6-9399-a35fbb883510" xmlns:ns4="e06ed288-fd75-4b50-bbed-f5a5df88c31c" targetNamespace="http://schemas.microsoft.com/office/2006/metadata/properties" ma:root="true" ma:fieldsID="edc7b30c6a7f40413d464d3789598fe7" ns3:_="" ns4:_="">
     <xsd:import namespace="92c41bee-f0ee-4aa6-9399-a35fbb883510"/>
     <xsd:import namespace="e06ed288-fd75-4b50-bbed-f5a5df88c31c"/>
     <xsd:element name="properties">
@@ -26300,6 +26082,10 @@
                 <xsd:element ref="ns3:MediaServiceDateTaken" minOccurs="0"/>
                 <xsd:element ref="ns3:MediaLengthInSeconds" minOccurs="0"/>
                 <xsd:element ref="ns3:MediaServiceLocation" minOccurs="0"/>
+                <xsd:element ref="ns3:_activity" minOccurs="0"/>
+                <xsd:element ref="ns3:MediaServiceObjectDetectorVersions" minOccurs="0"/>
+                <xsd:element ref="ns3:MediaServiceSystemTags" minOccurs="0"/>
+                <xsd:element ref="ns3:MediaServiceSearchProperties" minOccurs="0"/>
               </xsd:all>
             </xsd:complexType>
           </xsd:element>
@@ -26367,6 +26153,26 @@
     <xsd:element name="MediaServiceLocation" ma:index="21" nillable="true" ma:displayName="Location" ma:internalName="MediaServiceLocation" ma:readOnly="true">
       <xsd:simpleType>
         <xsd:restriction base="dms:Text"/>
+      </xsd:simpleType>
+    </xsd:element>
+    <xsd:element name="_activity" ma:index="22" nillable="true" ma:displayName="_activity" ma:hidden="true" ma:internalName="_activity">
+      <xsd:simpleType>
+        <xsd:restriction base="dms:Note"/>
+      </xsd:simpleType>
+    </xsd:element>
+    <xsd:element name="MediaServiceObjectDetectorVersions" ma:index="23" nillable="true" ma:displayName="MediaServiceObjectDetectorVersions" ma:description="" ma:hidden="true" ma:indexed="true" ma:internalName="MediaServiceObjectDetectorVersions" ma:readOnly="true">
+      <xsd:simpleType>
+        <xsd:restriction base="dms:Text"/>
+      </xsd:simpleType>
+    </xsd:element>
+    <xsd:element name="MediaServiceSystemTags" ma:index="24" nillable="true" ma:displayName="MediaServiceSystemTags" ma:hidden="true" ma:internalName="MediaServiceSystemTags" ma:readOnly="true">
+      <xsd:simpleType>
+        <xsd:restriction base="dms:Note"/>
+      </xsd:simpleType>
+    </xsd:element>
+    <xsd:element name="MediaServiceSearchProperties" ma:index="25" nillable="true" ma:displayName="MediaServiceSearchProperties" ma:hidden="true" ma:internalName="MediaServiceSearchProperties" ma:readOnly="true">
+      <xsd:simpleType>
+        <xsd:restriction base="dms:Note"/>
       </xsd:simpleType>
     </xsd:element>
   </xsd:schema>
@@ -26504,23 +26310,24 @@
 </ct:contentTypeSchema>
 </file>
 
-<file path=customXml/item2.xml><?xml version="1.0" encoding="utf-8"?>
+<file path=customXml/item3.xml><?xml version="1.0" encoding="utf-8"?>
 <p:properties xmlns:p="http://schemas.microsoft.com/office/2006/metadata/properties" xmlns:xsi="http://www.w3.org/2001/XMLSchema-instance" xmlns:pc="http://schemas.microsoft.com/office/infopath/2007/PartnerControls">
-  <documentManagement/>
+  <documentManagement>
+    <_activity xmlns="92c41bee-f0ee-4aa6-9399-a35fbb883510" xsi:nil="true"/>
+  </documentManagement>
 </p:properties>
 </file>
 
-<file path=customXml/item3.xml><?xml version="1.0" encoding="utf-8"?>
-<?mso-contentType ?>
-<FormTemplates xmlns="http://schemas.microsoft.com/sharepoint/v3/contenttype/forms">
-  <Display>DocumentLibraryForm</Display>
-  <Edit>DocumentLibraryForm</Edit>
-  <New>DocumentLibraryForm</New>
-</FormTemplates>
+<file path=customXml/itemProps1.xml><?xml version="1.0" encoding="utf-8"?>
+<ds:datastoreItem xmlns:ds="http://schemas.openxmlformats.org/officeDocument/2006/customXml" ds:itemID="{ECBA097B-6123-4B8A-8BF9-8745C25437D5}">
+  <ds:schemaRefs>
+    <ds:schemaRef ds:uri="http://schemas.microsoft.com/sharepoint/v3/contenttype/forms"/>
+  </ds:schemaRefs>
+</ds:datastoreItem>
 </file>
 
-<file path=customXml/itemProps1.xml><?xml version="1.0" encoding="utf-8"?>
-<ds:datastoreItem xmlns:ds="http://schemas.openxmlformats.org/officeDocument/2006/customXml" ds:itemID="{ECE8EA35-9C42-4825-ABC6-2C345E857976}">
+<file path=customXml/itemProps2.xml><?xml version="1.0" encoding="utf-8"?>
+<ds:datastoreItem xmlns:ds="http://schemas.openxmlformats.org/officeDocument/2006/customXml" ds:itemID="{2761F7AD-A4B7-43FE-BA42-CF9B7C3C1E79}">
   <ds:schemaRefs>
     <ds:schemaRef ds:uri="http://schemas.microsoft.com/office/2006/metadata/contentType"/>
     <ds:schemaRef ds:uri="http://schemas.microsoft.com/office/2006/metadata/properties/metaAttributes"/>
@@ -26538,27 +26345,19 @@
 </ds:datastoreItem>
 </file>
 
-<file path=customXml/itemProps2.xml><?xml version="1.0" encoding="utf-8"?>
+<file path=customXml/itemProps3.xml><?xml version="1.0" encoding="utf-8"?>
 <ds:datastoreItem xmlns:ds="http://schemas.openxmlformats.org/officeDocument/2006/customXml" ds:itemID="{05D3EE4C-68D3-4BA3-94E6-383E2DFDD168}">
   <ds:schemaRefs>
+    <ds:schemaRef ds:uri="http://schemas.microsoft.com/office/2006/documentManagement/types"/>
+    <ds:schemaRef ds:uri="http://purl.org/dc/dcmitype/"/>
+    <ds:schemaRef ds:uri="http://purl.org/dc/terms/"/>
     <ds:schemaRef ds:uri="http://schemas.microsoft.com/office/2006/metadata/properties"/>
+    <ds:schemaRef ds:uri="92c41bee-f0ee-4aa6-9399-a35fbb883510"/>
     <ds:schemaRef ds:uri="http://schemas.openxmlformats.org/package/2006/metadata/core-properties"/>
-    <ds:schemaRef ds:uri="http://www.w3.org/XML/1998/namespace"/>
     <ds:schemaRef ds:uri="http://purl.org/dc/elements/1.1/"/>
-    <ds:schemaRef ds:uri="http://purl.org/dc/dcmitype/"/>
-    <ds:schemaRef ds:uri="http://schemas.microsoft.com/office/2006/documentManagement/types"/>
     <ds:schemaRef ds:uri="http://schemas.microsoft.com/office/infopath/2007/PartnerControls"/>
     <ds:schemaRef ds:uri="e06ed288-fd75-4b50-bbed-f5a5df88c31c"/>
-    <ds:schemaRef ds:uri="92c41bee-f0ee-4aa6-9399-a35fbb883510"/>
-    <ds:schemaRef ds:uri="http://purl.org/dc/terms/"/>
-  </ds:schemaRefs>
-</ds:datastoreItem>
-</file>
-
-<file path=customXml/itemProps3.xml><?xml version="1.0" encoding="utf-8"?>
-<ds:datastoreItem xmlns:ds="http://schemas.openxmlformats.org/officeDocument/2006/customXml" ds:itemID="{ECBA097B-6123-4B8A-8BF9-8745C25437D5}">
-  <ds:schemaRefs>
-    <ds:schemaRef ds:uri="http://schemas.microsoft.com/sharepoint/v3/contenttype/forms"/>
+    <ds:schemaRef ds:uri="http://www.w3.org/XML/1998/namespace"/>
   </ds:schemaRefs>
 </ds:datastoreItem>
 </file>
</xml_diff>